<commit_message>
updated presentation from report
</commit_message>
<xml_diff>
--- a/Project Status Report Final/finalpresentation.pptx
+++ b/Project Status Report Final/finalpresentation.pptx
@@ -272,7 +272,7 @@
           <a:p>
             <a:fld id="{716ECBBD-C828-4D65-BAA1-D5361C751F0C}" type="datetimeFigureOut">
               <a:rPr lang="en-US" smtClean="0"/>
-              <a:t>4/23/2024</a:t>
+              <a:t>4/24/2024</a:t>
             </a:fld>
             <a:endParaRPr lang="en-US"/>
           </a:p>
@@ -687,115 +687,15 @@
               <a:tabLst/>
               <a:defRPr/>
             </a:pPr>
-            <a:r>
-              <a:rPr lang="en-US" dirty="0">
-                <a:solidFill>
-                  <a:srgbClr val="BCBEC4"/>
-                </a:solidFill>
-                <a:effectLst/>
-                <a:highlight>
-                  <a:srgbClr val="1E1F22"/>
-                </a:highlight>
-              </a:rPr>
-              <a:t>- Information flow </a:t>
-            </a:r>
-            <a:r>
-              <a:rPr lang="en-US" dirty="0"/>
-              <a:t>mostly accounted for expansion of risk data but needs to be elaborated to better capture the idea of partial information</a:t>
-            </a:r>
-          </a:p>
-          <a:p>
-            <a:pPr marL="171450" marR="0" lvl="0" indent="-171450" algn="l" defTabSz="914400" rtl="0" eaLnBrk="1" fontAlgn="auto" latinLnBrk="0" hangingPunct="1">
-              <a:lnSpc>
-                <a:spcPct val="100000"/>
-              </a:lnSpc>
-              <a:spcBef>
-                <a:spcPts val="0"/>
-              </a:spcBef>
-              <a:spcAft>
-                <a:spcPts val="0"/>
-              </a:spcAft>
-              <a:buClrTx/>
-              <a:buSzTx/>
-              <a:buFontTx/>
-              <a:buChar char="-"/>
-              <a:tabLst/>
-              <a:defRPr/>
-            </a:pPr>
-            <a:r>
-              <a:rPr lang="en-US" dirty="0">
-                <a:solidFill>
-                  <a:srgbClr val="BCBEC4"/>
-                </a:solidFill>
-                <a:effectLst/>
-                <a:highlight>
-                  <a:srgbClr val="1E1F22"/>
-                </a:highlight>
-              </a:rPr>
-              <a:t>Data filtration cuts out stocks in which only partial information is available and stocks that remove from public market for private buyout or bankruptcy limiting types</a:t>
-            </a:r>
-          </a:p>
-          <a:p>
-            <a:pPr marL="171450" marR="0" lvl="0" indent="-171450" algn="l" defTabSz="914400" rtl="0" eaLnBrk="1" fontAlgn="auto" latinLnBrk="0" hangingPunct="1">
-              <a:lnSpc>
-                <a:spcPct val="100000"/>
-              </a:lnSpc>
-              <a:spcBef>
-                <a:spcPts val="0"/>
-              </a:spcBef>
-              <a:spcAft>
-                <a:spcPts val="0"/>
-              </a:spcAft>
-              <a:buClrTx/>
-              <a:buSzTx/>
-              <a:buFontTx/>
-              <a:buChar char="-"/>
-              <a:tabLst/>
-              <a:defRPr/>
-            </a:pPr>
-            <a:r>
-              <a:rPr lang="en-US" dirty="0">
-                <a:solidFill>
-                  <a:srgbClr val="BCBEC4"/>
-                </a:solidFill>
-                <a:effectLst/>
-                <a:highlight>
-                  <a:srgbClr val="1E1F22"/>
-                </a:highlight>
-              </a:rPr>
-              <a:t>Should expand to more brokers and also try to create the power law distribution around which friends are popular instead of random</a:t>
-            </a:r>
-          </a:p>
-          <a:p>
-            <a:pPr marL="171450" marR="0" lvl="0" indent="-171450" algn="l" defTabSz="914400" rtl="0" eaLnBrk="1" fontAlgn="auto" latinLnBrk="0" hangingPunct="1">
-              <a:lnSpc>
-                <a:spcPct val="100000"/>
-              </a:lnSpc>
-              <a:spcBef>
-                <a:spcPts val="0"/>
-              </a:spcBef>
-              <a:spcAft>
-                <a:spcPts val="0"/>
-              </a:spcAft>
-              <a:buClrTx/>
-              <a:buSzTx/>
-              <a:buFontTx/>
-              <a:buChar char="-"/>
-              <a:tabLst/>
-              <a:defRPr/>
-            </a:pPr>
-            <a:r>
-              <a:rPr lang="en-US" dirty="0">
-                <a:solidFill>
-                  <a:srgbClr val="BCBEC4"/>
-                </a:solidFill>
-                <a:effectLst/>
-                <a:highlight>
-                  <a:srgbClr val="1E1F22"/>
-                </a:highlight>
-              </a:rPr>
-              <a:t>Could extend stock risk evaluation to better account for more relationships in stocks </a:t>
-            </a:r>
+            <a:endParaRPr lang="en-US" dirty="0">
+              <a:solidFill>
+                <a:srgbClr val="BCBEC4"/>
+              </a:solidFill>
+              <a:effectLst/>
+              <a:highlight>
+                <a:srgbClr val="1E1F22"/>
+              </a:highlight>
+            </a:endParaRPr>
           </a:p>
         </p:txBody>
       </p:sp>
@@ -1169,7 +1069,7 @@
                   <a:srgbClr val="1E1F22"/>
                 </a:highlight>
               </a:rPr>
-              <a:t>Aside from regulations, system self organizes from varying behaviors</a:t>
+              <a:t>Largely self organizing structure of brokers and stocks within constraints of legal regulation</a:t>
             </a:r>
           </a:p>
           <a:p>
@@ -1228,7 +1128,7 @@
                   <a:srgbClr val="1E1F22"/>
                 </a:highlight>
               </a:rPr>
-              <a:t>Explored in many fields about risk, networks of stocks and brokers, grouping network, modeling crashes and antifragility in those crashes, chosen to explore normal behavior and then crisis events between 2007-2008</a:t>
+              <a:t>Explored in many fields about risk, networks of stocks and brokers, looking for cliches in network of brokers and nodes, modeling crashes,</a:t>
             </a:r>
           </a:p>
           <a:p>
@@ -1259,11 +1159,11 @@
                   <a:srgbClr val="1E1F22"/>
                 </a:highlight>
               </a:rPr>
-              <a:t>This presents an opportunity to explore the market and develop strategies based on risk in simulation with real data.</a:t>
-            </a:r>
-          </a:p>
-          <a:p>
-            <a:pPr marL="171450" marR="0" lvl="0" indent="-171450" algn="l" defTabSz="914400" rtl="0" eaLnBrk="1" fontAlgn="auto" latinLnBrk="0" hangingPunct="1">
+              <a:t>Presents an opportunity to explore the market and develop strategies based on the risk and interconnections in the network. </a:t>
+            </a:r>
+          </a:p>
+          <a:p>
+            <a:pPr marL="0" marR="0" lvl="0" indent="0" algn="l" defTabSz="914400" rtl="0" eaLnBrk="1" fontAlgn="auto" latinLnBrk="0" hangingPunct="1">
               <a:lnSpc>
                 <a:spcPct val="100000"/>
               </a:lnSpc>
@@ -1276,7 +1176,7 @@
               <a:buClrTx/>
               <a:buSzTx/>
               <a:buFontTx/>
-              <a:buChar char="-"/>
+              <a:buNone/>
               <a:tabLst/>
               <a:defRPr/>
             </a:pPr>
@@ -1290,11 +1190,35 @@
                   <a:srgbClr val="1E1F22"/>
                 </a:highlight>
               </a:rPr>
-              <a:t>Also looking for an antifragile strategy based on risk and influence that does better during drastic events</a:t>
-            </a:r>
-          </a:p>
-          <a:p>
-            <a:pPr marL="171450" marR="0" lvl="0" indent="-171450" algn="l" defTabSz="914400" rtl="0" eaLnBrk="1" fontAlgn="auto" latinLnBrk="0" hangingPunct="1">
+              <a:t>We chose to focus on 2003-2013 for our simulations in order to capture what can be considered expected operation of the market but also look for antifragile strategy based on that risk and influence that can do better during drastic Black Swan events that </a:t>
+            </a:r>
+            <a:r>
+              <a:rPr lang="en-US" dirty="0" err="1">
+                <a:solidFill>
+                  <a:srgbClr val="BCBEC4"/>
+                </a:solidFill>
+                <a:effectLst/>
+                <a:highlight>
+                  <a:srgbClr val="1E1F22"/>
+                </a:highlight>
+              </a:rPr>
+              <a:t>Taleb</a:t>
+            </a:r>
+            <a:r>
+              <a:rPr lang="en-US" dirty="0">
+                <a:solidFill>
+                  <a:srgbClr val="BCBEC4"/>
+                </a:solidFill>
+                <a:effectLst/>
+                <a:highlight>
+                  <a:srgbClr val="1E1F22"/>
+                </a:highlight>
+              </a:rPr>
+              <a:t> discusses in his work</a:t>
+            </a:r>
+          </a:p>
+          <a:p>
+            <a:pPr marL="0" marR="0" lvl="0" indent="0" algn="l" defTabSz="914400" rtl="0" eaLnBrk="1" fontAlgn="auto" latinLnBrk="0" hangingPunct="1">
               <a:lnSpc>
                 <a:spcPct val="100000"/>
               </a:lnSpc>
@@ -1307,19 +1231,53 @@
               <a:buClrTx/>
               <a:buSzTx/>
               <a:buFontTx/>
-              <a:buChar char="-"/>
+              <a:buNone/>
               <a:tabLst/>
               <a:defRPr/>
             </a:pPr>
-            <a:endParaRPr lang="en-US" dirty="0">
-              <a:solidFill>
-                <a:srgbClr val="BCBEC4"/>
-              </a:solidFill>
-              <a:effectLst/>
-              <a:highlight>
-                <a:srgbClr val="1E1F22"/>
-              </a:highlight>
-            </a:endParaRPr>
+            <a:r>
+              <a:rPr lang="en-US" dirty="0">
+                <a:solidFill>
+                  <a:srgbClr val="BCBEC4"/>
+                </a:solidFill>
+                <a:effectLst/>
+                <a:highlight>
+                  <a:srgbClr val="1E1F22"/>
+                </a:highlight>
+              </a:rPr>
+              <a:t>We suggested that there may be strategies that do well during normal operations but not as well during drastic events and likewise strategies that are suboptimal in normal events but benefit from drastic changes</a:t>
+            </a:r>
+          </a:p>
+          <a:p>
+            <a:pPr marL="0" marR="0" lvl="0" indent="0" algn="l" defTabSz="914400" rtl="0" eaLnBrk="1" fontAlgn="auto" latinLnBrk="0" hangingPunct="1">
+              <a:lnSpc>
+                <a:spcPct val="100000"/>
+              </a:lnSpc>
+              <a:spcBef>
+                <a:spcPts val="0"/>
+              </a:spcBef>
+              <a:spcAft>
+                <a:spcPts val="0"/>
+              </a:spcAft>
+              <a:buClrTx/>
+              <a:buSzTx/>
+              <a:buFontTx/>
+              <a:buNone/>
+              <a:tabLst/>
+              <a:defRPr/>
+            </a:pPr>
+            <a:r>
+              <a:rPr lang="en-US" dirty="0">
+                <a:solidFill>
+                  <a:srgbClr val="BCBEC4"/>
+                </a:solidFill>
+                <a:effectLst/>
+                <a:highlight>
+                  <a:srgbClr val="1E1F22"/>
+                </a:highlight>
+              </a:rPr>
+              <a:t>In order to do this, we designed a simulation to be run over various time intervals for interconnected brokers that can influence on another and with individually preferred risk levels</a:t>
+            </a:r>
           </a:p>
         </p:txBody>
       </p:sp>
@@ -1407,7 +1365,7 @@
               <a:p>
                 <a:r>
                   <a:rPr lang="en-US" dirty="0"/>
-                  <a:t>1 minute</a:t>
+                  <a:t>2 minute</a:t>
                 </a:r>
               </a:p>
               <a:p>
@@ -1416,13 +1374,21 @@
               <a:p>
                 <a:r>
                   <a:rPr lang="en-US" dirty="0"/>
-                  <a:t>Simulation over 100 brokers, interconnected with the ability to influence each other’s assessment of the risk </a:t>
+                  <a:t>Simulation over 100 brokers, interconnected with the ability to influence each other’s assessment of the risk. We refer to broker’s friends as people who can provide this input, sort of like how a broker might ask the advice of connections in the financial world or copy high performing broker strategies</a:t>
                 </a:r>
               </a:p>
               <a:p>
                 <a:r>
                   <a:rPr lang="en-US" dirty="0"/>
-                  <a:t>Highlight directed graph indicating directional influence resembling real world, distributed number of inputs to influence risk based on </a:t>
+                  <a:t>Important to note was set up directionally (</a:t>
+                </a:r>
+                <a:r>
+                  <a:rPr lang="en-US" dirty="0" err="1"/>
+                  <a:t>ie</a:t>
+                </a:r>
+                <a:r>
+                  <a:rPr lang="en-US" dirty="0"/>
+                  <a:t> a broker might listen to an influencer but not bi directionally), distributed number of inputs to influence risk based on </a:t>
                 </a:r>
                 <a:r>
                   <a:rPr lang="en-US" dirty="0" err="1"/>
@@ -1430,7 +1396,7 @@
                 </a:r>
                 <a:r>
                   <a:rPr lang="en-US" dirty="0"/>
-                  <a:t> distribution with exponent 2.7</a:t>
+                  <a:t> distribution with exponent 2.7, based on approximate in degree of a general social network</a:t>
                 </a:r>
               </a:p>
               <a:p>
@@ -1456,7 +1422,7 @@
               <a:p>
                 <a:r>
                   <a:rPr lang="en-US" dirty="0"/>
-                  <a:t>each friend started with a set percent $</a:t>
+                  <a:t>Equation shows perceived risk for each broker which is a linear combination of the brokers assessment and the friends’ influence, each friend started with a set percent $</a:t>
                 </a:r>
                 <a:r>
                   <a:rPr lang="en-US" dirty="0" err="1"/>
@@ -1464,8 +1430,41 @@
                 </a:r>
                 <a:r>
                   <a:rPr lang="en-US" dirty="0"/>
-                  <a:t> = .04$</a:t>
+                  <a:t> = .04$, limited to 0 to 1</a:t>
                 </a:r>
+              </a:p>
+              <a:p>
+                <a:r>
+                  <a:rPr lang="en-US" dirty="0"/>
+                  <a:t>Connections were strengthened if the advising broker was doing better in the last couple days than the given broker and weakened if doing more poorly.</a:t>
+                </a:r>
+              </a:p>
+              <a:p>
+                <a:endParaRPr lang="en-US" dirty="0"/>
+              </a:p>
+              <a:p>
+                <a:r>
+                  <a:rPr lang="en-US" dirty="0"/>
+                  <a:t>The agent’s strategies in this case were to attempt to maintain their perceived levels of risk within 10% of their desired risk level. We also briefly explored achieving desired level and just holding the portfolio.</a:t>
+                </a:r>
+              </a:p>
+              <a:p>
+                <a:r>
+                  <a:rPr lang="en-US" dirty="0"/>
+                  <a:t>Each agent would look at all the stocks available on a given day and perform their assessment of risk + get neighbor’s assessment according to equation here. If too low, they would sell some low risk stocks and purchase some higher risk stocks. If too high, they would sell some higher risk stocks. They also had a tertiary priority of buying stocks and not sit on the money they had either initially or from dividends. If they achieved desired level, they would stop or if they hit their max transactions for the day. </a:t>
+                </a:r>
+              </a:p>
+              <a:p>
+                <a:endParaRPr lang="en-US" dirty="0"/>
+              </a:p>
+              <a:p>
+                <a:r>
+                  <a:rPr lang="en-US" dirty="0"/>
+                  <a:t>This perceived risk and individual risk would also be considered distributed according to a power law distribution; agents were given a default preferred risk which for simplicity of interpreting corresponded to a constant times their broker id</a:t>
+                </a:r>
+              </a:p>
+              <a:p>
+                <a:endParaRPr lang="en-US" dirty="0"/>
               </a:p>
             </p:txBody>
           </p:sp>
@@ -1630,8 +1629,60 @@
           <a:p>
             <a:r>
               <a:rPr lang="en-US" dirty="0"/>
-              <a:t>Add plots showing how high risk ends up with low liquidity, high dollar value of stocks, fewer stocks</a:t>
-            </a:r>
+              <a:t>3 minutes</a:t>
+            </a:r>
+          </a:p>
+          <a:p>
+            <a:endParaRPr lang="en-US" dirty="0"/>
+          </a:p>
+          <a:p>
+            <a:r>
+              <a:rPr lang="en-US" dirty="0"/>
+              <a:t>NOTES FROM MINAI ON REPORT:</a:t>
+            </a:r>
+          </a:p>
+          <a:p>
+            <a:pPr marL="171450" indent="-171450">
+              <a:buFontTx/>
+              <a:buChar char="-"/>
+            </a:pPr>
+            <a:r>
+              <a:rPr lang="en-US" dirty="0"/>
+              <a:t>Justify why k=3 was chosen</a:t>
+            </a:r>
+          </a:p>
+          <a:p>
+            <a:pPr marL="171450" indent="-171450">
+              <a:buFontTx/>
+              <a:buChar char="-"/>
+            </a:pPr>
+            <a:r>
+              <a:rPr lang="en-US" dirty="0"/>
+              <a:t>Explain more about why these parameters were chosen for the model; What is the source of this model, and what is its logic?</a:t>
+            </a:r>
+          </a:p>
+          <a:p>
+            <a:pPr marL="171450" indent="-171450">
+              <a:buFontTx/>
+              <a:buChar char="-"/>
+            </a:pPr>
+            <a:r>
+              <a:rPr lang="en-US" dirty="0"/>
+              <a:t>What does impact mean here?</a:t>
+            </a:r>
+          </a:p>
+          <a:p>
+            <a:pPr marL="171450" indent="-171450">
+              <a:buFontTx/>
+              <a:buChar char="-"/>
+            </a:pPr>
+            <a:r>
+              <a:rPr lang="en-US" dirty="0"/>
+              <a:t>From Rachael: maybe note that this behavioral model of purchasing fewer stocks but more expensive ones at high risk emerged naturally and was not enforced</a:t>
+            </a:r>
+          </a:p>
+          <a:p>
+            <a:endParaRPr lang="en-US" dirty="0"/>
           </a:p>
           <a:p>
             <a:endParaRPr lang="en-US" dirty="0"/>
@@ -1826,6 +1877,115 @@
             </a:pPr>
             <a:r>
               <a:rPr lang="en-US" dirty="0"/>
+              <a:t>1.5 minutes</a:t>
+            </a:r>
+          </a:p>
+          <a:p>
+            <a:pPr marL="0" marR="0" lvl="0" indent="0" algn="l" defTabSz="914400" rtl="0" eaLnBrk="1" fontAlgn="auto" latinLnBrk="0" hangingPunct="1">
+              <a:lnSpc>
+                <a:spcPct val="100000"/>
+              </a:lnSpc>
+              <a:spcBef>
+                <a:spcPts val="0"/>
+              </a:spcBef>
+              <a:spcAft>
+                <a:spcPts val="0"/>
+              </a:spcAft>
+              <a:buClrTx/>
+              <a:buSzTx/>
+              <a:buFontTx/>
+              <a:buNone/>
+              <a:tabLst/>
+              <a:defRPr/>
+            </a:pPr>
+            <a:endParaRPr lang="en-US" dirty="0"/>
+          </a:p>
+          <a:p>
+            <a:pPr marL="0" marR="0" lvl="0" indent="0" algn="l" defTabSz="914400" rtl="0" eaLnBrk="1" fontAlgn="auto" latinLnBrk="0" hangingPunct="1">
+              <a:lnSpc>
+                <a:spcPct val="100000"/>
+              </a:lnSpc>
+              <a:spcBef>
+                <a:spcPts val="0"/>
+              </a:spcBef>
+              <a:spcAft>
+                <a:spcPts val="0"/>
+              </a:spcAft>
+              <a:buClrTx/>
+              <a:buSzTx/>
+              <a:buFontTx/>
+              <a:buNone/>
+              <a:tabLst/>
+              <a:defRPr/>
+            </a:pPr>
+            <a:r>
+              <a:rPr lang="en-US" dirty="0"/>
+              <a:t>NOTES FROM MINAI’S COMMENTS:</a:t>
+            </a:r>
+          </a:p>
+          <a:p>
+            <a:pPr marL="0" marR="0" lvl="0" indent="0" algn="l" defTabSz="914400" rtl="0" eaLnBrk="1" fontAlgn="auto" latinLnBrk="0" hangingPunct="1">
+              <a:lnSpc>
+                <a:spcPct val="100000"/>
+              </a:lnSpc>
+              <a:spcBef>
+                <a:spcPts val="0"/>
+              </a:spcBef>
+              <a:spcAft>
+                <a:spcPts val="0"/>
+              </a:spcAft>
+              <a:buClrTx/>
+              <a:buSzTx/>
+              <a:buFontTx/>
+              <a:buNone/>
+              <a:tabLst/>
+              <a:defRPr/>
+            </a:pPr>
+            <a:r>
+              <a:rPr lang="en-US" dirty="0"/>
+              <a:t>- don’t say stop investing, say stop buying stocks </a:t>
+            </a:r>
+          </a:p>
+          <a:p>
+            <a:pPr marL="0" marR="0" lvl="0" indent="0" algn="l" defTabSz="914400" rtl="0" eaLnBrk="1" fontAlgn="auto" latinLnBrk="0" hangingPunct="1">
+              <a:lnSpc>
+                <a:spcPct val="100000"/>
+              </a:lnSpc>
+              <a:spcBef>
+                <a:spcPts val="0"/>
+              </a:spcBef>
+              <a:spcAft>
+                <a:spcPts val="0"/>
+              </a:spcAft>
+              <a:buClrTx/>
+              <a:buSzTx/>
+              <a:buFontTx/>
+              <a:buNone/>
+              <a:tabLst/>
+              <a:defRPr/>
+            </a:pPr>
+            <a:endParaRPr lang="en-US" dirty="0"/>
+          </a:p>
+          <a:p>
+            <a:pPr marL="0" marR="0" lvl="0" indent="0" algn="l" defTabSz="914400" rtl="0" eaLnBrk="1" fontAlgn="auto" latinLnBrk="0" hangingPunct="1">
+              <a:lnSpc>
+                <a:spcPct val="100000"/>
+              </a:lnSpc>
+              <a:spcBef>
+                <a:spcPts val="0"/>
+              </a:spcBef>
+              <a:spcAft>
+                <a:spcPts val="0"/>
+              </a:spcAft>
+              <a:buClrTx/>
+              <a:buSzTx/>
+              <a:buFontTx/>
+              <a:buNone/>
+              <a:tabLst/>
+              <a:defRPr/>
+            </a:pPr>
+            <a:r>
+              <a:rPr lang="en-US" dirty="0"/>
               <a:t>Example of portfolio behavior over time</a:t>
             </a:r>
           </a:p>
@@ -2097,6 +2257,15 @@
           <a:p>
             <a:r>
               <a:rPr lang="en-US" dirty="0"/>
+              <a:t>1.5 minutes</a:t>
+            </a:r>
+          </a:p>
+          <a:p>
+            <a:endParaRPr lang="en-US" dirty="0"/>
+          </a:p>
+          <a:p>
+            <a:r>
+              <a:rPr lang="en-US" dirty="0"/>
               <a:t>Left figure show interim portfolio values before the 2007-2008 financial crisis</a:t>
             </a:r>
           </a:p>
@@ -2244,7 +2413,7 @@
           <a:p>
             <a:r>
               <a:rPr lang="en-US" dirty="0"/>
-              <a:t>Influence aspect was adjusted. Two different possibilities were explored. As mentioned, influence kept with positive weight was the main approach</a:t>
+              <a:t>1.5 minute</a:t>
             </a:r>
           </a:p>
           <a:p>
@@ -2276,8 +2445,23 @@
           <a:p>
             <a:r>
               <a:rPr lang="en-US" dirty="0"/>
-              <a:t>Note expected difference in time series final values with the high and low risk</a:t>
-            </a:r>
+              <a:t>Benefit of influence consistent across different levels of risk; when assigning a 1/3 of brokers low, 1/3 med, 1/3 high and just adjusting influence, see a couple examples</a:t>
+            </a:r>
+          </a:p>
+          <a:p>
+            <a:r>
+              <a:rPr lang="en-US" dirty="0"/>
+              <a:t>Red and green in high risk do better than blue who took less input</a:t>
+            </a:r>
+          </a:p>
+          <a:p>
+            <a:r>
+              <a:rPr lang="en-US" dirty="0"/>
+              <a:t>Dark blue and orange doing much more poorly than mustard in </a:t>
+            </a:r>
+          </a:p>
+          <a:p>
+            <a:endParaRPr lang="en-US" dirty="0"/>
           </a:p>
           <a:p>
             <a:r>
@@ -2394,6 +2578,65 @@
                   <a:srgbClr val="1E1F22"/>
                 </a:highlight>
               </a:rPr>
+              <a:t>1.5 minutes</a:t>
+            </a:r>
+          </a:p>
+          <a:p>
+            <a:pPr marL="0" marR="0" lvl="0" indent="0" algn="l" defTabSz="914400" rtl="0" eaLnBrk="1" fontAlgn="auto" latinLnBrk="0" hangingPunct="1">
+              <a:lnSpc>
+                <a:spcPct val="100000"/>
+              </a:lnSpc>
+              <a:spcBef>
+                <a:spcPts val="0"/>
+              </a:spcBef>
+              <a:spcAft>
+                <a:spcPts val="0"/>
+              </a:spcAft>
+              <a:buClrTx/>
+              <a:buSzTx/>
+              <a:buFontTx/>
+              <a:buNone/>
+              <a:tabLst/>
+              <a:defRPr/>
+            </a:pPr>
+            <a:endParaRPr lang="en-US" dirty="0">
+              <a:solidFill>
+                <a:srgbClr val="BCBEC4"/>
+              </a:solidFill>
+              <a:effectLst/>
+              <a:highlight>
+                <a:srgbClr val="1E1F22"/>
+              </a:highlight>
+            </a:endParaRPr>
+          </a:p>
+          <a:p>
+            <a:pPr marL="0" marR="0" lvl="0" indent="0" algn="l" defTabSz="914400" rtl="0" eaLnBrk="1" fontAlgn="auto" latinLnBrk="0" hangingPunct="1">
+              <a:lnSpc>
+                <a:spcPct val="100000"/>
+              </a:lnSpc>
+              <a:spcBef>
+                <a:spcPts val="0"/>
+              </a:spcBef>
+              <a:spcAft>
+                <a:spcPts val="0"/>
+              </a:spcAft>
+              <a:buClrTx/>
+              <a:buSzTx/>
+              <a:buFontTx/>
+              <a:buNone/>
+              <a:tabLst/>
+              <a:defRPr/>
+            </a:pPr>
+            <a:r>
+              <a:rPr lang="en-US" dirty="0">
+                <a:solidFill>
+                  <a:srgbClr val="BCBEC4"/>
+                </a:solidFill>
+                <a:effectLst/>
+                <a:highlight>
+                  <a:srgbClr val="1E1F22"/>
+                </a:highlight>
+              </a:rPr>
               <a:t>- Information flow </a:t>
             </a:r>
             <a:r>
@@ -2429,7 +2672,7 @@
                   <a:srgbClr val="1E1F22"/>
                 </a:highlight>
               </a:rPr>
-              <a:t>Data filtration cuts out stocks in which only partial information is available and stocks that remove from public market for private buyout or bankruptcy limiting types</a:t>
+              <a:t>Data filtration cuts out stocks in which only partial information is available and stocks were removed from public market for private buyout or bankruptcy limiting types of stocks being considered – need to reference figure if keeping it to say the distribution isn’t entirely clear</a:t>
             </a:r>
           </a:p>
           <a:p>
@@ -2460,7 +2703,31 @@
                   <a:srgbClr val="1E1F22"/>
                 </a:highlight>
               </a:rPr>
-              <a:t>Should expand to more brokers and also try to create the power law distribution around which friends are popular instead of random</a:t>
+              <a:t>Should expand to more brokers and possible make the connections more dynamic </a:t>
+            </a:r>
+            <a:r>
+              <a:rPr lang="en-US" dirty="0" err="1">
+                <a:solidFill>
+                  <a:srgbClr val="BCBEC4"/>
+                </a:solidFill>
+                <a:effectLst/>
+                <a:highlight>
+                  <a:srgbClr val="1E1F22"/>
+                </a:highlight>
+              </a:rPr>
+              <a:t>ie</a:t>
+            </a:r>
+            <a:r>
+              <a:rPr lang="en-US" dirty="0">
+                <a:solidFill>
+                  <a:srgbClr val="BCBEC4"/>
+                </a:solidFill>
+                <a:effectLst/>
+                <a:highlight>
+                  <a:srgbClr val="1E1F22"/>
+                </a:highlight>
+              </a:rPr>
+              <a:t> follow the best broker instead of being stuck entirely with initial connections</a:t>
             </a:r>
           </a:p>
           <a:p>
@@ -2491,7 +2758,7 @@
                   <a:srgbClr val="1E1F22"/>
                 </a:highlight>
               </a:rPr>
-              <a:t>Could extend stock risk evaluation to better account for more relationships in stocks </a:t>
+              <a:t>Could extend stock risk evaluation to better account for more relationships in stock statistics </a:t>
             </a:r>
           </a:p>
           <a:p>
@@ -2522,7 +2789,7 @@
                   <a:srgbClr val="1E1F22"/>
                 </a:highlight>
               </a:rPr>
-              <a:t>Negative influence in the market</a:t>
+              <a:t>Explore idea of negative influence in the market</a:t>
             </a:r>
           </a:p>
           <a:p>
@@ -2553,7 +2820,7 @@
                   <a:srgbClr val="1E1F22"/>
                 </a:highlight>
               </a:rPr>
-              <a:t>Couldn’t actually affect stock prices</a:t>
+              <a:t>Couldn’t actually affect stock prices – assumed small enough subset of actors to be able to use historical data</a:t>
             </a:r>
           </a:p>
           <a:p>
@@ -2574,18 +2841,15 @@
               <a:tabLst/>
               <a:defRPr/>
             </a:pPr>
-            <a:r>
-              <a:rPr lang="en-US" dirty="0">
-                <a:solidFill>
-                  <a:srgbClr val="BCBEC4"/>
-                </a:solidFill>
-                <a:effectLst/>
-                <a:highlight>
-                  <a:srgbClr val="1E1F22"/>
-                </a:highlight>
-              </a:rPr>
-              <a:t>Add thesis statement</a:t>
-            </a:r>
+            <a:endParaRPr lang="en-US" dirty="0">
+              <a:solidFill>
+                <a:srgbClr val="BCBEC4"/>
+              </a:solidFill>
+              <a:effectLst/>
+              <a:highlight>
+                <a:srgbClr val="1E1F22"/>
+              </a:highlight>
+            </a:endParaRPr>
           </a:p>
           <a:p>
             <a:pPr marL="171450" marR="0" lvl="0" indent="-171450" algn="l" defTabSz="914400" rtl="0" eaLnBrk="1" fontAlgn="auto" latinLnBrk="0" hangingPunct="1">
@@ -2615,10 +2879,29 @@
                   <a:srgbClr val="1E1F22"/>
                 </a:highlight>
               </a:rPr>
-              <a:t>Address </a:t>
-            </a:r>
-            <a:r>
-              <a:rPr lang="en-US">
+              <a:t>Add thesis statement</a:t>
+            </a:r>
+          </a:p>
+          <a:p>
+            <a:pPr marL="171450" marR="0" lvl="0" indent="-171450" algn="l" defTabSz="914400" rtl="0" eaLnBrk="1" fontAlgn="auto" latinLnBrk="0" hangingPunct="1">
+              <a:lnSpc>
+                <a:spcPct val="100000"/>
+              </a:lnSpc>
+              <a:spcBef>
+                <a:spcPts val="0"/>
+              </a:spcBef>
+              <a:spcAft>
+                <a:spcPts val="0"/>
+              </a:spcAft>
+              <a:buClrTx/>
+              <a:buSzTx/>
+              <a:buFontTx/>
+              <a:buChar char="-"/>
+              <a:tabLst/>
+              <a:defRPr/>
+            </a:pPr>
+            <a:r>
+              <a:rPr lang="en-US" dirty="0">
                 <a:solidFill>
                   <a:srgbClr val="BCBEC4"/>
                 </a:solidFill>
@@ -2627,7 +2910,7 @@
                   <a:srgbClr val="1E1F22"/>
                 </a:highlight>
               </a:rPr>
-              <a:t>the graph</a:t>
+              <a:t>Address the graph</a:t>
             </a:r>
           </a:p>
         </p:txBody>
@@ -2712,7 +2995,10 @@
           <a:bodyPr/>
           <a:lstStyle/>
           <a:p>
-            <a:endParaRPr lang="en-US" dirty="0"/>
+            <a:r>
+              <a:rPr lang="en-US" dirty="0"/>
+              <a:t>Here’s our references for the model</a:t>
+            </a:r>
           </a:p>
         </p:txBody>
       </p:sp>
@@ -2899,7 +3185,7 @@
           <a:p>
             <a:fld id="{3CC2385E-BAC7-3F42-B91F-3AC00928A3BA}" type="datetimeFigureOut">
               <a:rPr lang="en-US" smtClean="0"/>
-              <a:t>4/23/2024</a:t>
+              <a:t>4/24/2024</a:t>
             </a:fld>
             <a:endParaRPr lang="en-US"/>
           </a:p>
@@ -3097,7 +3383,7 @@
           <a:p>
             <a:fld id="{3CC2385E-BAC7-3F42-B91F-3AC00928A3BA}" type="datetimeFigureOut">
               <a:rPr lang="en-US" smtClean="0"/>
-              <a:t>4/23/2024</a:t>
+              <a:t>4/24/2024</a:t>
             </a:fld>
             <a:endParaRPr lang="en-US"/>
           </a:p>
@@ -3305,7 +3591,7 @@
           <a:p>
             <a:fld id="{3CC2385E-BAC7-3F42-B91F-3AC00928A3BA}" type="datetimeFigureOut">
               <a:rPr lang="en-US" smtClean="0"/>
-              <a:t>4/23/2024</a:t>
+              <a:t>4/24/2024</a:t>
             </a:fld>
             <a:endParaRPr lang="en-US"/>
           </a:p>
@@ -3503,7 +3789,7 @@
           <a:p>
             <a:fld id="{3CC2385E-BAC7-3F42-B91F-3AC00928A3BA}" type="datetimeFigureOut">
               <a:rPr lang="en-US" smtClean="0"/>
-              <a:t>4/23/2024</a:t>
+              <a:t>4/24/2024</a:t>
             </a:fld>
             <a:endParaRPr lang="en-US"/>
           </a:p>
@@ -3778,7 +4064,7 @@
           <a:p>
             <a:fld id="{3CC2385E-BAC7-3F42-B91F-3AC00928A3BA}" type="datetimeFigureOut">
               <a:rPr lang="en-US" smtClean="0"/>
-              <a:t>4/23/2024</a:t>
+              <a:t>4/24/2024</a:t>
             </a:fld>
             <a:endParaRPr lang="en-US"/>
           </a:p>
@@ -4043,7 +4329,7 @@
           <a:p>
             <a:fld id="{3CC2385E-BAC7-3F42-B91F-3AC00928A3BA}" type="datetimeFigureOut">
               <a:rPr lang="en-US" smtClean="0"/>
-              <a:t>4/23/2024</a:t>
+              <a:t>4/24/2024</a:t>
             </a:fld>
             <a:endParaRPr lang="en-US"/>
           </a:p>
@@ -4455,7 +4741,7 @@
           <a:p>
             <a:fld id="{3CC2385E-BAC7-3F42-B91F-3AC00928A3BA}" type="datetimeFigureOut">
               <a:rPr lang="en-US" smtClean="0"/>
-              <a:t>4/23/2024</a:t>
+              <a:t>4/24/2024</a:t>
             </a:fld>
             <a:endParaRPr lang="en-US"/>
           </a:p>
@@ -4596,7 +4882,7 @@
           <a:p>
             <a:fld id="{3CC2385E-BAC7-3F42-B91F-3AC00928A3BA}" type="datetimeFigureOut">
               <a:rPr lang="en-US" smtClean="0"/>
-              <a:t>4/23/2024</a:t>
+              <a:t>4/24/2024</a:t>
             </a:fld>
             <a:endParaRPr lang="en-US"/>
           </a:p>
@@ -4709,7 +4995,7 @@
           <a:p>
             <a:fld id="{3CC2385E-BAC7-3F42-B91F-3AC00928A3BA}" type="datetimeFigureOut">
               <a:rPr lang="en-US" smtClean="0"/>
-              <a:t>4/23/2024</a:t>
+              <a:t>4/24/2024</a:t>
             </a:fld>
             <a:endParaRPr lang="en-US"/>
           </a:p>
@@ -5020,7 +5306,7 @@
           <a:p>
             <a:fld id="{3CC2385E-BAC7-3F42-B91F-3AC00928A3BA}" type="datetimeFigureOut">
               <a:rPr lang="en-US" smtClean="0"/>
-              <a:t>4/23/2024</a:t>
+              <a:t>4/24/2024</a:t>
             </a:fld>
             <a:endParaRPr lang="en-US"/>
           </a:p>
@@ -5308,7 +5594,7 @@
           <a:p>
             <a:fld id="{3CC2385E-BAC7-3F42-B91F-3AC00928A3BA}" type="datetimeFigureOut">
               <a:rPr lang="en-US" smtClean="0"/>
-              <a:t>4/23/2024</a:t>
+              <a:t>4/24/2024</a:t>
             </a:fld>
             <a:endParaRPr lang="en-US"/>
           </a:p>
@@ -5549,7 +5835,7 @@
           <a:p>
             <a:fld id="{3CC2385E-BAC7-3F42-B91F-3AC00928A3BA}" type="datetimeFigureOut">
               <a:rPr lang="en-US" smtClean="0"/>
-              <a:t>4/23/2024</a:t>
+              <a:t>4/24/2024</a:t>
             </a:fld>
             <a:endParaRPr lang="en-US"/>
           </a:p>
@@ -7782,7 +8068,7 @@
         </p:blipFill>
         <p:spPr>
           <a:xfrm>
-            <a:off x="116876" y="266135"/>
+            <a:off x="58172" y="75607"/>
             <a:ext cx="5183259" cy="3363517"/>
           </a:xfrm>
         </p:spPr>
@@ -7868,7 +8154,7 @@
         </p:blipFill>
         <p:spPr>
           <a:xfrm>
-            <a:off x="58172" y="3362232"/>
+            <a:off x="0" y="3329362"/>
             <a:ext cx="5281659" cy="3528638"/>
           </a:xfrm>
           <a:prstGeom prst="rect">
@@ -8041,7 +8327,9 @@
           </a:xfrm>
         </p:spPr>
         <p:txBody>
-          <a:bodyPr/>
+          <a:bodyPr>
+            <a:normAutofit fontScale="92500" lnSpcReduction="10000"/>
+          </a:bodyPr>
           <a:lstStyle/>
           <a:p>
             <a:r>
@@ -8066,6 +8354,21 @@
               <a:rPr lang="en-US" dirty="0"/>
               <a:t>Expand risk evaluation for greater stock data</a:t>
             </a:r>
+          </a:p>
+          <a:p>
+            <a:r>
+              <a:rPr lang="en-US" dirty="0"/>
+              <a:t>Explore and define the idea of negative influence</a:t>
+            </a:r>
+          </a:p>
+          <a:p>
+            <a:r>
+              <a:rPr lang="en-US" dirty="0"/>
+              <a:t>Make model more dynamic to actually adjust stock prices</a:t>
+            </a:r>
+          </a:p>
+          <a:p>
+            <a:endParaRPr lang="en-US" dirty="0"/>
           </a:p>
         </p:txBody>
       </p:sp>

</xml_diff>

<commit_message>
Updated Risk in presentation
</commit_message>
<xml_diff>
--- a/Project Status Report Final/finalpresentation.pptx
+++ b/Project Status Report Final/finalpresentation.pptx
@@ -5,7 +5,7 @@
     <p:sldMasterId id="2147483648" r:id="rId1"/>
   </p:sldMasterIdLst>
   <p:notesMasterIdLst>
-    <p:notesMasterId r:id="rId12"/>
+    <p:notesMasterId r:id="rId14"/>
   </p:notesMasterIdLst>
   <p:sldIdLst>
     <p:sldId id="256" r:id="rId2"/>
@@ -13,11 +13,13 @@
     <p:sldId id="260" r:id="rId4"/>
     <p:sldId id="264" r:id="rId5"/>
     <p:sldId id="263" r:id="rId6"/>
-    <p:sldId id="266" r:id="rId7"/>
-    <p:sldId id="267" r:id="rId8"/>
-    <p:sldId id="265" r:id="rId9"/>
-    <p:sldId id="268" r:id="rId10"/>
-    <p:sldId id="269" r:id="rId11"/>
+    <p:sldId id="270" r:id="rId7"/>
+    <p:sldId id="272" r:id="rId8"/>
+    <p:sldId id="266" r:id="rId9"/>
+    <p:sldId id="267" r:id="rId10"/>
+    <p:sldId id="265" r:id="rId11"/>
+    <p:sldId id="268" r:id="rId12"/>
+    <p:sldId id="269" r:id="rId13"/>
   </p:sldIdLst>
   <p:sldSz cx="12192000" cy="6858000"/>
   <p:notesSz cx="6858000" cy="9144000"/>
@@ -122,72 +124,6 @@
     </p:ext>
   </p:extLst>
 </p:presentation>
-</file>
-
-<file path=ppt/revisionInfo.xml><?xml version="1.0" encoding="utf-8"?>
-<p1510:revInfo xmlns:a="http://schemas.openxmlformats.org/drawingml/2006/main" xmlns:r="http://schemas.openxmlformats.org/officeDocument/2006/relationships" xmlns:p1510="http://schemas.microsoft.com/office/powerpoint/2015/10/main">
-  <p1510:revLst>
-    <p1510:client id="{345E61B9-D4F5-4963-A157-FB30947813D7}" v="1" dt="2024-04-23T20:13:43.893"/>
-  </p1510:revLst>
-</p1510:revInfo>
-</file>
-
-<file path=ppt/changesInfos/changesInfo1.xml><?xml version="1.0" encoding="utf-8"?>
-<pc:chgInfo xmlns:a="http://schemas.openxmlformats.org/drawingml/2006/main" xmlns:r="http://schemas.openxmlformats.org/officeDocument/2006/relationships" xmlns:ac="http://schemas.microsoft.com/office/drawing/2013/main/command" xmlns:pc="http://schemas.microsoft.com/office/powerpoint/2013/main/command">
-  <pc:docChgLst>
-    <pc:chgData name="Connor Klein" userId="78d541d9bbd5520c" providerId="LiveId" clId="{345E61B9-D4F5-4963-A157-FB30947813D7}"/>
-    <pc:docChg chg="undo custSel modSld">
-      <pc:chgData name="Connor Klein" userId="78d541d9bbd5520c" providerId="LiveId" clId="{345E61B9-D4F5-4963-A157-FB30947813D7}" dt="2024-04-23T20:13:55.386" v="164" actId="20577"/>
-      <pc:docMkLst>
-        <pc:docMk/>
-      </pc:docMkLst>
-      <pc:sldChg chg="delSp mod">
-        <pc:chgData name="Connor Klein" userId="78d541d9bbd5520c" providerId="LiveId" clId="{345E61B9-D4F5-4963-A157-FB30947813D7}" dt="2024-04-23T19:11:56.237" v="0" actId="478"/>
-        <pc:sldMkLst>
-          <pc:docMk/>
-          <pc:sldMk cId="89127787" sldId="263"/>
-        </pc:sldMkLst>
-        <pc:spChg chg="del">
-          <ac:chgData name="Connor Klein" userId="78d541d9bbd5520c" providerId="LiveId" clId="{345E61B9-D4F5-4963-A157-FB30947813D7}" dt="2024-04-23T19:11:56.237" v="0" actId="478"/>
-          <ac:spMkLst>
-            <pc:docMk/>
-            <pc:sldMk cId="89127787" sldId="263"/>
-            <ac:spMk id="9" creationId="{661EE144-0F6C-2649-B81A-1334F4AFFB37}"/>
-          </ac:spMkLst>
-        </pc:spChg>
-      </pc:sldChg>
-      <pc:sldChg chg="modNotesTx">
-        <pc:chgData name="Connor Klein" userId="78d541d9bbd5520c" providerId="LiveId" clId="{345E61B9-D4F5-4963-A157-FB30947813D7}" dt="2024-04-23T20:13:55.386" v="164" actId="20577"/>
-        <pc:sldMkLst>
-          <pc:docMk/>
-          <pc:sldMk cId="844184953" sldId="265"/>
-        </pc:sldMkLst>
-      </pc:sldChg>
-      <pc:sldChg chg="modSp mod">
-        <pc:chgData name="Connor Klein" userId="78d541d9bbd5520c" providerId="LiveId" clId="{345E61B9-D4F5-4963-A157-FB30947813D7}" dt="2024-04-23T19:58:29.837" v="109" actId="14100"/>
-        <pc:sldMkLst>
-          <pc:docMk/>
-          <pc:sldMk cId="2255651184" sldId="267"/>
-        </pc:sldMkLst>
-        <pc:picChg chg="mod">
-          <ac:chgData name="Connor Klein" userId="78d541d9bbd5520c" providerId="LiveId" clId="{345E61B9-D4F5-4963-A157-FB30947813D7}" dt="2024-04-23T19:58:29.837" v="109" actId="14100"/>
-          <ac:picMkLst>
-            <pc:docMk/>
-            <pc:sldMk cId="2255651184" sldId="267"/>
-            <ac:picMk id="11" creationId="{24830A22-0BF7-6202-4C6C-F229496D065A}"/>
-          </ac:picMkLst>
-        </pc:picChg>
-      </pc:sldChg>
-      <pc:sldChg chg="modNotesTx">
-        <pc:chgData name="Connor Klein" userId="78d541d9bbd5520c" providerId="LiveId" clId="{345E61B9-D4F5-4963-A157-FB30947813D7}" dt="2024-04-23T20:13:20.056" v="133" actId="20577"/>
-        <pc:sldMkLst>
-          <pc:docMk/>
-          <pc:sldMk cId="2482271579" sldId="269"/>
-        </pc:sldMkLst>
-      </pc:sldChg>
-    </pc:docChg>
-  </pc:docChgLst>
-</pc:chgInfo>
 </file>
 
 <file path=ppt/notesMasters/notesMaster1.xml><?xml version="1.0" encoding="utf-8"?>
@@ -687,6 +623,37 @@
               <a:tabLst/>
               <a:defRPr/>
             </a:pPr>
+            <a:r>
+              <a:rPr lang="en-US" dirty="0">
+                <a:solidFill>
+                  <a:srgbClr val="BCBEC4"/>
+                </a:solidFill>
+                <a:effectLst/>
+                <a:highlight>
+                  <a:srgbClr val="1E1F22"/>
+                </a:highlight>
+              </a:rPr>
+              <a:t>1.5 minutes</a:t>
+            </a:r>
+          </a:p>
+          <a:p>
+            <a:pPr marL="0" marR="0" lvl="0" indent="0" algn="l" defTabSz="914400" rtl="0" eaLnBrk="1" fontAlgn="auto" latinLnBrk="0" hangingPunct="1">
+              <a:lnSpc>
+                <a:spcPct val="100000"/>
+              </a:lnSpc>
+              <a:spcBef>
+                <a:spcPts val="0"/>
+              </a:spcBef>
+              <a:spcAft>
+                <a:spcPts val="0"/>
+              </a:spcAft>
+              <a:buClrTx/>
+              <a:buSzTx/>
+              <a:buFontTx/>
+              <a:buNone/>
+              <a:tabLst/>
+              <a:defRPr/>
+            </a:pPr>
             <a:endParaRPr lang="en-US" dirty="0">
               <a:solidFill>
                 <a:srgbClr val="BCBEC4"/>
@@ -697,6 +664,369 @@
               </a:highlight>
             </a:endParaRPr>
           </a:p>
+          <a:p>
+            <a:pPr marL="0" marR="0" lvl="0" indent="0" algn="l" defTabSz="914400" rtl="0" eaLnBrk="1" fontAlgn="auto" latinLnBrk="0" hangingPunct="1">
+              <a:lnSpc>
+                <a:spcPct val="100000"/>
+              </a:lnSpc>
+              <a:spcBef>
+                <a:spcPts val="0"/>
+              </a:spcBef>
+              <a:spcAft>
+                <a:spcPts val="0"/>
+              </a:spcAft>
+              <a:buClrTx/>
+              <a:buSzTx/>
+              <a:buFontTx/>
+              <a:buNone/>
+              <a:tabLst/>
+              <a:defRPr/>
+            </a:pPr>
+            <a:r>
+              <a:rPr lang="en-US" dirty="0">
+                <a:solidFill>
+                  <a:srgbClr val="BCBEC4"/>
+                </a:solidFill>
+                <a:effectLst/>
+                <a:highlight>
+                  <a:srgbClr val="1E1F22"/>
+                </a:highlight>
+              </a:rPr>
+              <a:t>From this simulation, we achieved a better understanding of risk and influence but there were some limitations of our model to be explored later such as:</a:t>
+            </a:r>
+          </a:p>
+          <a:p>
+            <a:pPr marL="0" marR="0" lvl="0" indent="0" algn="l" defTabSz="914400" rtl="0" eaLnBrk="1" fontAlgn="auto" latinLnBrk="0" hangingPunct="1">
+              <a:lnSpc>
+                <a:spcPct val="100000"/>
+              </a:lnSpc>
+              <a:spcBef>
+                <a:spcPts val="0"/>
+              </a:spcBef>
+              <a:spcAft>
+                <a:spcPts val="0"/>
+              </a:spcAft>
+              <a:buClrTx/>
+              <a:buSzTx/>
+              <a:buFontTx/>
+              <a:buNone/>
+              <a:tabLst/>
+              <a:defRPr/>
+            </a:pPr>
+            <a:endParaRPr lang="en-US" dirty="0">
+              <a:solidFill>
+                <a:srgbClr val="BCBEC4"/>
+              </a:solidFill>
+              <a:effectLst/>
+              <a:highlight>
+                <a:srgbClr val="1E1F22"/>
+              </a:highlight>
+            </a:endParaRPr>
+          </a:p>
+          <a:p>
+            <a:pPr marL="0" marR="0" lvl="0" indent="0" algn="l" defTabSz="914400" rtl="0" eaLnBrk="1" fontAlgn="auto" latinLnBrk="0" hangingPunct="1">
+              <a:lnSpc>
+                <a:spcPct val="100000"/>
+              </a:lnSpc>
+              <a:spcBef>
+                <a:spcPts val="0"/>
+              </a:spcBef>
+              <a:spcAft>
+                <a:spcPts val="0"/>
+              </a:spcAft>
+              <a:buClrTx/>
+              <a:buSzTx/>
+              <a:buFontTx/>
+              <a:buNone/>
+              <a:tabLst/>
+              <a:defRPr/>
+            </a:pPr>
+            <a:r>
+              <a:rPr lang="en-US" dirty="0">
+                <a:solidFill>
+                  <a:srgbClr val="BCBEC4"/>
+                </a:solidFill>
+                <a:effectLst/>
+                <a:highlight>
+                  <a:srgbClr val="1E1F22"/>
+                </a:highlight>
+              </a:rPr>
+              <a:t>- Information flow </a:t>
+            </a:r>
+            <a:r>
+              <a:rPr lang="en-US" dirty="0"/>
+              <a:t>mostly accounted for expansion of risk data but needs to be elaborated to better capture the idea of partial information</a:t>
+            </a:r>
+          </a:p>
+          <a:p>
+            <a:pPr marL="171450" marR="0" lvl="0" indent="-171450" algn="l" defTabSz="914400" rtl="0" eaLnBrk="1" fontAlgn="auto" latinLnBrk="0" hangingPunct="1">
+              <a:lnSpc>
+                <a:spcPct val="100000"/>
+              </a:lnSpc>
+              <a:spcBef>
+                <a:spcPts val="0"/>
+              </a:spcBef>
+              <a:spcAft>
+                <a:spcPts val="0"/>
+              </a:spcAft>
+              <a:buClrTx/>
+              <a:buSzTx/>
+              <a:buFontTx/>
+              <a:buChar char="-"/>
+              <a:tabLst/>
+              <a:defRPr/>
+            </a:pPr>
+            <a:r>
+              <a:rPr lang="en-US" dirty="0">
+                <a:solidFill>
+                  <a:srgbClr val="BCBEC4"/>
+                </a:solidFill>
+                <a:effectLst/>
+                <a:highlight>
+                  <a:srgbClr val="1E1F22"/>
+                </a:highlight>
+              </a:rPr>
+              <a:t>Data filtration cuts out stocks in which only partial information is available and stocks were removed from public market for private buyout or bankruptcy limiting types of stocks being considered – need to reference figure if keeping it to say the distribution isn’t entirely clear</a:t>
+            </a:r>
+          </a:p>
+          <a:p>
+            <a:pPr marL="171450" marR="0" lvl="0" indent="-171450" algn="l" defTabSz="914400" rtl="0" eaLnBrk="1" fontAlgn="auto" latinLnBrk="0" hangingPunct="1">
+              <a:lnSpc>
+                <a:spcPct val="100000"/>
+              </a:lnSpc>
+              <a:spcBef>
+                <a:spcPts val="0"/>
+              </a:spcBef>
+              <a:spcAft>
+                <a:spcPts val="0"/>
+              </a:spcAft>
+              <a:buClrTx/>
+              <a:buSzTx/>
+              <a:buFontTx/>
+              <a:buChar char="-"/>
+              <a:tabLst/>
+              <a:defRPr/>
+            </a:pPr>
+            <a:r>
+              <a:rPr lang="en-US" dirty="0">
+                <a:solidFill>
+                  <a:srgbClr val="BCBEC4"/>
+                </a:solidFill>
+                <a:effectLst/>
+                <a:highlight>
+                  <a:srgbClr val="1E1F22"/>
+                </a:highlight>
+              </a:rPr>
+              <a:t>Should expand to more brokers and possible make the connections more dynamic </a:t>
+            </a:r>
+            <a:r>
+              <a:rPr lang="en-US" dirty="0" err="1">
+                <a:solidFill>
+                  <a:srgbClr val="BCBEC4"/>
+                </a:solidFill>
+                <a:effectLst/>
+                <a:highlight>
+                  <a:srgbClr val="1E1F22"/>
+                </a:highlight>
+              </a:rPr>
+              <a:t>ie</a:t>
+            </a:r>
+            <a:r>
+              <a:rPr lang="en-US" dirty="0">
+                <a:solidFill>
+                  <a:srgbClr val="BCBEC4"/>
+                </a:solidFill>
+                <a:effectLst/>
+                <a:highlight>
+                  <a:srgbClr val="1E1F22"/>
+                </a:highlight>
+              </a:rPr>
+              <a:t> follow the best broker instead of being stuck entirely with initial connections</a:t>
+            </a:r>
+          </a:p>
+          <a:p>
+            <a:pPr marL="171450" marR="0" lvl="0" indent="-171450" algn="l" defTabSz="914400" rtl="0" eaLnBrk="1" fontAlgn="auto" latinLnBrk="0" hangingPunct="1">
+              <a:lnSpc>
+                <a:spcPct val="100000"/>
+              </a:lnSpc>
+              <a:spcBef>
+                <a:spcPts val="0"/>
+              </a:spcBef>
+              <a:spcAft>
+                <a:spcPts val="0"/>
+              </a:spcAft>
+              <a:buClrTx/>
+              <a:buSzTx/>
+              <a:buFontTx/>
+              <a:buChar char="-"/>
+              <a:tabLst/>
+              <a:defRPr/>
+            </a:pPr>
+            <a:r>
+              <a:rPr lang="en-US" dirty="0">
+                <a:solidFill>
+                  <a:srgbClr val="BCBEC4"/>
+                </a:solidFill>
+                <a:effectLst/>
+                <a:highlight>
+                  <a:srgbClr val="1E1F22"/>
+                </a:highlight>
+              </a:rPr>
+              <a:t>Could extend stock risk evaluation to better account for more relationships in stock statistics </a:t>
+            </a:r>
+          </a:p>
+          <a:p>
+            <a:pPr marL="171450" marR="0" lvl="0" indent="-171450" algn="l" defTabSz="914400" rtl="0" eaLnBrk="1" fontAlgn="auto" latinLnBrk="0" hangingPunct="1">
+              <a:lnSpc>
+                <a:spcPct val="100000"/>
+              </a:lnSpc>
+              <a:spcBef>
+                <a:spcPts val="0"/>
+              </a:spcBef>
+              <a:spcAft>
+                <a:spcPts val="0"/>
+              </a:spcAft>
+              <a:buClrTx/>
+              <a:buSzTx/>
+              <a:buFontTx/>
+              <a:buChar char="-"/>
+              <a:tabLst/>
+              <a:defRPr/>
+            </a:pPr>
+            <a:r>
+              <a:rPr lang="en-US" dirty="0">
+                <a:solidFill>
+                  <a:srgbClr val="BCBEC4"/>
+                </a:solidFill>
+                <a:effectLst/>
+                <a:highlight>
+                  <a:srgbClr val="1E1F22"/>
+                </a:highlight>
+              </a:rPr>
+              <a:t>Explore idea of negative influence in the market</a:t>
+            </a:r>
+          </a:p>
+          <a:p>
+            <a:pPr marL="171450" marR="0" lvl="0" indent="-171450" algn="l" defTabSz="914400" rtl="0" eaLnBrk="1" fontAlgn="auto" latinLnBrk="0" hangingPunct="1">
+              <a:lnSpc>
+                <a:spcPct val="100000"/>
+              </a:lnSpc>
+              <a:spcBef>
+                <a:spcPts val="0"/>
+              </a:spcBef>
+              <a:spcAft>
+                <a:spcPts val="0"/>
+              </a:spcAft>
+              <a:buClrTx/>
+              <a:buSzTx/>
+              <a:buFontTx/>
+              <a:buChar char="-"/>
+              <a:tabLst/>
+              <a:defRPr/>
+            </a:pPr>
+            <a:r>
+              <a:rPr lang="en-US" dirty="0">
+                <a:solidFill>
+                  <a:srgbClr val="BCBEC4"/>
+                </a:solidFill>
+                <a:effectLst/>
+                <a:highlight>
+                  <a:srgbClr val="1E1F22"/>
+                </a:highlight>
+              </a:rPr>
+              <a:t>Couldn’t actually affect stock prices – assumed small enough subset of actors to be able to use historical data</a:t>
+            </a:r>
+          </a:p>
+          <a:p>
+            <a:pPr marL="171450" marR="0" lvl="0" indent="-171450" algn="l" defTabSz="914400" rtl="0" eaLnBrk="1" fontAlgn="auto" latinLnBrk="0" hangingPunct="1">
+              <a:lnSpc>
+                <a:spcPct val="100000"/>
+              </a:lnSpc>
+              <a:spcBef>
+                <a:spcPts val="0"/>
+              </a:spcBef>
+              <a:spcAft>
+                <a:spcPts val="0"/>
+              </a:spcAft>
+              <a:buClrTx/>
+              <a:buSzTx/>
+              <a:buFontTx/>
+              <a:buChar char="-"/>
+              <a:tabLst/>
+              <a:defRPr/>
+            </a:pPr>
+            <a:endParaRPr lang="en-US" dirty="0">
+              <a:solidFill>
+                <a:srgbClr val="BCBEC4"/>
+              </a:solidFill>
+              <a:effectLst/>
+              <a:highlight>
+                <a:srgbClr val="1E1F22"/>
+              </a:highlight>
+            </a:endParaRPr>
+          </a:p>
+          <a:p>
+            <a:pPr marL="171450" marR="0" lvl="0" indent="-171450" algn="l" defTabSz="914400" rtl="0" eaLnBrk="1" fontAlgn="auto" latinLnBrk="0" hangingPunct="1">
+              <a:lnSpc>
+                <a:spcPct val="100000"/>
+              </a:lnSpc>
+              <a:spcBef>
+                <a:spcPts val="0"/>
+              </a:spcBef>
+              <a:spcAft>
+                <a:spcPts val="0"/>
+              </a:spcAft>
+              <a:buClrTx/>
+              <a:buSzTx/>
+              <a:buFontTx/>
+              <a:buChar char="-"/>
+              <a:tabLst/>
+              <a:defRPr/>
+            </a:pPr>
+            <a:r>
+              <a:rPr lang="en-US" dirty="0">
+                <a:solidFill>
+                  <a:srgbClr val="BCBEC4"/>
+                </a:solidFill>
+                <a:effectLst/>
+                <a:highlight>
+                  <a:srgbClr val="1E1F22"/>
+                </a:highlight>
+              </a:rPr>
+              <a:t>Add thesis statement</a:t>
+            </a:r>
+          </a:p>
+          <a:p>
+            <a:pPr marL="171450" marR="0" lvl="0" indent="-171450" algn="l" defTabSz="914400" rtl="0" eaLnBrk="1" fontAlgn="auto" latinLnBrk="0" hangingPunct="1">
+              <a:lnSpc>
+                <a:spcPct val="100000"/>
+              </a:lnSpc>
+              <a:spcBef>
+                <a:spcPts val="0"/>
+              </a:spcBef>
+              <a:spcAft>
+                <a:spcPts val="0"/>
+              </a:spcAft>
+              <a:buClrTx/>
+              <a:buSzTx/>
+              <a:buFontTx/>
+              <a:buChar char="-"/>
+              <a:tabLst/>
+              <a:defRPr/>
+            </a:pPr>
+            <a:r>
+              <a:rPr lang="en-US" dirty="0">
+                <a:solidFill>
+                  <a:srgbClr val="BCBEC4"/>
+                </a:solidFill>
+                <a:effectLst/>
+                <a:highlight>
+                  <a:srgbClr val="1E1F22"/>
+                </a:highlight>
+              </a:rPr>
+              <a:t>Address the graph</a:t>
+            </a:r>
+          </a:p>
         </p:txBody>
       </p:sp>
       <p:sp>
@@ -717,6 +1047,202 @@
             <a:fld id="{DEE414AA-92EB-4865-A5F7-560118F2768E}" type="slidenum">
               <a:rPr lang="en-US" smtClean="0"/>
               <a:t>10</a:t>
+            </a:fld>
+            <a:endParaRPr lang="en-US"/>
+          </a:p>
+        </p:txBody>
+      </p:sp>
+    </p:spTree>
+    <p:extLst>
+      <p:ext uri="{BB962C8B-B14F-4D97-AF65-F5344CB8AC3E}">
+        <p14:creationId xmlns:p14="http://schemas.microsoft.com/office/powerpoint/2010/main" val="1611523902"/>
+      </p:ext>
+    </p:extLst>
+  </p:cSld>
+  <p:clrMapOvr>
+    <a:masterClrMapping/>
+  </p:clrMapOvr>
+</p:notes>
+</file>
+
+<file path=ppt/notesSlides/notesSlide11.xml><?xml version="1.0" encoding="utf-8"?>
+<p:notes xmlns:a="http://schemas.openxmlformats.org/drawingml/2006/main" xmlns:r="http://schemas.openxmlformats.org/officeDocument/2006/relationships" xmlns:p="http://schemas.openxmlformats.org/presentationml/2006/main">
+  <p:cSld>
+    <p:spTree>
+      <p:nvGrpSpPr>
+        <p:cNvPr id="1" name=""/>
+        <p:cNvGrpSpPr/>
+        <p:nvPr/>
+      </p:nvGrpSpPr>
+      <p:grpSpPr>
+        <a:xfrm>
+          <a:off x="0" y="0"/>
+          <a:ext cx="0" cy="0"/>
+          <a:chOff x="0" y="0"/>
+          <a:chExt cx="0" cy="0"/>
+        </a:xfrm>
+      </p:grpSpPr>
+      <p:sp>
+        <p:nvSpPr>
+          <p:cNvPr id="2" name="Slide Image Placeholder 1"/>
+          <p:cNvSpPr>
+            <a:spLocks noGrp="1" noRot="1" noChangeAspect="1"/>
+          </p:cNvSpPr>
+          <p:nvPr>
+            <p:ph type="sldImg"/>
+          </p:nvPr>
+        </p:nvSpPr>
+        <p:spPr/>
+      </p:sp>
+      <p:sp>
+        <p:nvSpPr>
+          <p:cNvPr id="3" name="Notes Placeholder 2"/>
+          <p:cNvSpPr>
+            <a:spLocks noGrp="1"/>
+          </p:cNvSpPr>
+          <p:nvPr>
+            <p:ph type="body" idx="1"/>
+          </p:nvPr>
+        </p:nvSpPr>
+        <p:spPr/>
+        <p:txBody>
+          <a:bodyPr/>
+          <a:lstStyle/>
+          <a:p>
+            <a:r>
+              <a:rPr lang="en-US" dirty="0"/>
+              <a:t>Here’s our references for the model</a:t>
+            </a:r>
+          </a:p>
+        </p:txBody>
+      </p:sp>
+      <p:sp>
+        <p:nvSpPr>
+          <p:cNvPr id="4" name="Slide Number Placeholder 3"/>
+          <p:cNvSpPr>
+            <a:spLocks noGrp="1"/>
+          </p:cNvSpPr>
+          <p:nvPr>
+            <p:ph type="sldNum" sz="quarter" idx="5"/>
+          </p:nvPr>
+        </p:nvSpPr>
+        <p:spPr/>
+        <p:txBody>
+          <a:bodyPr/>
+          <a:lstStyle/>
+          <a:p>
+            <a:fld id="{DEE414AA-92EB-4865-A5F7-560118F2768E}" type="slidenum">
+              <a:rPr lang="en-US" smtClean="0"/>
+              <a:t>11</a:t>
+            </a:fld>
+            <a:endParaRPr lang="en-US"/>
+          </a:p>
+        </p:txBody>
+      </p:sp>
+    </p:spTree>
+    <p:extLst>
+      <p:ext uri="{BB962C8B-B14F-4D97-AF65-F5344CB8AC3E}">
+        <p14:creationId xmlns:p14="http://schemas.microsoft.com/office/powerpoint/2010/main" val="108912732"/>
+      </p:ext>
+    </p:extLst>
+  </p:cSld>
+  <p:clrMapOvr>
+    <a:masterClrMapping/>
+  </p:clrMapOvr>
+</p:notes>
+</file>
+
+<file path=ppt/notesSlides/notesSlide12.xml><?xml version="1.0" encoding="utf-8"?>
+<p:notes xmlns:a="http://schemas.openxmlformats.org/drawingml/2006/main" xmlns:r="http://schemas.openxmlformats.org/officeDocument/2006/relationships" xmlns:p="http://schemas.openxmlformats.org/presentationml/2006/main">
+  <p:cSld>
+    <p:spTree>
+      <p:nvGrpSpPr>
+        <p:cNvPr id="1" name=""/>
+        <p:cNvGrpSpPr/>
+        <p:nvPr/>
+      </p:nvGrpSpPr>
+      <p:grpSpPr>
+        <a:xfrm>
+          <a:off x="0" y="0"/>
+          <a:ext cx="0" cy="0"/>
+          <a:chOff x="0" y="0"/>
+          <a:chExt cx="0" cy="0"/>
+        </a:xfrm>
+      </p:grpSpPr>
+      <p:sp>
+        <p:nvSpPr>
+          <p:cNvPr id="2" name="Slide Image Placeholder 1"/>
+          <p:cNvSpPr>
+            <a:spLocks noGrp="1" noRot="1" noChangeAspect="1"/>
+          </p:cNvSpPr>
+          <p:nvPr>
+            <p:ph type="sldImg"/>
+          </p:nvPr>
+        </p:nvSpPr>
+        <p:spPr/>
+      </p:sp>
+      <p:sp>
+        <p:nvSpPr>
+          <p:cNvPr id="3" name="Notes Placeholder 2"/>
+          <p:cNvSpPr>
+            <a:spLocks noGrp="1"/>
+          </p:cNvSpPr>
+          <p:nvPr>
+            <p:ph type="body" idx="1"/>
+          </p:nvPr>
+        </p:nvSpPr>
+        <p:spPr/>
+        <p:txBody>
+          <a:bodyPr/>
+          <a:lstStyle/>
+          <a:p>
+            <a:pPr marL="0" marR="0" lvl="0" indent="0" algn="l" defTabSz="914400" rtl="0" eaLnBrk="1" fontAlgn="auto" latinLnBrk="0" hangingPunct="1">
+              <a:lnSpc>
+                <a:spcPct val="100000"/>
+              </a:lnSpc>
+              <a:spcBef>
+                <a:spcPts val="0"/>
+              </a:spcBef>
+              <a:spcAft>
+                <a:spcPts val="0"/>
+              </a:spcAft>
+              <a:buClrTx/>
+              <a:buSzTx/>
+              <a:buFontTx/>
+              <a:buNone/>
+              <a:tabLst/>
+              <a:defRPr/>
+            </a:pPr>
+            <a:endParaRPr lang="en-US" dirty="0">
+              <a:solidFill>
+                <a:srgbClr val="BCBEC4"/>
+              </a:solidFill>
+              <a:effectLst/>
+              <a:highlight>
+                <a:srgbClr val="1E1F22"/>
+              </a:highlight>
+            </a:endParaRPr>
+          </a:p>
+        </p:txBody>
+      </p:sp>
+      <p:sp>
+        <p:nvSpPr>
+          <p:cNvPr id="4" name="Slide Number Placeholder 3"/>
+          <p:cNvSpPr>
+            <a:spLocks noGrp="1"/>
+          </p:cNvSpPr>
+          <p:nvPr>
+            <p:ph type="sldNum" sz="quarter" idx="5"/>
+          </p:nvPr>
+        </p:nvSpPr>
+        <p:spPr/>
+        <p:txBody>
+          <a:bodyPr/>
+          <a:lstStyle/>
+          <a:p>
+            <a:fld id="{DEE414AA-92EB-4865-A5F7-560118F2768E}" type="slidenum">
+              <a:rPr lang="en-US" smtClean="0"/>
+              <a:t>12</a:t>
             </a:fld>
             <a:endParaRPr lang="en-US"/>
           </a:p>
@@ -2224,27 +2750,203 @@
           <a:bodyPr/>
           <a:lstStyle/>
           <a:p>
+            <a:pPr marL="0" marR="0" lvl="0" indent="0" algn="l" defTabSz="914400" rtl="0" eaLnBrk="1" fontAlgn="auto" latinLnBrk="0" hangingPunct="1">
+              <a:lnSpc>
+                <a:spcPct val="100000"/>
+              </a:lnSpc>
+              <a:spcBef>
+                <a:spcPts val="0"/>
+              </a:spcBef>
+              <a:spcAft>
+                <a:spcPts val="0"/>
+              </a:spcAft>
+              <a:buClrTx/>
+              <a:buSzTx/>
+              <a:buFontTx/>
+              <a:buNone/>
+              <a:tabLst/>
+              <a:defRPr/>
+            </a:pPr>
             <a:r>
               <a:rPr lang="en-US" dirty="0"/>
               <a:t>1.5 minutes</a:t>
             </a:r>
           </a:p>
           <a:p>
+            <a:pPr marL="0" marR="0" lvl="0" indent="0" algn="l" defTabSz="914400" rtl="0" eaLnBrk="1" fontAlgn="auto" latinLnBrk="0" hangingPunct="1">
+              <a:lnSpc>
+                <a:spcPct val="100000"/>
+              </a:lnSpc>
+              <a:spcBef>
+                <a:spcPts val="0"/>
+              </a:spcBef>
+              <a:spcAft>
+                <a:spcPts val="0"/>
+              </a:spcAft>
+              <a:buClrTx/>
+              <a:buSzTx/>
+              <a:buFontTx/>
+              <a:buNone/>
+              <a:tabLst/>
+              <a:defRPr/>
+            </a:pPr>
             <a:endParaRPr lang="en-US" dirty="0"/>
           </a:p>
           <a:p>
+            <a:pPr marL="0" marR="0" lvl="0" indent="0" algn="l" defTabSz="914400" rtl="0" eaLnBrk="1" fontAlgn="auto" latinLnBrk="0" hangingPunct="1">
+              <a:lnSpc>
+                <a:spcPct val="100000"/>
+              </a:lnSpc>
+              <a:spcBef>
+                <a:spcPts val="0"/>
+              </a:spcBef>
+              <a:spcAft>
+                <a:spcPts val="0"/>
+              </a:spcAft>
+              <a:buClrTx/>
+              <a:buSzTx/>
+              <a:buFontTx/>
+              <a:buNone/>
+              <a:tabLst/>
+              <a:defRPr/>
+            </a:pPr>
             <a:r>
               <a:rPr lang="en-US" dirty="0"/>
-              <a:t>Left figure show interim portfolio values before the 2007-2008 financial crisis</a:t>
-            </a:r>
-          </a:p>
-          <a:p>
+              <a:t>NOTES FROM MINAI’S COMMENTS:</a:t>
+            </a:r>
+          </a:p>
+          <a:p>
+            <a:pPr marL="0" marR="0" lvl="0" indent="0" algn="l" defTabSz="914400" rtl="0" eaLnBrk="1" fontAlgn="auto" latinLnBrk="0" hangingPunct="1">
+              <a:lnSpc>
+                <a:spcPct val="100000"/>
+              </a:lnSpc>
+              <a:spcBef>
+                <a:spcPts val="0"/>
+              </a:spcBef>
+              <a:spcAft>
+                <a:spcPts val="0"/>
+              </a:spcAft>
+              <a:buClrTx/>
+              <a:buSzTx/>
+              <a:buFontTx/>
+              <a:buNone/>
+              <a:tabLst/>
+              <a:defRPr/>
+            </a:pPr>
+            <a:r>
+              <a:rPr lang="en-US" dirty="0"/>
+              <a:t>- don’t say stop investing, say stop buying stocks </a:t>
+            </a:r>
+          </a:p>
+          <a:p>
+            <a:pPr marL="0" marR="0" lvl="0" indent="0" algn="l" defTabSz="914400" rtl="0" eaLnBrk="1" fontAlgn="auto" latinLnBrk="0" hangingPunct="1">
+              <a:lnSpc>
+                <a:spcPct val="100000"/>
+              </a:lnSpc>
+              <a:spcBef>
+                <a:spcPts val="0"/>
+              </a:spcBef>
+              <a:spcAft>
+                <a:spcPts val="0"/>
+              </a:spcAft>
+              <a:buClrTx/>
+              <a:buSzTx/>
+              <a:buFontTx/>
+              <a:buNone/>
+              <a:tabLst/>
+              <a:defRPr/>
+            </a:pPr>
             <a:endParaRPr lang="en-US" dirty="0"/>
           </a:p>
           <a:p>
-            <a:pPr marL="171450" indent="-171450">
+            <a:pPr marL="0" marR="0" lvl="0" indent="0" algn="l" defTabSz="914400" rtl="0" eaLnBrk="1" fontAlgn="auto" latinLnBrk="0" hangingPunct="1">
+              <a:lnSpc>
+                <a:spcPct val="100000"/>
+              </a:lnSpc>
+              <a:spcBef>
+                <a:spcPts val="0"/>
+              </a:spcBef>
+              <a:spcAft>
+                <a:spcPts val="0"/>
+              </a:spcAft>
+              <a:buClrTx/>
+              <a:buSzTx/>
+              <a:buFontTx/>
+              <a:buNone/>
+              <a:tabLst/>
+              <a:defRPr/>
+            </a:pPr>
+            <a:r>
+              <a:rPr lang="en-US" dirty="0"/>
+              <a:t>Example of portfolio behavior over time</a:t>
+            </a:r>
+          </a:p>
+          <a:p>
+            <a:endParaRPr lang="en-US" dirty="0"/>
+          </a:p>
+          <a:p>
+            <a:pPr marL="171450" marR="0" lvl="0" indent="-171450" algn="l" defTabSz="914400" rtl="0" eaLnBrk="1" fontAlgn="auto" latinLnBrk="0" hangingPunct="1">
+              <a:lnSpc>
+                <a:spcPct val="100000"/>
+              </a:lnSpc>
+              <a:spcBef>
+                <a:spcPts val="0"/>
+              </a:spcBef>
+              <a:spcAft>
+                <a:spcPts val="0"/>
+              </a:spcAft>
+              <a:buClrTx/>
+              <a:buSzTx/>
               <a:buFontTx/>
               <a:buChar char="-"/>
+              <a:tabLst/>
+              <a:defRPr/>
+            </a:pPr>
+            <a:r>
+              <a:rPr lang="en-US" dirty="0"/>
+              <a:t>Brokers follow the general market trends and grow over time.</a:t>
+            </a:r>
+          </a:p>
+          <a:p>
+            <a:pPr marL="171450" marR="0" lvl="0" indent="-171450" algn="l" defTabSz="914400" rtl="0" eaLnBrk="1" fontAlgn="auto" latinLnBrk="0" hangingPunct="1">
+              <a:lnSpc>
+                <a:spcPct val="100000"/>
+              </a:lnSpc>
+              <a:spcBef>
+                <a:spcPts val="0"/>
+              </a:spcBef>
+              <a:spcAft>
+                <a:spcPts val="0"/>
+              </a:spcAft>
+              <a:buClrTx/>
+              <a:buSzTx/>
+              <a:buFontTx/>
+              <a:buChar char="-"/>
+              <a:tabLst/>
+              <a:defRPr/>
+            </a:pPr>
+            <a:r>
+              <a:rPr lang="en-US" dirty="0"/>
+              <a:t>Can see significant loss at 2007-2008, and spike in risk evaluations with plunging and rising market</a:t>
+            </a:r>
+          </a:p>
+          <a:p>
+            <a:pPr marL="171450" marR="0" lvl="0" indent="-171450" algn="l" defTabSz="914400" rtl="0" eaLnBrk="1" fontAlgn="auto" latinLnBrk="0" hangingPunct="1">
+              <a:lnSpc>
+                <a:spcPct val="100000"/>
+              </a:lnSpc>
+              <a:spcBef>
+                <a:spcPts val="0"/>
+              </a:spcBef>
+              <a:spcAft>
+                <a:spcPts val="0"/>
+              </a:spcAft>
+              <a:buClrTx/>
+              <a:buSzTx/>
+              <a:buFontTx/>
+              <a:buChar char="-"/>
+              <a:tabLst/>
+              <a:defRPr/>
             </a:pPr>
             <a:r>
               <a:rPr lang="en-US" dirty="0"/>
@@ -2252,49 +2954,114 @@
             </a:r>
           </a:p>
           <a:p>
-            <a:pPr marL="171450" indent="-171450">
+            <a:pPr marL="171450" marR="0" lvl="0" indent="-171450" algn="l" defTabSz="914400" rtl="0" eaLnBrk="1" fontAlgn="auto" latinLnBrk="0" hangingPunct="1">
+              <a:lnSpc>
+                <a:spcPct val="100000"/>
+              </a:lnSpc>
+              <a:spcBef>
+                <a:spcPts val="0"/>
+              </a:spcBef>
+              <a:spcAft>
+                <a:spcPts val="0"/>
+              </a:spcAft>
+              <a:buClrTx/>
+              <a:buSzTx/>
               <a:buFontTx/>
               <a:buChar char="-"/>
+              <a:tabLst/>
+              <a:defRPr/>
             </a:pPr>
             <a:r>
               <a:rPr lang="en-US" dirty="0"/>
-              <a:t>The high risk brokers can be seen to rebound more quickly and exceed their peers of medium risk in some cases.</a:t>
-            </a:r>
-          </a:p>
-          <a:p>
-            <a:pPr marL="171450" indent="-171450">
+              <a:t>By 2010, the typical brokers regained the wealth that they had acquired before 2008.</a:t>
+            </a:r>
+          </a:p>
+          <a:p>
+            <a:pPr marL="171450" marR="0" lvl="0" indent="-171450" algn="l" defTabSz="914400" rtl="0" eaLnBrk="1" fontAlgn="auto" latinLnBrk="0" hangingPunct="1">
+              <a:lnSpc>
+                <a:spcPct val="100000"/>
+              </a:lnSpc>
+              <a:spcBef>
+                <a:spcPts val="0"/>
+              </a:spcBef>
+              <a:spcAft>
+                <a:spcPts val="0"/>
+              </a:spcAft>
+              <a:buClrTx/>
+              <a:buSzTx/>
               <a:buFontTx/>
               <a:buChar char="-"/>
+              <a:tabLst/>
+              <a:defRPr/>
             </a:pPr>
             <a:r>
               <a:rPr lang="en-US" dirty="0"/>
-              <a:t>Final values shows slightly different behavior; at event, risky brokers could make the most money but didn’t necessarily win over the large period of normal operation </a:t>
-            </a:r>
-          </a:p>
-          <a:p>
-            <a:pPr marL="171450" indent="-171450">
+              <a:t>The high risk brokers can be seen to rebound more quickly and exceed their peers of medium risk in some cases. (see example of broker 80, broker 2, broker 20, broker 15</a:t>
+            </a:r>
+          </a:p>
+          <a:p>
+            <a:pPr marL="171450" marR="0" lvl="0" indent="-171450" algn="l" defTabSz="914400" rtl="0" eaLnBrk="1" fontAlgn="auto" latinLnBrk="0" hangingPunct="1">
+              <a:lnSpc>
+                <a:spcPct val="100000"/>
+              </a:lnSpc>
+              <a:spcBef>
+                <a:spcPts val="0"/>
+              </a:spcBef>
+              <a:spcAft>
+                <a:spcPts val="0"/>
+              </a:spcAft>
+              <a:buClrTx/>
+              <a:buSzTx/>
               <a:buFontTx/>
               <a:buChar char="-"/>
+              <a:tabLst/>
+              <a:defRPr/>
             </a:pPr>
             <a:r>
               <a:rPr lang="en-US" dirty="0"/>
-              <a:t>by not exiting when their portfolios spiked, did not achieve the same levels of wealth as the more moderate brokers after the Black Swan event. </a:t>
-            </a:r>
-          </a:p>
-          <a:p>
-            <a:pPr marL="171450" indent="-171450">
+              <a:t>Further, it showed buying at the crash showed significant increase in portfolio value for brokers seeking medium and high levels of risk.</a:t>
+            </a:r>
+          </a:p>
+          <a:p>
+            <a:pPr marL="171450" marR="0" lvl="0" indent="-171450" algn="l" defTabSz="914400" rtl="0" eaLnBrk="1" fontAlgn="auto" latinLnBrk="0" hangingPunct="1">
+              <a:lnSpc>
+                <a:spcPct val="100000"/>
+              </a:lnSpc>
+              <a:spcBef>
+                <a:spcPts val="0"/>
+              </a:spcBef>
+              <a:spcAft>
+                <a:spcPts val="0"/>
+              </a:spcAft>
+              <a:buClrTx/>
+              <a:buSzTx/>
               <a:buFontTx/>
               <a:buChar char="-"/>
+              <a:tabLst/>
+              <a:defRPr/>
             </a:pPr>
             <a:r>
               <a:rPr lang="en-US" dirty="0"/>
-              <a:t>At the end, with our method of risk formulation, moderate risk brokers won overall</a:t>
-            </a:r>
-          </a:p>
-          <a:p>
-            <a:pPr marL="171450" indent="-171450">
+              <a:t>Note also stopping at fixed risk once the preferred risk level is reached and keeping portfolio does similarly to buying and selling to keep the risk</a:t>
+            </a:r>
+          </a:p>
+          <a:p>
+            <a:pPr marL="171450" marR="0" lvl="0" indent="-171450" algn="l" defTabSz="914400" rtl="0" eaLnBrk="1" fontAlgn="auto" latinLnBrk="0" hangingPunct="1">
+              <a:lnSpc>
+                <a:spcPct val="100000"/>
+              </a:lnSpc>
+              <a:spcBef>
+                <a:spcPts val="0"/>
+              </a:spcBef>
+              <a:spcAft>
+                <a:spcPts val="0"/>
+              </a:spcAft>
+              <a:buClrTx/>
+              <a:buSzTx/>
               <a:buFontTx/>
               <a:buChar char="-"/>
+              <a:tabLst/>
+              <a:defRPr/>
             </a:pPr>
             <a:endParaRPr lang="en-US" dirty="0"/>
           </a:p>
@@ -2326,7 +3093,7 @@
     </p:spTree>
     <p:extLst>
       <p:ext uri="{BB962C8B-B14F-4D97-AF65-F5344CB8AC3E}">
-        <p14:creationId xmlns:p14="http://schemas.microsoft.com/office/powerpoint/2010/main" val="2683265447"/>
+        <p14:creationId xmlns:p14="http://schemas.microsoft.com/office/powerpoint/2010/main" val="3022597172"/>
       </p:ext>
     </p:extLst>
   </p:cSld>
@@ -2380,70 +3147,320 @@
           <a:bodyPr/>
           <a:lstStyle/>
           <a:p>
+            <a:pPr marL="0" marR="0" lvl="0" indent="0" algn="l" defTabSz="914400" rtl="0" eaLnBrk="1" fontAlgn="auto" latinLnBrk="0" hangingPunct="1">
+              <a:lnSpc>
+                <a:spcPct val="100000"/>
+              </a:lnSpc>
+              <a:spcBef>
+                <a:spcPts val="0"/>
+              </a:spcBef>
+              <a:spcAft>
+                <a:spcPts val="0"/>
+              </a:spcAft>
+              <a:buClrTx/>
+              <a:buSzTx/>
+              <a:buFontTx/>
+              <a:buNone/>
+              <a:tabLst/>
+              <a:defRPr/>
+            </a:pPr>
             <a:r>
               <a:rPr lang="en-US" dirty="0"/>
-              <a:t>1.5 minute</a:t>
-            </a:r>
-          </a:p>
-          <a:p>
+              <a:t>1.5 minutes</a:t>
+            </a:r>
+          </a:p>
+          <a:p>
+            <a:pPr marL="0" marR="0" lvl="0" indent="0" algn="l" defTabSz="914400" rtl="0" eaLnBrk="1" fontAlgn="auto" latinLnBrk="0" hangingPunct="1">
+              <a:lnSpc>
+                <a:spcPct val="100000"/>
+              </a:lnSpc>
+              <a:spcBef>
+                <a:spcPts val="0"/>
+              </a:spcBef>
+              <a:spcAft>
+                <a:spcPts val="0"/>
+              </a:spcAft>
+              <a:buClrTx/>
+              <a:buSzTx/>
+              <a:buFontTx/>
+              <a:buNone/>
+              <a:tabLst/>
+              <a:defRPr/>
+            </a:pPr>
             <a:endParaRPr lang="en-US" dirty="0"/>
           </a:p>
           <a:p>
+            <a:pPr marL="0" marR="0" lvl="0" indent="0" algn="l" defTabSz="914400" rtl="0" eaLnBrk="1" fontAlgn="auto" latinLnBrk="0" hangingPunct="1">
+              <a:lnSpc>
+                <a:spcPct val="100000"/>
+              </a:lnSpc>
+              <a:spcBef>
+                <a:spcPts val="0"/>
+              </a:spcBef>
+              <a:spcAft>
+                <a:spcPts val="0"/>
+              </a:spcAft>
+              <a:buClrTx/>
+              <a:buSzTx/>
+              <a:buFontTx/>
+              <a:buNone/>
+              <a:tabLst/>
+              <a:defRPr/>
+            </a:pPr>
             <a:r>
               <a:rPr lang="en-US" dirty="0"/>
-              <a:t>Left side shows a couple of total influence to final portfolio value</a:t>
-            </a:r>
-          </a:p>
-          <a:p>
+              <a:t>NOTES FROM MINAI’S COMMENTS:</a:t>
+            </a:r>
+          </a:p>
+          <a:p>
+            <a:pPr marL="0" marR="0" lvl="0" indent="0" algn="l" defTabSz="914400" rtl="0" eaLnBrk="1" fontAlgn="auto" latinLnBrk="0" hangingPunct="1">
+              <a:lnSpc>
+                <a:spcPct val="100000"/>
+              </a:lnSpc>
+              <a:spcBef>
+                <a:spcPts val="0"/>
+              </a:spcBef>
+              <a:spcAft>
+                <a:spcPts val="0"/>
+              </a:spcAft>
+              <a:buClrTx/>
+              <a:buSzTx/>
+              <a:buFontTx/>
+              <a:buNone/>
+              <a:tabLst/>
+              <a:defRPr/>
+            </a:pPr>
             <a:r>
               <a:rPr lang="en-US" dirty="0"/>
-              <a:t>Top left looked at having a negative influence but this didn’t exactly make sense with perceived risk calculation, further eval necessary</a:t>
-            </a:r>
-          </a:p>
-          <a:p>
+              <a:t>- don’t say stop investing, say stop buying stocks </a:t>
+            </a:r>
+          </a:p>
+          <a:p>
+            <a:pPr marL="0" marR="0" lvl="0" indent="0" algn="l" defTabSz="914400" rtl="0" eaLnBrk="1" fontAlgn="auto" latinLnBrk="0" hangingPunct="1">
+              <a:lnSpc>
+                <a:spcPct val="100000"/>
+              </a:lnSpc>
+              <a:spcBef>
+                <a:spcPts val="0"/>
+              </a:spcBef>
+              <a:spcAft>
+                <a:spcPts val="0"/>
+              </a:spcAft>
+              <a:buClrTx/>
+              <a:buSzTx/>
+              <a:buFontTx/>
+              <a:buNone/>
+              <a:tabLst/>
+              <a:defRPr/>
+            </a:pPr>
             <a:endParaRPr lang="en-US" dirty="0"/>
           </a:p>
           <a:p>
+            <a:pPr marL="0" marR="0" lvl="0" indent="0" algn="l" defTabSz="914400" rtl="0" eaLnBrk="1" fontAlgn="auto" latinLnBrk="0" hangingPunct="1">
+              <a:lnSpc>
+                <a:spcPct val="100000"/>
+              </a:lnSpc>
+              <a:spcBef>
+                <a:spcPts val="0"/>
+              </a:spcBef>
+              <a:spcAft>
+                <a:spcPts val="0"/>
+              </a:spcAft>
+              <a:buClrTx/>
+              <a:buSzTx/>
+              <a:buFontTx/>
+              <a:buNone/>
+              <a:tabLst/>
+              <a:defRPr/>
+            </a:pPr>
             <a:r>
               <a:rPr lang="en-US" dirty="0"/>
-              <a:t>Even with the limitation of influence from 0 to 1, up to 50% of assessment provided by neighbor seemed to give increasing benefit</a:t>
+              <a:t>Example of portfolio behavior over time</a:t>
             </a:r>
           </a:p>
           <a:p>
             <a:endParaRPr lang="en-US" dirty="0"/>
           </a:p>
           <a:p>
+            <a:pPr marL="171450" marR="0" lvl="0" indent="-171450" algn="l" defTabSz="914400" rtl="0" eaLnBrk="1" fontAlgn="auto" latinLnBrk="0" hangingPunct="1">
+              <a:lnSpc>
+                <a:spcPct val="100000"/>
+              </a:lnSpc>
+              <a:spcBef>
+                <a:spcPts val="0"/>
+              </a:spcBef>
+              <a:spcAft>
+                <a:spcPts val="0"/>
+              </a:spcAft>
+              <a:buClrTx/>
+              <a:buSzTx/>
+              <a:buFontTx/>
+              <a:buChar char="-"/>
+              <a:tabLst/>
+              <a:defRPr/>
+            </a:pPr>
             <a:r>
               <a:rPr lang="en-US" dirty="0"/>
-              <a:t>On right, see time series, high risk had more money as noted but influence still benefits across different levels</a:t>
-            </a:r>
-          </a:p>
-          <a:p>
+              <a:t>Brokers follow the general market trends and grow over time.</a:t>
+            </a:r>
+          </a:p>
+          <a:p>
+            <a:pPr marL="171450" marR="0" lvl="0" indent="-171450" algn="l" defTabSz="914400" rtl="0" eaLnBrk="1" fontAlgn="auto" latinLnBrk="0" hangingPunct="1">
+              <a:lnSpc>
+                <a:spcPct val="100000"/>
+              </a:lnSpc>
+              <a:spcBef>
+                <a:spcPts val="0"/>
+              </a:spcBef>
+              <a:spcAft>
+                <a:spcPts val="0"/>
+              </a:spcAft>
+              <a:buClrTx/>
+              <a:buSzTx/>
+              <a:buFontTx/>
+              <a:buChar char="-"/>
+              <a:tabLst/>
+              <a:defRPr/>
+            </a:pPr>
             <a:r>
               <a:rPr lang="en-US" dirty="0"/>
-              <a:t>When assigning a 1/3 of brokers low, 1/3 med, 1/3 high and just adjusting influence, see a couple examples</a:t>
-            </a:r>
-          </a:p>
-          <a:p>
+              <a:t>Can see significant loss at 2007-2008, and spike in risk evaluations with plunging and rising market</a:t>
+            </a:r>
+          </a:p>
+          <a:p>
+            <a:pPr marL="171450" marR="0" lvl="0" indent="-171450" algn="l" defTabSz="914400" rtl="0" eaLnBrk="1" fontAlgn="auto" latinLnBrk="0" hangingPunct="1">
+              <a:lnSpc>
+                <a:spcPct val="100000"/>
+              </a:lnSpc>
+              <a:spcBef>
+                <a:spcPts val="0"/>
+              </a:spcBef>
+              <a:spcAft>
+                <a:spcPts val="0"/>
+              </a:spcAft>
+              <a:buClrTx/>
+              <a:buSzTx/>
+              <a:buFontTx/>
+              <a:buChar char="-"/>
+              <a:tabLst/>
+              <a:defRPr/>
+            </a:pPr>
             <a:r>
               <a:rPr lang="en-US" dirty="0"/>
-              <a:t>Red and green in high risk do better than blue who took less input</a:t>
-            </a:r>
-          </a:p>
-          <a:p>
+              <a:t>the brokers, who did not cash out when the stocks crashed, rebounded after the crisis</a:t>
+            </a:r>
+          </a:p>
+          <a:p>
+            <a:pPr marL="171450" marR="0" lvl="0" indent="-171450" algn="l" defTabSz="914400" rtl="0" eaLnBrk="1" fontAlgn="auto" latinLnBrk="0" hangingPunct="1">
+              <a:lnSpc>
+                <a:spcPct val="100000"/>
+              </a:lnSpc>
+              <a:spcBef>
+                <a:spcPts val="0"/>
+              </a:spcBef>
+              <a:spcAft>
+                <a:spcPts val="0"/>
+              </a:spcAft>
+              <a:buClrTx/>
+              <a:buSzTx/>
+              <a:buFontTx/>
+              <a:buChar char="-"/>
+              <a:tabLst/>
+              <a:defRPr/>
+            </a:pPr>
             <a:r>
               <a:rPr lang="en-US" dirty="0"/>
-              <a:t>Dark blue and orange doing much more poorly than mustard in </a:t>
-            </a:r>
-          </a:p>
-          <a:p>
+              <a:t>By 2010, the typical brokers regained the wealth that they had acquired before 2008.</a:t>
+            </a:r>
+          </a:p>
+          <a:p>
+            <a:pPr marL="171450" marR="0" lvl="0" indent="-171450" algn="l" defTabSz="914400" rtl="0" eaLnBrk="1" fontAlgn="auto" latinLnBrk="0" hangingPunct="1">
+              <a:lnSpc>
+                <a:spcPct val="100000"/>
+              </a:lnSpc>
+              <a:spcBef>
+                <a:spcPts val="0"/>
+              </a:spcBef>
+              <a:spcAft>
+                <a:spcPts val="0"/>
+              </a:spcAft>
+              <a:buClrTx/>
+              <a:buSzTx/>
+              <a:buFontTx/>
+              <a:buChar char="-"/>
+              <a:tabLst/>
+              <a:defRPr/>
+            </a:pPr>
+            <a:r>
+              <a:rPr lang="en-US" dirty="0"/>
+              <a:t>The high risk brokers can be seen to rebound more quickly and exceed their peers of medium risk in some cases. (see example of broker 80, broker 2, broker 20, broker 15</a:t>
+            </a:r>
+          </a:p>
+          <a:p>
+            <a:pPr marL="171450" marR="0" lvl="0" indent="-171450" algn="l" defTabSz="914400" rtl="0" eaLnBrk="1" fontAlgn="auto" latinLnBrk="0" hangingPunct="1">
+              <a:lnSpc>
+                <a:spcPct val="100000"/>
+              </a:lnSpc>
+              <a:spcBef>
+                <a:spcPts val="0"/>
+              </a:spcBef>
+              <a:spcAft>
+                <a:spcPts val="0"/>
+              </a:spcAft>
+              <a:buClrTx/>
+              <a:buSzTx/>
+              <a:buFontTx/>
+              <a:buChar char="-"/>
+              <a:tabLst/>
+              <a:defRPr/>
+            </a:pPr>
+            <a:r>
+              <a:rPr lang="en-US" dirty="0"/>
+              <a:t>Further, it showed buying at the crash showed significant increase in portfolio value for brokers seeking medium and high levels of risk.</a:t>
+            </a:r>
+          </a:p>
+          <a:p>
+            <a:pPr marL="171450" marR="0" lvl="0" indent="-171450" algn="l" defTabSz="914400" rtl="0" eaLnBrk="1" fontAlgn="auto" latinLnBrk="0" hangingPunct="1">
+              <a:lnSpc>
+                <a:spcPct val="100000"/>
+              </a:lnSpc>
+              <a:spcBef>
+                <a:spcPts val="0"/>
+              </a:spcBef>
+              <a:spcAft>
+                <a:spcPts val="0"/>
+              </a:spcAft>
+              <a:buClrTx/>
+              <a:buSzTx/>
+              <a:buFontTx/>
+              <a:buChar char="-"/>
+              <a:tabLst/>
+              <a:defRPr/>
+            </a:pPr>
+            <a:r>
+              <a:rPr lang="en-US" dirty="0"/>
+              <a:t>Note also stopping at fixed risk once the preferred risk level is reached and keeping portfolio does similarly to buying and selling to keep the risk</a:t>
+            </a:r>
+          </a:p>
+          <a:p>
+            <a:pPr marL="171450" marR="0" lvl="0" indent="-171450" algn="l" defTabSz="914400" rtl="0" eaLnBrk="1" fontAlgn="auto" latinLnBrk="0" hangingPunct="1">
+              <a:lnSpc>
+                <a:spcPct val="100000"/>
+              </a:lnSpc>
+              <a:spcBef>
+                <a:spcPts val="0"/>
+              </a:spcBef>
+              <a:spcAft>
+                <a:spcPts val="0"/>
+              </a:spcAft>
+              <a:buClrTx/>
+              <a:buSzTx/>
+              <a:buFontTx/>
+              <a:buChar char="-"/>
+              <a:tabLst/>
+              <a:defRPr/>
+            </a:pPr>
             <a:endParaRPr lang="en-US" dirty="0"/>
-          </a:p>
-          <a:p>
-            <a:r>
-              <a:rPr lang="en-US" dirty="0"/>
-              <a:t>Basing the influence connections of the network around the risk assessment provides an expansion on a single broker's understanding of the stocks behavior to see higher ratio of good stocks but did not entirely capture the additional benefit of accessing partial information as desired.</a:t>
-            </a:r>
           </a:p>
         </p:txBody>
       </p:sp>
@@ -2473,7 +3490,7 @@
     </p:spTree>
     <p:extLst>
       <p:ext uri="{BB962C8B-B14F-4D97-AF65-F5344CB8AC3E}">
-        <p14:creationId xmlns:p14="http://schemas.microsoft.com/office/powerpoint/2010/main" val="3939197585"/>
+        <p14:creationId xmlns:p14="http://schemas.microsoft.com/office/powerpoint/2010/main" val="2779437902"/>
       </p:ext>
     </p:extLst>
   </p:cSld>
@@ -2527,426 +3544,79 @@
           <a:bodyPr/>
           <a:lstStyle/>
           <a:p>
-            <a:pPr marL="0" marR="0" lvl="0" indent="0" algn="l" defTabSz="914400" rtl="0" eaLnBrk="1" fontAlgn="auto" latinLnBrk="0" hangingPunct="1">
-              <a:lnSpc>
-                <a:spcPct val="100000"/>
-              </a:lnSpc>
-              <a:spcBef>
-                <a:spcPts val="0"/>
-              </a:spcBef>
-              <a:spcAft>
-                <a:spcPts val="0"/>
-              </a:spcAft>
-              <a:buClrTx/>
-              <a:buSzTx/>
-              <a:buFontTx/>
-              <a:buNone/>
-              <a:tabLst/>
-              <a:defRPr/>
-            </a:pPr>
-            <a:r>
-              <a:rPr lang="en-US" dirty="0">
-                <a:solidFill>
-                  <a:srgbClr val="BCBEC4"/>
-                </a:solidFill>
-                <a:effectLst/>
-                <a:highlight>
-                  <a:srgbClr val="1E1F22"/>
-                </a:highlight>
-              </a:rPr>
+            <a:r>
+              <a:rPr lang="en-US" dirty="0"/>
               <a:t>1.5 minutes</a:t>
             </a:r>
           </a:p>
           <a:p>
-            <a:pPr marL="0" marR="0" lvl="0" indent="0" algn="l" defTabSz="914400" rtl="0" eaLnBrk="1" fontAlgn="auto" latinLnBrk="0" hangingPunct="1">
-              <a:lnSpc>
-                <a:spcPct val="100000"/>
-              </a:lnSpc>
-              <a:spcBef>
-                <a:spcPts val="0"/>
-              </a:spcBef>
-              <a:spcAft>
-                <a:spcPts val="0"/>
-              </a:spcAft>
-              <a:buClrTx/>
-              <a:buSzTx/>
-              <a:buFontTx/>
-              <a:buNone/>
-              <a:tabLst/>
-              <a:defRPr/>
-            </a:pPr>
-            <a:endParaRPr lang="en-US" dirty="0">
-              <a:solidFill>
-                <a:srgbClr val="BCBEC4"/>
-              </a:solidFill>
-              <a:effectLst/>
-              <a:highlight>
-                <a:srgbClr val="1E1F22"/>
-              </a:highlight>
-            </a:endParaRPr>
-          </a:p>
-          <a:p>
-            <a:pPr marL="0" marR="0" lvl="0" indent="0" algn="l" defTabSz="914400" rtl="0" eaLnBrk="1" fontAlgn="auto" latinLnBrk="0" hangingPunct="1">
-              <a:lnSpc>
-                <a:spcPct val="100000"/>
-              </a:lnSpc>
-              <a:spcBef>
-                <a:spcPts val="0"/>
-              </a:spcBef>
-              <a:spcAft>
-                <a:spcPts val="0"/>
-              </a:spcAft>
-              <a:buClrTx/>
-              <a:buSzTx/>
-              <a:buFontTx/>
-              <a:buNone/>
-              <a:tabLst/>
-              <a:defRPr/>
-            </a:pPr>
-            <a:r>
-              <a:rPr lang="en-US" dirty="0">
-                <a:solidFill>
-                  <a:srgbClr val="BCBEC4"/>
-                </a:solidFill>
-                <a:effectLst/>
-                <a:highlight>
-                  <a:srgbClr val="1E1F22"/>
-                </a:highlight>
-              </a:rPr>
-              <a:t>From this simulation, we achieved a better understanding of risk and influence but there were some limitations of our model to be explored later such as:</a:t>
-            </a:r>
-          </a:p>
-          <a:p>
-            <a:pPr marL="0" marR="0" lvl="0" indent="0" algn="l" defTabSz="914400" rtl="0" eaLnBrk="1" fontAlgn="auto" latinLnBrk="0" hangingPunct="1">
-              <a:lnSpc>
-                <a:spcPct val="100000"/>
-              </a:lnSpc>
-              <a:spcBef>
-                <a:spcPts val="0"/>
-              </a:spcBef>
-              <a:spcAft>
-                <a:spcPts val="0"/>
-              </a:spcAft>
-              <a:buClrTx/>
-              <a:buSzTx/>
-              <a:buFontTx/>
-              <a:buNone/>
-              <a:tabLst/>
-              <a:defRPr/>
-            </a:pPr>
-            <a:endParaRPr lang="en-US" dirty="0">
-              <a:solidFill>
-                <a:srgbClr val="BCBEC4"/>
-              </a:solidFill>
-              <a:effectLst/>
-              <a:highlight>
-                <a:srgbClr val="1E1F22"/>
-              </a:highlight>
-            </a:endParaRPr>
-          </a:p>
-          <a:p>
-            <a:pPr marL="0" marR="0" lvl="0" indent="0" algn="l" defTabSz="914400" rtl="0" eaLnBrk="1" fontAlgn="auto" latinLnBrk="0" hangingPunct="1">
-              <a:lnSpc>
-                <a:spcPct val="100000"/>
-              </a:lnSpc>
-              <a:spcBef>
-                <a:spcPts val="0"/>
-              </a:spcBef>
-              <a:spcAft>
-                <a:spcPts val="0"/>
-              </a:spcAft>
-              <a:buClrTx/>
-              <a:buSzTx/>
-              <a:buFontTx/>
-              <a:buNone/>
-              <a:tabLst/>
-              <a:defRPr/>
-            </a:pPr>
-            <a:r>
-              <a:rPr lang="en-US" dirty="0">
-                <a:solidFill>
-                  <a:srgbClr val="BCBEC4"/>
-                </a:solidFill>
-                <a:effectLst/>
-                <a:highlight>
-                  <a:srgbClr val="1E1F22"/>
-                </a:highlight>
-              </a:rPr>
-              <a:t>- Information flow </a:t>
-            </a:r>
+            <a:endParaRPr lang="en-US" dirty="0"/>
+          </a:p>
+          <a:p>
             <a:r>
               <a:rPr lang="en-US" dirty="0"/>
-              <a:t>mostly accounted for expansion of risk data but needs to be elaborated to better capture the idea of partial information</a:t>
-            </a:r>
-          </a:p>
-          <a:p>
-            <a:pPr marL="171450" marR="0" lvl="0" indent="-171450" algn="l" defTabSz="914400" rtl="0" eaLnBrk="1" fontAlgn="auto" latinLnBrk="0" hangingPunct="1">
-              <a:lnSpc>
-                <a:spcPct val="100000"/>
-              </a:lnSpc>
-              <a:spcBef>
-                <a:spcPts val="0"/>
-              </a:spcBef>
-              <a:spcAft>
-                <a:spcPts val="0"/>
-              </a:spcAft>
-              <a:buClrTx/>
-              <a:buSzTx/>
+              <a:t>Left figure show interim portfolio values before the 2007-2008 financial crisis</a:t>
+            </a:r>
+          </a:p>
+          <a:p>
+            <a:endParaRPr lang="en-US" dirty="0"/>
+          </a:p>
+          <a:p>
+            <a:pPr marL="171450" indent="-171450">
               <a:buFontTx/>
               <a:buChar char="-"/>
-              <a:tabLst/>
-              <a:defRPr/>
-            </a:pPr>
-            <a:r>
-              <a:rPr lang="en-US" dirty="0">
-                <a:solidFill>
-                  <a:srgbClr val="BCBEC4"/>
-                </a:solidFill>
-                <a:effectLst/>
-                <a:highlight>
-                  <a:srgbClr val="1E1F22"/>
-                </a:highlight>
-              </a:rPr>
-              <a:t>Data filtration cuts out stocks in which only partial information is available and stocks were removed from public market for private buyout or bankruptcy limiting types of stocks being considered – need to reference figure if keeping it to say the distribution isn’t entirely clear</a:t>
-            </a:r>
-          </a:p>
-          <a:p>
-            <a:pPr marL="171450" marR="0" lvl="0" indent="-171450" algn="l" defTabSz="914400" rtl="0" eaLnBrk="1" fontAlgn="auto" latinLnBrk="0" hangingPunct="1">
-              <a:lnSpc>
-                <a:spcPct val="100000"/>
-              </a:lnSpc>
-              <a:spcBef>
-                <a:spcPts val="0"/>
-              </a:spcBef>
-              <a:spcAft>
-                <a:spcPts val="0"/>
-              </a:spcAft>
-              <a:buClrTx/>
-              <a:buSzTx/>
+            </a:pPr>
+            <a:r>
+              <a:rPr lang="en-US" dirty="0"/>
+              <a:t>the brokers, who did not cash out when the stocks crashed, rebounded after the crisis</a:t>
+            </a:r>
+          </a:p>
+          <a:p>
+            <a:pPr marL="171450" indent="-171450">
               <a:buFontTx/>
               <a:buChar char="-"/>
-              <a:tabLst/>
-              <a:defRPr/>
-            </a:pPr>
-            <a:r>
-              <a:rPr lang="en-US" dirty="0">
-                <a:solidFill>
-                  <a:srgbClr val="BCBEC4"/>
-                </a:solidFill>
-                <a:effectLst/>
-                <a:highlight>
-                  <a:srgbClr val="1E1F22"/>
-                </a:highlight>
-              </a:rPr>
-              <a:t>Should expand to more brokers and possible make the connections more dynamic </a:t>
-            </a:r>
-            <a:r>
-              <a:rPr lang="en-US" dirty="0" err="1">
-                <a:solidFill>
-                  <a:srgbClr val="BCBEC4"/>
-                </a:solidFill>
-                <a:effectLst/>
-                <a:highlight>
-                  <a:srgbClr val="1E1F22"/>
-                </a:highlight>
-              </a:rPr>
-              <a:t>ie</a:t>
-            </a:r>
-            <a:r>
-              <a:rPr lang="en-US" dirty="0">
-                <a:solidFill>
-                  <a:srgbClr val="BCBEC4"/>
-                </a:solidFill>
-                <a:effectLst/>
-                <a:highlight>
-                  <a:srgbClr val="1E1F22"/>
-                </a:highlight>
-              </a:rPr>
-              <a:t> follow the best broker instead of being stuck entirely with initial connections</a:t>
-            </a:r>
-          </a:p>
-          <a:p>
-            <a:pPr marL="171450" marR="0" lvl="0" indent="-171450" algn="l" defTabSz="914400" rtl="0" eaLnBrk="1" fontAlgn="auto" latinLnBrk="0" hangingPunct="1">
-              <a:lnSpc>
-                <a:spcPct val="100000"/>
-              </a:lnSpc>
-              <a:spcBef>
-                <a:spcPts val="0"/>
-              </a:spcBef>
-              <a:spcAft>
-                <a:spcPts val="0"/>
-              </a:spcAft>
-              <a:buClrTx/>
-              <a:buSzTx/>
+            </a:pPr>
+            <a:r>
+              <a:rPr lang="en-US" dirty="0"/>
+              <a:t>The high risk brokers can be seen to rebound more quickly and exceed their peers of medium risk in some cases.</a:t>
+            </a:r>
+          </a:p>
+          <a:p>
+            <a:pPr marL="171450" indent="-171450">
               <a:buFontTx/>
               <a:buChar char="-"/>
-              <a:tabLst/>
-              <a:defRPr/>
-            </a:pPr>
-            <a:r>
-              <a:rPr lang="en-US" dirty="0">
-                <a:solidFill>
-                  <a:srgbClr val="BCBEC4"/>
-                </a:solidFill>
-                <a:effectLst/>
-                <a:highlight>
-                  <a:srgbClr val="1E1F22"/>
-                </a:highlight>
-              </a:rPr>
-              <a:t>Could extend stock risk evaluation to better account for more relationships in stock statistics </a:t>
-            </a:r>
-          </a:p>
-          <a:p>
-            <a:pPr marL="171450" marR="0" lvl="0" indent="-171450" algn="l" defTabSz="914400" rtl="0" eaLnBrk="1" fontAlgn="auto" latinLnBrk="0" hangingPunct="1">
-              <a:lnSpc>
-                <a:spcPct val="100000"/>
-              </a:lnSpc>
-              <a:spcBef>
-                <a:spcPts val="0"/>
-              </a:spcBef>
-              <a:spcAft>
-                <a:spcPts val="0"/>
-              </a:spcAft>
-              <a:buClrTx/>
-              <a:buSzTx/>
+            </a:pPr>
+            <a:r>
+              <a:rPr lang="en-US" dirty="0"/>
+              <a:t>Final values shows slightly different behavior; at event, risky brokers could make the most money but didn’t necessarily win over the large period of normal operation </a:t>
+            </a:r>
+          </a:p>
+          <a:p>
+            <a:pPr marL="171450" indent="-171450">
               <a:buFontTx/>
               <a:buChar char="-"/>
-              <a:tabLst/>
-              <a:defRPr/>
-            </a:pPr>
-            <a:r>
-              <a:rPr lang="en-US" dirty="0">
-                <a:solidFill>
-                  <a:srgbClr val="BCBEC4"/>
-                </a:solidFill>
-                <a:effectLst/>
-                <a:highlight>
-                  <a:srgbClr val="1E1F22"/>
-                </a:highlight>
-              </a:rPr>
-              <a:t>Explore idea of negative influence in the market</a:t>
-            </a:r>
-          </a:p>
-          <a:p>
-            <a:pPr marL="171450" marR="0" lvl="0" indent="-171450" algn="l" defTabSz="914400" rtl="0" eaLnBrk="1" fontAlgn="auto" latinLnBrk="0" hangingPunct="1">
-              <a:lnSpc>
-                <a:spcPct val="100000"/>
-              </a:lnSpc>
-              <a:spcBef>
-                <a:spcPts val="0"/>
-              </a:spcBef>
-              <a:spcAft>
-                <a:spcPts val="0"/>
-              </a:spcAft>
-              <a:buClrTx/>
-              <a:buSzTx/>
+            </a:pPr>
+            <a:r>
+              <a:rPr lang="en-US" dirty="0"/>
+              <a:t>by not exiting when their portfolios spiked, did not achieve the same levels of wealth as the more moderate brokers after the Black Swan event. </a:t>
+            </a:r>
+          </a:p>
+          <a:p>
+            <a:pPr marL="171450" indent="-171450">
               <a:buFontTx/>
               <a:buChar char="-"/>
-              <a:tabLst/>
-              <a:defRPr/>
-            </a:pPr>
-            <a:r>
-              <a:rPr lang="en-US" dirty="0">
-                <a:solidFill>
-                  <a:srgbClr val="BCBEC4"/>
-                </a:solidFill>
-                <a:effectLst/>
-                <a:highlight>
-                  <a:srgbClr val="1E1F22"/>
-                </a:highlight>
-              </a:rPr>
-              <a:t>Couldn’t actually affect stock prices – assumed small enough subset of actors to be able to use historical data</a:t>
-            </a:r>
-          </a:p>
-          <a:p>
-            <a:pPr marL="171450" marR="0" lvl="0" indent="-171450" algn="l" defTabSz="914400" rtl="0" eaLnBrk="1" fontAlgn="auto" latinLnBrk="0" hangingPunct="1">
-              <a:lnSpc>
-                <a:spcPct val="100000"/>
-              </a:lnSpc>
-              <a:spcBef>
-                <a:spcPts val="0"/>
-              </a:spcBef>
-              <a:spcAft>
-                <a:spcPts val="0"/>
-              </a:spcAft>
-              <a:buClrTx/>
-              <a:buSzTx/>
+            </a:pPr>
+            <a:r>
+              <a:rPr lang="en-US" dirty="0"/>
+              <a:t>At the end, with our method of risk formulation, moderate risk brokers won overall</a:t>
+            </a:r>
+          </a:p>
+          <a:p>
+            <a:pPr marL="171450" indent="-171450">
               <a:buFontTx/>
               <a:buChar char="-"/>
-              <a:tabLst/>
-              <a:defRPr/>
-            </a:pPr>
-            <a:endParaRPr lang="en-US" dirty="0">
-              <a:solidFill>
-                <a:srgbClr val="BCBEC4"/>
-              </a:solidFill>
-              <a:effectLst/>
-              <a:highlight>
-                <a:srgbClr val="1E1F22"/>
-              </a:highlight>
-            </a:endParaRPr>
-          </a:p>
-          <a:p>
-            <a:pPr marL="171450" marR="0" lvl="0" indent="-171450" algn="l" defTabSz="914400" rtl="0" eaLnBrk="1" fontAlgn="auto" latinLnBrk="0" hangingPunct="1">
-              <a:lnSpc>
-                <a:spcPct val="100000"/>
-              </a:lnSpc>
-              <a:spcBef>
-                <a:spcPts val="0"/>
-              </a:spcBef>
-              <a:spcAft>
-                <a:spcPts val="0"/>
-              </a:spcAft>
-              <a:buClrTx/>
-              <a:buSzTx/>
-              <a:buFontTx/>
-              <a:buChar char="-"/>
-              <a:tabLst/>
-              <a:defRPr/>
-            </a:pPr>
-            <a:r>
-              <a:rPr lang="en-US" dirty="0">
-                <a:solidFill>
-                  <a:srgbClr val="BCBEC4"/>
-                </a:solidFill>
-                <a:effectLst/>
-                <a:highlight>
-                  <a:srgbClr val="1E1F22"/>
-                </a:highlight>
-              </a:rPr>
-              <a:t>Add thesis statement</a:t>
-            </a:r>
-          </a:p>
-          <a:p>
-            <a:pPr marL="171450" marR="0" lvl="0" indent="-171450" algn="l" defTabSz="914400" rtl="0" eaLnBrk="1" fontAlgn="auto" latinLnBrk="0" hangingPunct="1">
-              <a:lnSpc>
-                <a:spcPct val="100000"/>
-              </a:lnSpc>
-              <a:spcBef>
-                <a:spcPts val="0"/>
-              </a:spcBef>
-              <a:spcAft>
-                <a:spcPts val="0"/>
-              </a:spcAft>
-              <a:buClrTx/>
-              <a:buSzTx/>
-              <a:buFontTx/>
-              <a:buChar char="-"/>
-              <a:tabLst/>
-              <a:defRPr/>
-            </a:pPr>
-            <a:r>
-              <a:rPr lang="en-US" dirty="0">
-                <a:solidFill>
-                  <a:srgbClr val="BCBEC4"/>
-                </a:solidFill>
-                <a:effectLst/>
-                <a:highlight>
-                  <a:srgbClr val="1E1F22"/>
-                </a:highlight>
-              </a:rPr>
-              <a:t>Address the graph</a:t>
-            </a:r>
+            </a:pPr>
+            <a:endParaRPr lang="en-US" dirty="0"/>
           </a:p>
         </p:txBody>
       </p:sp>
@@ -2976,7 +3646,7 @@
     </p:spTree>
     <p:extLst>
       <p:ext uri="{BB962C8B-B14F-4D97-AF65-F5344CB8AC3E}">
-        <p14:creationId xmlns:p14="http://schemas.microsoft.com/office/powerpoint/2010/main" val="1611523902"/>
+        <p14:creationId xmlns:p14="http://schemas.microsoft.com/office/powerpoint/2010/main" val="2683265447"/>
       </p:ext>
     </p:extLst>
   </p:cSld>
@@ -3032,7 +3702,67 @@
           <a:p>
             <a:r>
               <a:rPr lang="en-US" dirty="0"/>
-              <a:t>Here’s our references for the model</a:t>
+              <a:t>1.5 minute</a:t>
+            </a:r>
+          </a:p>
+          <a:p>
+            <a:endParaRPr lang="en-US" dirty="0"/>
+          </a:p>
+          <a:p>
+            <a:r>
+              <a:rPr lang="en-US" dirty="0"/>
+              <a:t>Left side shows a couple of total influence to final portfolio value</a:t>
+            </a:r>
+          </a:p>
+          <a:p>
+            <a:r>
+              <a:rPr lang="en-US" dirty="0"/>
+              <a:t>Top left looked at having a negative influence but this didn’t exactly make sense with perceived risk calculation, further eval necessary</a:t>
+            </a:r>
+          </a:p>
+          <a:p>
+            <a:endParaRPr lang="en-US" dirty="0"/>
+          </a:p>
+          <a:p>
+            <a:r>
+              <a:rPr lang="en-US" dirty="0"/>
+              <a:t>Even with the limitation of influence from 0 to 1, up to 50% of assessment provided by neighbor seemed to give increasing benefit</a:t>
+            </a:r>
+          </a:p>
+          <a:p>
+            <a:endParaRPr lang="en-US" dirty="0"/>
+          </a:p>
+          <a:p>
+            <a:r>
+              <a:rPr lang="en-US" dirty="0"/>
+              <a:t>On right, see time series, high risk had more money as noted but influence still benefits across different levels</a:t>
+            </a:r>
+          </a:p>
+          <a:p>
+            <a:r>
+              <a:rPr lang="en-US" dirty="0"/>
+              <a:t>When assigning a 1/3 of brokers low, 1/3 med, 1/3 high and just adjusting influence, see a couple examples</a:t>
+            </a:r>
+          </a:p>
+          <a:p>
+            <a:r>
+              <a:rPr lang="en-US" dirty="0"/>
+              <a:t>Red and green in high risk do better than blue who took less input</a:t>
+            </a:r>
+          </a:p>
+          <a:p>
+            <a:r>
+              <a:rPr lang="en-US" dirty="0"/>
+              <a:t>Dark blue and orange doing much more poorly than mustard in </a:t>
+            </a:r>
+          </a:p>
+          <a:p>
+            <a:endParaRPr lang="en-US" dirty="0"/>
+          </a:p>
+          <a:p>
+            <a:r>
+              <a:rPr lang="en-US" dirty="0"/>
+              <a:t>Basing the influence connections of the network around the risk assessment provides an expansion on a single broker's understanding of the stocks behavior to see higher ratio of good stocks but did not entirely capture the additional benefit of accessing partial information as desired.</a:t>
             </a:r>
           </a:p>
         </p:txBody>
@@ -3063,7 +3793,7 @@
     </p:spTree>
     <p:extLst>
       <p:ext uri="{BB962C8B-B14F-4D97-AF65-F5344CB8AC3E}">
-        <p14:creationId xmlns:p14="http://schemas.microsoft.com/office/powerpoint/2010/main" val="108912732"/>
+        <p14:creationId xmlns:p14="http://schemas.microsoft.com/office/powerpoint/2010/main" val="3939197585"/>
       </p:ext>
     </p:extLst>
   </p:cSld>
@@ -6399,6 +7129,694 @@
 </file>
 
 <file path=ppt/slides/slide10.xml><?xml version="1.0" encoding="utf-8"?>
+<p:sld xmlns:a="http://schemas.openxmlformats.org/drawingml/2006/main" xmlns:r="http://schemas.openxmlformats.org/officeDocument/2006/relationships" xmlns:p="http://schemas.openxmlformats.org/presentationml/2006/main">
+  <p:cSld>
+    <p:spTree>
+      <p:nvGrpSpPr>
+        <p:cNvPr id="1" name=""/>
+        <p:cNvGrpSpPr/>
+        <p:nvPr/>
+      </p:nvGrpSpPr>
+      <p:grpSpPr>
+        <a:xfrm>
+          <a:off x="0" y="0"/>
+          <a:ext cx="0" cy="0"/>
+          <a:chOff x="0" y="0"/>
+          <a:chExt cx="0" cy="0"/>
+        </a:xfrm>
+      </p:grpSpPr>
+      <p:pic>
+        <p:nvPicPr>
+          <p:cNvPr id="7" name="Picture 6">
+            <a:extLst>
+              <a:ext uri="{FF2B5EF4-FFF2-40B4-BE49-F238E27FC236}">
+                <a16:creationId xmlns:a16="http://schemas.microsoft.com/office/drawing/2014/main" id="{30CC9A47-2D13-1543-A7C8-F8088C1A337E}"/>
+              </a:ext>
+            </a:extLst>
+          </p:cNvPr>
+          <p:cNvPicPr>
+            <a:picLocks noChangeAspect="1"/>
+          </p:cNvPicPr>
+          <p:nvPr/>
+        </p:nvPicPr>
+        <p:blipFill>
+          <a:blip r:embed="rId3"/>
+          <a:stretch>
+            <a:fillRect/>
+          </a:stretch>
+        </p:blipFill>
+        <p:spPr>
+          <a:xfrm>
+            <a:off x="0" y="0"/>
+            <a:ext cx="12192000" cy="6858000"/>
+          </a:xfrm>
+          <a:prstGeom prst="rect">
+            <a:avLst/>
+          </a:prstGeom>
+        </p:spPr>
+      </p:pic>
+      <p:sp>
+        <p:nvSpPr>
+          <p:cNvPr id="8" name="Title 7">
+            <a:extLst>
+              <a:ext uri="{FF2B5EF4-FFF2-40B4-BE49-F238E27FC236}">
+                <a16:creationId xmlns:a16="http://schemas.microsoft.com/office/drawing/2014/main" id="{A9A7AB69-D1A4-194D-B544-292C74F04FCD}"/>
+              </a:ext>
+            </a:extLst>
+          </p:cNvPr>
+          <p:cNvSpPr>
+            <a:spLocks noGrp="1"/>
+          </p:cNvSpPr>
+          <p:nvPr>
+            <p:ph type="title"/>
+          </p:nvPr>
+        </p:nvSpPr>
+        <p:spPr/>
+        <p:txBody>
+          <a:bodyPr/>
+          <a:lstStyle/>
+          <a:p>
+            <a:r>
+              <a:rPr lang="en-US" dirty="0"/>
+              <a:t>Challenges and Future Work</a:t>
+            </a:r>
+          </a:p>
+        </p:txBody>
+      </p:sp>
+      <p:sp>
+        <p:nvSpPr>
+          <p:cNvPr id="9" name="Content Placeholder 8">
+            <a:extLst>
+              <a:ext uri="{FF2B5EF4-FFF2-40B4-BE49-F238E27FC236}">
+                <a16:creationId xmlns:a16="http://schemas.microsoft.com/office/drawing/2014/main" id="{661EE144-0F6C-2649-B81A-1334F4AFFB37}"/>
+              </a:ext>
+            </a:extLst>
+          </p:cNvPr>
+          <p:cNvSpPr>
+            <a:spLocks noGrp="1"/>
+          </p:cNvSpPr>
+          <p:nvPr>
+            <p:ph idx="1"/>
+          </p:nvPr>
+        </p:nvSpPr>
+        <p:spPr>
+          <a:xfrm>
+            <a:off x="838200" y="1617273"/>
+            <a:ext cx="4872135" cy="4559690"/>
+          </a:xfrm>
+        </p:spPr>
+        <p:txBody>
+          <a:bodyPr>
+            <a:normAutofit fontScale="92500" lnSpcReduction="10000"/>
+          </a:bodyPr>
+          <a:lstStyle/>
+          <a:p>
+            <a:r>
+              <a:rPr lang="en-US" dirty="0"/>
+              <a:t>Influence did not account for partial information flow</a:t>
+            </a:r>
+          </a:p>
+          <a:p>
+            <a:r>
+              <a:rPr lang="en-US" dirty="0"/>
+              <a:t>Data filtration limits which stocks are used</a:t>
+            </a:r>
+          </a:p>
+          <a:p>
+            <a:r>
+              <a:rPr lang="en-US" dirty="0"/>
+              <a:t>Extend broker quantity and friend distribution</a:t>
+            </a:r>
+          </a:p>
+          <a:p>
+            <a:r>
+              <a:rPr lang="en-US" dirty="0"/>
+              <a:t>Expand risk evaluation for greater stock data</a:t>
+            </a:r>
+          </a:p>
+          <a:p>
+            <a:r>
+              <a:rPr lang="en-US" dirty="0"/>
+              <a:t>Explore and define the idea of negative influence</a:t>
+            </a:r>
+          </a:p>
+          <a:p>
+            <a:r>
+              <a:rPr lang="en-US" dirty="0"/>
+              <a:t>Make model more dynamic to actually adjust stock prices</a:t>
+            </a:r>
+          </a:p>
+          <a:p>
+            <a:endParaRPr lang="en-US" dirty="0"/>
+          </a:p>
+        </p:txBody>
+      </p:sp>
+      <p:pic>
+        <p:nvPicPr>
+          <p:cNvPr id="2" name="Content Placeholder 2" descr="A graph of a graph&#10;&#10;Description automatically generated">
+            <a:extLst>
+              <a:ext uri="{FF2B5EF4-FFF2-40B4-BE49-F238E27FC236}">
+                <a16:creationId xmlns:a16="http://schemas.microsoft.com/office/drawing/2014/main" id="{A55B29B9-2E35-C23D-11D8-4041581283AE}"/>
+              </a:ext>
+            </a:extLst>
+          </p:cNvPr>
+          <p:cNvPicPr>
+            <a:picLocks noChangeAspect="1"/>
+          </p:cNvPicPr>
+          <p:nvPr/>
+        </p:nvPicPr>
+        <p:blipFill>
+          <a:blip r:embed="rId4"/>
+          <a:stretch>
+            <a:fillRect/>
+          </a:stretch>
+        </p:blipFill>
+        <p:spPr>
+          <a:xfrm>
+            <a:off x="6096000" y="1371600"/>
+            <a:ext cx="6079587" cy="4559690"/>
+          </a:xfrm>
+          <a:prstGeom prst="rect">
+            <a:avLst/>
+          </a:prstGeom>
+        </p:spPr>
+      </p:pic>
+    </p:spTree>
+    <p:extLst>
+      <p:ext uri="{BB962C8B-B14F-4D97-AF65-F5344CB8AC3E}">
+        <p14:creationId xmlns:p14="http://schemas.microsoft.com/office/powerpoint/2010/main" val="844184953"/>
+      </p:ext>
+    </p:extLst>
+  </p:cSld>
+  <p:clrMapOvr>
+    <a:masterClrMapping/>
+  </p:clrMapOvr>
+</p:sld>
+</file>
+
+<file path=ppt/slides/slide11.xml><?xml version="1.0" encoding="utf-8"?>
+<p:sld xmlns:a="http://schemas.openxmlformats.org/drawingml/2006/main" xmlns:r="http://schemas.openxmlformats.org/officeDocument/2006/relationships" xmlns:p="http://schemas.openxmlformats.org/presentationml/2006/main">
+  <p:cSld>
+    <p:spTree>
+      <p:nvGrpSpPr>
+        <p:cNvPr id="1" name=""/>
+        <p:cNvGrpSpPr/>
+        <p:nvPr/>
+      </p:nvGrpSpPr>
+      <p:grpSpPr>
+        <a:xfrm>
+          <a:off x="0" y="0"/>
+          <a:ext cx="0" cy="0"/>
+          <a:chOff x="0" y="0"/>
+          <a:chExt cx="0" cy="0"/>
+        </a:xfrm>
+      </p:grpSpPr>
+      <p:pic>
+        <p:nvPicPr>
+          <p:cNvPr id="7" name="Picture 6">
+            <a:extLst>
+              <a:ext uri="{FF2B5EF4-FFF2-40B4-BE49-F238E27FC236}">
+                <a16:creationId xmlns:a16="http://schemas.microsoft.com/office/drawing/2014/main" id="{30CC9A47-2D13-1543-A7C8-F8088C1A337E}"/>
+              </a:ext>
+            </a:extLst>
+          </p:cNvPr>
+          <p:cNvPicPr>
+            <a:picLocks noChangeAspect="1"/>
+          </p:cNvPicPr>
+          <p:nvPr/>
+        </p:nvPicPr>
+        <p:blipFill>
+          <a:blip r:embed="rId3"/>
+          <a:stretch>
+            <a:fillRect/>
+          </a:stretch>
+        </p:blipFill>
+        <p:spPr>
+          <a:xfrm>
+            <a:off x="0" y="0"/>
+            <a:ext cx="12192000" cy="6858000"/>
+          </a:xfrm>
+          <a:prstGeom prst="rect">
+            <a:avLst/>
+          </a:prstGeom>
+        </p:spPr>
+      </p:pic>
+      <p:sp>
+        <p:nvSpPr>
+          <p:cNvPr id="8" name="Title 7">
+            <a:extLst>
+              <a:ext uri="{FF2B5EF4-FFF2-40B4-BE49-F238E27FC236}">
+                <a16:creationId xmlns:a16="http://schemas.microsoft.com/office/drawing/2014/main" id="{A9A7AB69-D1A4-194D-B544-292C74F04FCD}"/>
+              </a:ext>
+            </a:extLst>
+          </p:cNvPr>
+          <p:cNvSpPr>
+            <a:spLocks noGrp="1"/>
+          </p:cNvSpPr>
+          <p:nvPr>
+            <p:ph type="title"/>
+          </p:nvPr>
+        </p:nvSpPr>
+        <p:spPr/>
+        <p:txBody>
+          <a:bodyPr/>
+          <a:lstStyle/>
+          <a:p>
+            <a:r>
+              <a:rPr lang="en-US" dirty="0"/>
+              <a:t>References</a:t>
+            </a:r>
+          </a:p>
+        </p:txBody>
+      </p:sp>
+      <p:sp>
+        <p:nvSpPr>
+          <p:cNvPr id="9" name="Content Placeholder 8">
+            <a:extLst>
+              <a:ext uri="{FF2B5EF4-FFF2-40B4-BE49-F238E27FC236}">
+                <a16:creationId xmlns:a16="http://schemas.microsoft.com/office/drawing/2014/main" id="{661EE144-0F6C-2649-B81A-1334F4AFFB37}"/>
+              </a:ext>
+            </a:extLst>
+          </p:cNvPr>
+          <p:cNvSpPr>
+            <a:spLocks noGrp="1"/>
+          </p:cNvSpPr>
+          <p:nvPr>
+            <p:ph idx="1"/>
+          </p:nvPr>
+        </p:nvSpPr>
+        <p:spPr>
+          <a:xfrm>
+            <a:off x="412490" y="1595535"/>
+            <a:ext cx="11367019" cy="4665404"/>
+          </a:xfrm>
+        </p:spPr>
+        <p:txBody>
+          <a:bodyPr>
+            <a:normAutofit lnSpcReduction="10000"/>
+          </a:bodyPr>
+          <a:lstStyle/>
+          <a:p>
+            <a:pPr marL="0" indent="0">
+              <a:buNone/>
+            </a:pPr>
+            <a:r>
+              <a:rPr lang="en-US" sz="1000" dirty="0"/>
+              <a:t>X. </a:t>
+            </a:r>
+            <a:r>
+              <a:rPr lang="en-US" sz="1000" dirty="0" err="1"/>
+              <a:t>Gabaix</a:t>
+            </a:r>
+            <a:r>
+              <a:rPr lang="en-US" sz="1000" dirty="0"/>
+              <a:t>, “Power laws in economics: an introduction,” \</a:t>
+            </a:r>
+            <a:r>
+              <a:rPr lang="en-US" sz="1000" dirty="0" err="1"/>
+              <a:t>textit</a:t>
+            </a:r>
+            <a:r>
+              <a:rPr lang="en-US" sz="1000" dirty="0"/>
+              <a:t>{Journal of Economic Perspectives}, vol. 30, no. 1, pp. 185–206, Feb. 2016.</a:t>
+            </a:r>
+          </a:p>
+          <a:p>
+            <a:pPr marL="0" indent="0">
+              <a:buNone/>
+            </a:pPr>
+            <a:r>
+              <a:rPr lang="en-US" sz="1000" dirty="0"/>
+              <a:t>N. N. </a:t>
+            </a:r>
+            <a:r>
+              <a:rPr lang="en-US" sz="1000" dirty="0" err="1"/>
+              <a:t>Taleb</a:t>
+            </a:r>
+            <a:r>
+              <a:rPr lang="en-US" sz="1000" dirty="0"/>
+              <a:t>, Antifragile: Things that gain from disorder. Harlow, England: Penguin Books, 2013.</a:t>
+            </a:r>
+          </a:p>
+          <a:p>
+            <a:pPr marL="0" indent="0">
+              <a:buNone/>
+            </a:pPr>
+            <a:r>
+              <a:rPr lang="en-US" sz="1000" dirty="0"/>
+              <a:t>D. Easley and J. Kleinberg, Networks, crowds, and markets: Reasoning about a highly connected world. Cambridge, England: Cambridge University Press, 2012.</a:t>
+            </a:r>
+          </a:p>
+          <a:p>
+            <a:pPr marL="0" indent="0">
+              <a:buNone/>
+            </a:pPr>
+            <a:r>
+              <a:rPr lang="en-US" sz="1000" dirty="0"/>
+              <a:t>C. Hommes, “Behavioral and Experimental Macroeconomics and Policy Analysis: A Complex Systems Approach,” Journal of Economic Literature, vol. 59, no. 1, pp. 149–219, Mar. 2021, </a:t>
+            </a:r>
+            <a:r>
+              <a:rPr lang="en-US" sz="1000" dirty="0" err="1"/>
+              <a:t>doi</a:t>
+            </a:r>
+            <a:r>
+              <a:rPr lang="en-US" sz="1000" dirty="0"/>
+              <a:t>: 10.1257/jel.20191434.</a:t>
+            </a:r>
+          </a:p>
+          <a:p>
+            <a:pPr marL="0" indent="0">
+              <a:buNone/>
+            </a:pPr>
+            <a:r>
+              <a:rPr lang="en-US" sz="1000" dirty="0"/>
+              <a:t>C. K. </a:t>
+            </a:r>
+            <a:r>
+              <a:rPr lang="en-US" sz="1000" dirty="0" err="1"/>
+              <a:t>Tse</a:t>
+            </a:r>
+            <a:r>
+              <a:rPr lang="en-US" sz="1000" dirty="0"/>
+              <a:t>, J. Liu, and F. C. M. Lau, “A network perspective of the stock market,” Journal of Empirical Finance, vol. 17, no. 4, pp. 659–667, Sep. 2010, </a:t>
+            </a:r>
+            <a:r>
+              <a:rPr lang="en-US" sz="1000" dirty="0" err="1"/>
+              <a:t>doi</a:t>
+            </a:r>
+            <a:r>
+              <a:rPr lang="en-US" sz="1000" dirty="0"/>
+              <a:t>: 10.1016/j.jempfin.2010.04.008.</a:t>
+            </a:r>
+          </a:p>
+          <a:p>
+            <a:pPr marL="0" indent="0">
+              <a:buNone/>
+            </a:pPr>
+            <a:r>
+              <a:rPr lang="en-US" sz="1000" dirty="0"/>
+              <a:t>M. Kuhlmann, "Explaining financial markets in terms of complex systems," \</a:t>
+            </a:r>
+            <a:r>
+              <a:rPr lang="en-US" sz="1000" dirty="0" err="1"/>
+              <a:t>textit</a:t>
+            </a:r>
+            <a:r>
+              <a:rPr lang="en-US" sz="1000" dirty="0"/>
+              <a:t>{</a:t>
+            </a:r>
+            <a:r>
+              <a:rPr lang="en-US" sz="1000" dirty="0" err="1"/>
+              <a:t>Philosphy</a:t>
+            </a:r>
+            <a:r>
+              <a:rPr lang="en-US" sz="1000" dirty="0"/>
+              <a:t> of Science}, vol. 81, no. 5, pp. 1117-1130, Dec. 2014. %</a:t>
+            </a:r>
+            <a:r>
+              <a:rPr lang="en-US" sz="1000" dirty="0" err="1"/>
+              <a:t>doi</a:t>
+            </a:r>
+            <a:r>
+              <a:rPr lang="en-US" sz="1000" dirty="0"/>
+              <a:t>: 10.1086/677699.</a:t>
+            </a:r>
+          </a:p>
+          <a:p>
+            <a:pPr marL="0" indent="0">
+              <a:buNone/>
+            </a:pPr>
+            <a:r>
+              <a:rPr lang="en-US" sz="1000" dirty="0"/>
+              <a:t>M. Di Maggio, F. </a:t>
+            </a:r>
+            <a:r>
+              <a:rPr lang="en-US" sz="1000" dirty="0" err="1"/>
+              <a:t>Franzoni</a:t>
+            </a:r>
+            <a:r>
+              <a:rPr lang="en-US" sz="1000" dirty="0"/>
+              <a:t>, A. </a:t>
+            </a:r>
+            <a:r>
+              <a:rPr lang="en-US" sz="1000" dirty="0" err="1"/>
+              <a:t>Kermani</a:t>
+            </a:r>
+            <a:r>
+              <a:rPr lang="en-US" sz="1000" dirty="0"/>
+              <a:t>, and C. </a:t>
+            </a:r>
+            <a:r>
+              <a:rPr lang="en-US" sz="1000" dirty="0" err="1"/>
+              <a:t>Sommavilla</a:t>
+            </a:r>
+            <a:r>
+              <a:rPr lang="en-US" sz="1000" dirty="0"/>
+              <a:t>, "The relevance of broker networks for information diffusion in the stock market," \</a:t>
+            </a:r>
+            <a:r>
+              <a:rPr lang="en-US" sz="1000" dirty="0" err="1"/>
+              <a:t>textit</a:t>
+            </a:r>
+            <a:r>
+              <a:rPr lang="en-US" sz="1000" dirty="0"/>
+              <a:t>{Journal of Financial Economics}, vol. 134, no. 2, pp. 419-446, Nov. 2019. </a:t>
+            </a:r>
+          </a:p>
+          <a:p>
+            <a:pPr marL="0" indent="0">
+              <a:buNone/>
+            </a:pPr>
+            <a:r>
+              <a:rPr lang="en-US" sz="1000" dirty="0"/>
+              <a:t>P. Gai and S. Kapadia, "Contagion in financial networks," \</a:t>
+            </a:r>
+            <a:r>
+              <a:rPr lang="en-US" sz="1000" dirty="0" err="1"/>
+              <a:t>textit</a:t>
+            </a:r>
+            <a:r>
+              <a:rPr lang="en-US" sz="1000" dirty="0"/>
+              <a:t>{Proceedings of the Royal Society}, vol. 466, no. 2120, pp. 2401–2423, Aug. 2010.</a:t>
+            </a:r>
+          </a:p>
+          <a:p>
+            <a:pPr marL="0" indent="0">
+              <a:buNone/>
+            </a:pPr>
+            <a:r>
+              <a:rPr lang="en-US" sz="1000" dirty="0"/>
+              <a:t>C. K. </a:t>
+            </a:r>
+            <a:r>
+              <a:rPr lang="en-US" sz="1000" dirty="0" err="1"/>
+              <a:t>Tse</a:t>
+            </a:r>
+            <a:r>
+              <a:rPr lang="en-US" sz="1000" dirty="0"/>
+              <a:t>, J. Liu, and F. C. M. Lau, “A network perspective of the stock market,” \</a:t>
+            </a:r>
+            <a:r>
+              <a:rPr lang="en-US" sz="1000" dirty="0" err="1"/>
+              <a:t>textit</a:t>
+            </a:r>
+            <a:r>
+              <a:rPr lang="en-US" sz="1000" dirty="0"/>
+              <a:t>{Journal of Empirical Finance}, vol. 17, no. 4, pp. 659–667, Sep. 2010. % </a:t>
+            </a:r>
+            <a:r>
+              <a:rPr lang="en-US" sz="1000" dirty="0" err="1"/>
+              <a:t>doi</a:t>
+            </a:r>
+            <a:r>
+              <a:rPr lang="en-US" sz="1000" dirty="0"/>
+              <a:t>: 10.1016/j.jempfin.2010.04.008.</a:t>
+            </a:r>
+          </a:p>
+          <a:p>
+            <a:pPr marL="0" indent="0">
+              <a:buNone/>
+            </a:pPr>
+            <a:r>
+              <a:rPr lang="en-US" sz="1000" dirty="0"/>
+              <a:t>G. Li, A. Zhang, Q. Zhang, D. Wu, and C. Zhan, “Pearson correlation coefficient-based performance enhancement of broad learning system for stock price prediction,” \</a:t>
+            </a:r>
+            <a:r>
+              <a:rPr lang="en-US" sz="1000" dirty="0" err="1"/>
+              <a:t>textit</a:t>
+            </a:r>
+            <a:r>
+              <a:rPr lang="en-US" sz="1000" dirty="0"/>
+              <a:t>{IEEE Transactions on Circuits and Systems II: Express Briefs}, vol. 69, no. 5, pp. 2413–2417, May 2022. </a:t>
+            </a:r>
+          </a:p>
+          <a:p>
+            <a:pPr marL="0" indent="0">
+              <a:buNone/>
+            </a:pPr>
+            <a:r>
+              <a:rPr lang="en-US" sz="1000" dirty="0"/>
+              <a:t>P. </a:t>
+            </a:r>
+            <a:r>
+              <a:rPr lang="en-US" sz="1000" dirty="0" err="1"/>
+              <a:t>Fiedor</a:t>
+            </a:r>
+            <a:r>
+              <a:rPr lang="en-US" sz="1000" dirty="0"/>
+              <a:t>, “Networks in financial markets based on the mutual information rate,” \</a:t>
+            </a:r>
+            <a:r>
+              <a:rPr lang="en-US" sz="1000" dirty="0" err="1"/>
+              <a:t>textit</a:t>
+            </a:r>
+            <a:r>
+              <a:rPr lang="en-US" sz="1000" dirty="0"/>
+              <a:t>{Physical Review E}, vol. 89, no. 5, May 2014. % </a:t>
+            </a:r>
+            <a:r>
+              <a:rPr lang="en-US" sz="1000" dirty="0" err="1"/>
+              <a:t>doi</a:t>
+            </a:r>
+            <a:r>
+              <a:rPr lang="en-US" sz="1000" dirty="0"/>
+              <a:t>: 10.1103/PhysRevE.89.052801.</a:t>
+            </a:r>
+          </a:p>
+          <a:p>
+            <a:pPr marL="0" indent="0">
+              <a:buNone/>
+            </a:pPr>
+            <a:r>
+              <a:rPr lang="en-US" sz="1000" dirty="0"/>
+              <a:t>I. Cooper and R. Priestley. "Real investment and risk dynamics," \</a:t>
+            </a:r>
+            <a:r>
+              <a:rPr lang="en-US" sz="1000" dirty="0" err="1"/>
+              <a:t>textit</a:t>
+            </a:r>
+            <a:r>
+              <a:rPr lang="en-US" sz="1000" dirty="0"/>
+              <a:t>{Journal of Financial Economics}, vol. 101, no. 1, pp. 182-205, July 2011.</a:t>
+            </a:r>
+          </a:p>
+          <a:p>
+            <a:pPr marL="0" indent="0">
+              <a:buNone/>
+            </a:pPr>
+            <a:r>
+              <a:rPr lang="en-US" sz="1000" dirty="0"/>
+              <a:t>K. J. Lansing and S. F. LeRoy, “Risk aversion, investor information and stock market volatility,” \</a:t>
+            </a:r>
+            <a:r>
+              <a:rPr lang="en-US" sz="1000" dirty="0" err="1"/>
+              <a:t>textit</a:t>
+            </a:r>
+            <a:r>
+              <a:rPr lang="en-US" sz="1000" dirty="0"/>
+              <a:t>{European Economic Review}, vol. 70, pp. 88-107, July 2014. </a:t>
+            </a:r>
+          </a:p>
+          <a:p>
+            <a:pPr marL="0" indent="0">
+              <a:buNone/>
+            </a:pPr>
+            <a:r>
+              <a:rPr lang="en-US" sz="1000" dirty="0"/>
+              <a:t>J. E. </a:t>
+            </a:r>
+            <a:r>
+              <a:rPr lang="en-US" sz="1000" dirty="0" err="1"/>
+              <a:t>Corter</a:t>
+            </a:r>
+            <a:r>
+              <a:rPr lang="en-US" sz="1000" dirty="0"/>
+              <a:t> and Y. J. Chen, “Do investment risk tolerance attitudes predict portfolio risk?,” \</a:t>
+            </a:r>
+            <a:r>
+              <a:rPr lang="en-US" sz="1100" dirty="0" err="1"/>
+              <a:t>textit</a:t>
+            </a:r>
+            <a:r>
+              <a:rPr lang="en-US" sz="1000" dirty="0"/>
+              <a:t>{Journal of Business and Psychology}, vol. 20, no. 3, pp. 369-381, 2006.</a:t>
+            </a:r>
+          </a:p>
+          <a:p>
+            <a:pPr marL="0" indent="0">
+              <a:buNone/>
+            </a:pPr>
+            <a:r>
+              <a:rPr lang="en-US" sz="1000" dirty="0"/>
+              <a:t>D. Harmon, B. Stacey, Y. Bar-Yam, and Y. Bar-Yam, "Networks of economic market interdependence and systemic risk," New England Complex Systems Institute, Cambridge, MA, Tech. Report 1011.3707, Mar. 2009.</a:t>
+            </a:r>
+          </a:p>
+          <a:p>
+            <a:pPr marL="0" indent="0">
+              <a:buNone/>
+            </a:pPr>
+            <a:r>
+              <a:rPr lang="en-US" sz="1000" dirty="0"/>
+              <a:t>Y. Y. </a:t>
+            </a:r>
+            <a:r>
+              <a:rPr lang="en-US" sz="1000" dirty="0" err="1"/>
+              <a:t>Baydilli</a:t>
+            </a:r>
+            <a:r>
+              <a:rPr lang="en-US" sz="1000" dirty="0"/>
+              <a:t>, S. </a:t>
+            </a:r>
+            <a:r>
+              <a:rPr lang="en-US" sz="1000" dirty="0" err="1"/>
+              <a:t>Bayir</a:t>
+            </a:r>
+            <a:r>
+              <a:rPr lang="en-US" sz="1000" dirty="0"/>
+              <a:t>, and I. </a:t>
+            </a:r>
+            <a:r>
+              <a:rPr lang="en-US" sz="1000" dirty="0" err="1"/>
+              <a:t>Tuker</a:t>
+            </a:r>
+            <a:r>
+              <a:rPr lang="en-US" sz="1000" dirty="0"/>
+              <a:t>, “A hierarchical view of a national stock market as a complex network,” \</a:t>
+            </a:r>
+            <a:r>
+              <a:rPr lang="en-US" sz="1000" dirty="0" err="1"/>
+              <a:t>textit</a:t>
+            </a:r>
+            <a:r>
+              <a:rPr lang="en-US" sz="1000" dirty="0"/>
+              <a:t>{Economic Computation \&amp; Economic Cybernetics Studies \&amp; Research}, vol. 51, no. 1, pp. 205–222, Jan. 2017.</a:t>
+            </a:r>
+          </a:p>
+          <a:p>
+            <a:pPr marL="0" indent="0">
+              <a:buNone/>
+            </a:pPr>
+            <a:r>
+              <a:rPr lang="en-US" sz="1000" dirty="0"/>
+              <a:t>		</a:t>
+            </a:r>
+          </a:p>
+        </p:txBody>
+      </p:sp>
+    </p:spTree>
+    <p:extLst>
+      <p:ext uri="{BB962C8B-B14F-4D97-AF65-F5344CB8AC3E}">
+        <p14:creationId xmlns:p14="http://schemas.microsoft.com/office/powerpoint/2010/main" val="3598801279"/>
+      </p:ext>
+    </p:extLst>
+  </p:cSld>
+  <p:clrMapOvr>
+    <a:masterClrMapping/>
+  </p:clrMapOvr>
+</p:sld>
+</file>
+
+<file path=ppt/slides/slide12.xml><?xml version="1.0" encoding="utf-8"?>
 <p:sld xmlns:a="http://schemas.openxmlformats.org/drawingml/2006/main" xmlns:r="http://schemas.openxmlformats.org/officeDocument/2006/relationships" xmlns:p="http://schemas.openxmlformats.org/presentationml/2006/main">
   <p:cSld>
     <p:spTree>
@@ -7789,10 +9207,10 @@
       </p:sp>
       <p:pic>
         <p:nvPicPr>
-          <p:cNvPr id="3" name="Picture 2" descr="A graph of a stock market&#10;&#10;Description automatically generated">
-            <a:extLst>
-              <a:ext uri="{FF2B5EF4-FFF2-40B4-BE49-F238E27FC236}">
-                <a16:creationId xmlns:a16="http://schemas.microsoft.com/office/drawing/2014/main" id="{C3BF7B2A-A131-07A5-EBD2-96A4793957A9}"/>
+          <p:cNvPr id="5" name="Picture 4" descr="A graph of a financial graph&#10;&#10;Description automatically generated with medium confidence">
+            <a:extLst>
+              <a:ext uri="{FF2B5EF4-FFF2-40B4-BE49-F238E27FC236}">
+                <a16:creationId xmlns:a16="http://schemas.microsoft.com/office/drawing/2014/main" id="{8A7EC642-919D-496E-65B9-1F0E438C6171}"/>
               </a:ext>
             </a:extLst>
           </p:cNvPr>
@@ -7803,13 +9221,13 @@
         </p:nvPicPr>
         <p:blipFill rotWithShape="1">
           <a:blip r:embed="rId4"/>
-          <a:srcRect l="6416"/>
+          <a:srcRect r="8919"/>
           <a:stretch/>
         </p:blipFill>
         <p:spPr>
           <a:xfrm>
-            <a:off x="6164227" y="681037"/>
-            <a:ext cx="5959543" cy="3820887"/>
+            <a:off x="34114" y="2296152"/>
+            <a:ext cx="6095999" cy="4015748"/>
           </a:xfrm>
           <a:prstGeom prst="rect">
             <a:avLst/>
@@ -7818,10 +9236,10 @@
       </p:pic>
       <p:pic>
         <p:nvPicPr>
-          <p:cNvPr id="5" name="Picture 4" descr="A graph of a financial graph&#10;&#10;Description automatically generated with medium confidence">
-            <a:extLst>
-              <a:ext uri="{FF2B5EF4-FFF2-40B4-BE49-F238E27FC236}">
-                <a16:creationId xmlns:a16="http://schemas.microsoft.com/office/drawing/2014/main" id="{8A7EC642-919D-496E-65B9-1F0E438C6171}"/>
+          <p:cNvPr id="4" name="Picture 3" descr="A graph of different colored lines&#10;&#10;Description automatically generated">
+            <a:extLst>
+              <a:ext uri="{FF2B5EF4-FFF2-40B4-BE49-F238E27FC236}">
+                <a16:creationId xmlns:a16="http://schemas.microsoft.com/office/drawing/2014/main" id="{05EB6825-4390-CDF6-D0CD-805071E16345}"/>
               </a:ext>
             </a:extLst>
           </p:cNvPr>
@@ -7830,15 +9248,16 @@
           </p:cNvPicPr>
           <p:nvPr/>
         </p:nvPicPr>
-        <p:blipFill rotWithShape="1">
+        <p:blipFill>
           <a:blip r:embed="rId5"/>
-          <a:srcRect r="8919"/>
-          <a:stretch/>
+          <a:stretch>
+            <a:fillRect/>
+          </a:stretch>
         </p:blipFill>
         <p:spPr>
           <a:xfrm>
-            <a:off x="34114" y="2296152"/>
-            <a:ext cx="6095999" cy="4015748"/>
+            <a:off x="6148238" y="137155"/>
+            <a:ext cx="6009648" cy="3605789"/>
           </a:xfrm>
           <a:prstGeom prst="rect">
             <a:avLst/>
@@ -7928,6 +9347,324 @@
           <a:p>
             <a:r>
               <a:rPr lang="en-US" dirty="0"/>
+              <a:t>Results: Risk</a:t>
+            </a:r>
+          </a:p>
+        </p:txBody>
+      </p:sp>
+      <p:pic>
+        <p:nvPicPr>
+          <p:cNvPr id="5" name="Picture 4" descr="A graph of a financial graph&#10;&#10;Description automatically generated with medium confidence">
+            <a:extLst>
+              <a:ext uri="{FF2B5EF4-FFF2-40B4-BE49-F238E27FC236}">
+                <a16:creationId xmlns:a16="http://schemas.microsoft.com/office/drawing/2014/main" id="{8A7EC642-919D-496E-65B9-1F0E438C6171}"/>
+              </a:ext>
+            </a:extLst>
+          </p:cNvPr>
+          <p:cNvPicPr>
+            <a:picLocks noChangeAspect="1"/>
+          </p:cNvPicPr>
+          <p:nvPr/>
+        </p:nvPicPr>
+        <p:blipFill rotWithShape="1">
+          <a:blip r:embed="rId4"/>
+          <a:srcRect r="8919"/>
+          <a:stretch/>
+        </p:blipFill>
+        <p:spPr>
+          <a:xfrm>
+            <a:off x="34114" y="2296152"/>
+            <a:ext cx="6095999" cy="4015748"/>
+          </a:xfrm>
+          <a:prstGeom prst="rect">
+            <a:avLst/>
+          </a:prstGeom>
+        </p:spPr>
+      </p:pic>
+      <p:pic>
+        <p:nvPicPr>
+          <p:cNvPr id="4" name="Picture 3" descr="A graph of different colored lines&#10;&#10;Description automatically generated">
+            <a:extLst>
+              <a:ext uri="{FF2B5EF4-FFF2-40B4-BE49-F238E27FC236}">
+                <a16:creationId xmlns:a16="http://schemas.microsoft.com/office/drawing/2014/main" id="{05EB6825-4390-CDF6-D0CD-805071E16345}"/>
+              </a:ext>
+            </a:extLst>
+          </p:cNvPr>
+          <p:cNvPicPr>
+            <a:picLocks noChangeAspect="1"/>
+          </p:cNvPicPr>
+          <p:nvPr/>
+        </p:nvPicPr>
+        <p:blipFill>
+          <a:blip r:embed="rId5"/>
+          <a:stretch>
+            <a:fillRect/>
+          </a:stretch>
+        </p:blipFill>
+        <p:spPr>
+          <a:xfrm>
+            <a:off x="-318985" y="-419991"/>
+            <a:ext cx="12829969" cy="7697981"/>
+          </a:xfrm>
+          <a:prstGeom prst="rect">
+            <a:avLst/>
+          </a:prstGeom>
+        </p:spPr>
+      </p:pic>
+    </p:spTree>
+    <p:extLst>
+      <p:ext uri="{BB962C8B-B14F-4D97-AF65-F5344CB8AC3E}">
+        <p14:creationId xmlns:p14="http://schemas.microsoft.com/office/powerpoint/2010/main" val="2299815622"/>
+      </p:ext>
+    </p:extLst>
+  </p:cSld>
+  <p:clrMapOvr>
+    <a:masterClrMapping/>
+  </p:clrMapOvr>
+  <mc:AlternateContent xmlns:mc="http://schemas.openxmlformats.org/markup-compatibility/2006">
+    <mc:Choice xmlns:p159="http://schemas.microsoft.com/office/powerpoint/2015/09/main" Requires="p159">
+      <p:transition xmlns:p14="http://schemas.microsoft.com/office/powerpoint/2010/main" spd="slow" p14:dur="2000">
+        <p159:morph option="byObject"/>
+      </p:transition>
+    </mc:Choice>
+    <mc:Fallback>
+      <p:transition spd="slow">
+        <p:fade/>
+      </p:transition>
+    </mc:Fallback>
+  </mc:AlternateContent>
+</p:sld>
+</file>
+
+<file path=ppt/slides/slide7.xml><?xml version="1.0" encoding="utf-8"?>
+<p:sld xmlns:a="http://schemas.openxmlformats.org/drawingml/2006/main" xmlns:r="http://schemas.openxmlformats.org/officeDocument/2006/relationships" xmlns:p="http://schemas.openxmlformats.org/presentationml/2006/main">
+  <p:cSld>
+    <p:spTree>
+      <p:nvGrpSpPr>
+        <p:cNvPr id="1" name=""/>
+        <p:cNvGrpSpPr/>
+        <p:nvPr/>
+      </p:nvGrpSpPr>
+      <p:grpSpPr>
+        <a:xfrm>
+          <a:off x="0" y="0"/>
+          <a:ext cx="0" cy="0"/>
+          <a:chOff x="0" y="0"/>
+          <a:chExt cx="0" cy="0"/>
+        </a:xfrm>
+      </p:grpSpPr>
+      <p:pic>
+        <p:nvPicPr>
+          <p:cNvPr id="7" name="Picture 6">
+            <a:extLst>
+              <a:ext uri="{FF2B5EF4-FFF2-40B4-BE49-F238E27FC236}">
+                <a16:creationId xmlns:a16="http://schemas.microsoft.com/office/drawing/2014/main" id="{30CC9A47-2D13-1543-A7C8-F8088C1A337E}"/>
+              </a:ext>
+            </a:extLst>
+          </p:cNvPr>
+          <p:cNvPicPr>
+            <a:picLocks noChangeAspect="1"/>
+          </p:cNvPicPr>
+          <p:nvPr/>
+        </p:nvPicPr>
+        <p:blipFill>
+          <a:blip r:embed="rId3"/>
+          <a:stretch>
+            <a:fillRect/>
+          </a:stretch>
+        </p:blipFill>
+        <p:spPr>
+          <a:xfrm>
+            <a:off x="0" y="0"/>
+            <a:ext cx="12192000" cy="6858000"/>
+          </a:xfrm>
+          <a:prstGeom prst="rect">
+            <a:avLst/>
+          </a:prstGeom>
+        </p:spPr>
+      </p:pic>
+      <p:sp>
+        <p:nvSpPr>
+          <p:cNvPr id="8" name="Title 7">
+            <a:extLst>
+              <a:ext uri="{FF2B5EF4-FFF2-40B4-BE49-F238E27FC236}">
+                <a16:creationId xmlns:a16="http://schemas.microsoft.com/office/drawing/2014/main" id="{A9A7AB69-D1A4-194D-B544-292C74F04FCD}"/>
+              </a:ext>
+            </a:extLst>
+          </p:cNvPr>
+          <p:cNvSpPr>
+            <a:spLocks noGrp="1"/>
+          </p:cNvSpPr>
+          <p:nvPr>
+            <p:ph type="title"/>
+          </p:nvPr>
+        </p:nvSpPr>
+        <p:spPr/>
+        <p:txBody>
+          <a:bodyPr/>
+          <a:lstStyle/>
+          <a:p>
+            <a:r>
+              <a:rPr lang="en-US" dirty="0"/>
+              <a:t>Results: Risk</a:t>
+            </a:r>
+          </a:p>
+        </p:txBody>
+      </p:sp>
+      <p:pic>
+        <p:nvPicPr>
+          <p:cNvPr id="5" name="Picture 4" descr="A graph of a financial graph&#10;&#10;Description automatically generated with medium confidence">
+            <a:extLst>
+              <a:ext uri="{FF2B5EF4-FFF2-40B4-BE49-F238E27FC236}">
+                <a16:creationId xmlns:a16="http://schemas.microsoft.com/office/drawing/2014/main" id="{8A7EC642-919D-496E-65B9-1F0E438C6171}"/>
+              </a:ext>
+            </a:extLst>
+          </p:cNvPr>
+          <p:cNvPicPr>
+            <a:picLocks noChangeAspect="1"/>
+          </p:cNvPicPr>
+          <p:nvPr/>
+        </p:nvPicPr>
+        <p:blipFill rotWithShape="1">
+          <a:blip r:embed="rId4"/>
+          <a:srcRect r="8919"/>
+          <a:stretch/>
+        </p:blipFill>
+        <p:spPr>
+          <a:xfrm>
+            <a:off x="34114" y="2296152"/>
+            <a:ext cx="6095999" cy="4015748"/>
+          </a:xfrm>
+          <a:prstGeom prst="rect">
+            <a:avLst/>
+          </a:prstGeom>
+        </p:spPr>
+      </p:pic>
+      <p:pic>
+        <p:nvPicPr>
+          <p:cNvPr id="4" name="Picture 3" descr="A graph of different colored lines&#10;&#10;Description automatically generated">
+            <a:extLst>
+              <a:ext uri="{FF2B5EF4-FFF2-40B4-BE49-F238E27FC236}">
+                <a16:creationId xmlns:a16="http://schemas.microsoft.com/office/drawing/2014/main" id="{05EB6825-4390-CDF6-D0CD-805071E16345}"/>
+              </a:ext>
+            </a:extLst>
+          </p:cNvPr>
+          <p:cNvPicPr>
+            <a:picLocks noChangeAspect="1"/>
+          </p:cNvPicPr>
+          <p:nvPr/>
+        </p:nvPicPr>
+        <p:blipFill>
+          <a:blip r:embed="rId5"/>
+          <a:stretch>
+            <a:fillRect/>
+          </a:stretch>
+        </p:blipFill>
+        <p:spPr>
+          <a:xfrm>
+            <a:off x="6148238" y="137155"/>
+            <a:ext cx="6009648" cy="3605789"/>
+          </a:xfrm>
+          <a:prstGeom prst="rect">
+            <a:avLst/>
+          </a:prstGeom>
+        </p:spPr>
+      </p:pic>
+    </p:spTree>
+    <p:extLst>
+      <p:ext uri="{BB962C8B-B14F-4D97-AF65-F5344CB8AC3E}">
+        <p14:creationId xmlns:p14="http://schemas.microsoft.com/office/powerpoint/2010/main" val="2165410892"/>
+      </p:ext>
+    </p:extLst>
+  </p:cSld>
+  <p:clrMapOvr>
+    <a:masterClrMapping/>
+  </p:clrMapOvr>
+  <mc:AlternateContent xmlns:mc="http://schemas.openxmlformats.org/markup-compatibility/2006">
+    <mc:Choice xmlns:p159="http://schemas.microsoft.com/office/powerpoint/2015/09/main" Requires="p159">
+      <p:transition xmlns:p14="http://schemas.microsoft.com/office/powerpoint/2010/main" spd="slow" p14:dur="2000">
+        <p159:morph option="byObject"/>
+      </p:transition>
+    </mc:Choice>
+    <mc:Fallback>
+      <p:transition spd="slow">
+        <p:fade/>
+      </p:transition>
+    </mc:Fallback>
+  </mc:AlternateContent>
+</p:sld>
+</file>
+
+<file path=ppt/slides/slide8.xml><?xml version="1.0" encoding="utf-8"?>
+<p:sld xmlns:a="http://schemas.openxmlformats.org/drawingml/2006/main" xmlns:r="http://schemas.openxmlformats.org/officeDocument/2006/relationships" xmlns:p="http://schemas.openxmlformats.org/presentationml/2006/main">
+  <p:cSld>
+    <p:spTree>
+      <p:nvGrpSpPr>
+        <p:cNvPr id="1" name=""/>
+        <p:cNvGrpSpPr/>
+        <p:nvPr/>
+      </p:nvGrpSpPr>
+      <p:grpSpPr>
+        <a:xfrm>
+          <a:off x="0" y="0"/>
+          <a:ext cx="0" cy="0"/>
+          <a:chOff x="0" y="0"/>
+          <a:chExt cx="0" cy="0"/>
+        </a:xfrm>
+      </p:grpSpPr>
+      <p:pic>
+        <p:nvPicPr>
+          <p:cNvPr id="7" name="Picture 6">
+            <a:extLst>
+              <a:ext uri="{FF2B5EF4-FFF2-40B4-BE49-F238E27FC236}">
+                <a16:creationId xmlns:a16="http://schemas.microsoft.com/office/drawing/2014/main" id="{30CC9A47-2D13-1543-A7C8-F8088C1A337E}"/>
+              </a:ext>
+            </a:extLst>
+          </p:cNvPr>
+          <p:cNvPicPr>
+            <a:picLocks noChangeAspect="1"/>
+          </p:cNvPicPr>
+          <p:nvPr/>
+        </p:nvPicPr>
+        <p:blipFill>
+          <a:blip r:embed="rId3"/>
+          <a:stretch>
+            <a:fillRect/>
+          </a:stretch>
+        </p:blipFill>
+        <p:spPr>
+          <a:xfrm>
+            <a:off x="0" y="0"/>
+            <a:ext cx="12192000" cy="6858000"/>
+          </a:xfrm>
+          <a:prstGeom prst="rect">
+            <a:avLst/>
+          </a:prstGeom>
+        </p:spPr>
+      </p:pic>
+      <p:sp>
+        <p:nvSpPr>
+          <p:cNvPr id="8" name="Title 7">
+            <a:extLst>
+              <a:ext uri="{FF2B5EF4-FFF2-40B4-BE49-F238E27FC236}">
+                <a16:creationId xmlns:a16="http://schemas.microsoft.com/office/drawing/2014/main" id="{A9A7AB69-D1A4-194D-B544-292C74F04FCD}"/>
+              </a:ext>
+            </a:extLst>
+          </p:cNvPr>
+          <p:cNvSpPr>
+            <a:spLocks noGrp="1"/>
+          </p:cNvSpPr>
+          <p:nvPr>
+            <p:ph type="title"/>
+          </p:nvPr>
+        </p:nvSpPr>
+        <p:spPr/>
+        <p:txBody>
+          <a:bodyPr/>
+          <a:lstStyle/>
+          <a:p>
+            <a:r>
+              <a:rPr lang="en-US" dirty="0"/>
               <a:t>Antifragile Strategy</a:t>
             </a:r>
           </a:p>
@@ -8005,7 +9742,7 @@
 </p:sld>
 </file>
 
-<file path=ppt/slides/slide7.xml><?xml version="1.0" encoding="utf-8"?>
+<file path=ppt/slides/slide9.xml><?xml version="1.0" encoding="utf-8"?>
 <p:sld xmlns:a="http://schemas.openxmlformats.org/drawingml/2006/main" xmlns:r="http://schemas.openxmlformats.org/officeDocument/2006/relationships" xmlns:p="http://schemas.openxmlformats.org/presentationml/2006/main">
   <p:cSld>
     <p:spTree>
@@ -8253,694 +9990,6 @@
     <p:extLst>
       <p:ext uri="{BB962C8B-B14F-4D97-AF65-F5344CB8AC3E}">
         <p14:creationId xmlns:p14="http://schemas.microsoft.com/office/powerpoint/2010/main" val="2255651184"/>
-      </p:ext>
-    </p:extLst>
-  </p:cSld>
-  <p:clrMapOvr>
-    <a:masterClrMapping/>
-  </p:clrMapOvr>
-</p:sld>
-</file>
-
-<file path=ppt/slides/slide8.xml><?xml version="1.0" encoding="utf-8"?>
-<p:sld xmlns:a="http://schemas.openxmlformats.org/drawingml/2006/main" xmlns:r="http://schemas.openxmlformats.org/officeDocument/2006/relationships" xmlns:p="http://schemas.openxmlformats.org/presentationml/2006/main">
-  <p:cSld>
-    <p:spTree>
-      <p:nvGrpSpPr>
-        <p:cNvPr id="1" name=""/>
-        <p:cNvGrpSpPr/>
-        <p:nvPr/>
-      </p:nvGrpSpPr>
-      <p:grpSpPr>
-        <a:xfrm>
-          <a:off x="0" y="0"/>
-          <a:ext cx="0" cy="0"/>
-          <a:chOff x="0" y="0"/>
-          <a:chExt cx="0" cy="0"/>
-        </a:xfrm>
-      </p:grpSpPr>
-      <p:pic>
-        <p:nvPicPr>
-          <p:cNvPr id="7" name="Picture 6">
-            <a:extLst>
-              <a:ext uri="{FF2B5EF4-FFF2-40B4-BE49-F238E27FC236}">
-                <a16:creationId xmlns:a16="http://schemas.microsoft.com/office/drawing/2014/main" id="{30CC9A47-2D13-1543-A7C8-F8088C1A337E}"/>
-              </a:ext>
-            </a:extLst>
-          </p:cNvPr>
-          <p:cNvPicPr>
-            <a:picLocks noChangeAspect="1"/>
-          </p:cNvPicPr>
-          <p:nvPr/>
-        </p:nvPicPr>
-        <p:blipFill>
-          <a:blip r:embed="rId3"/>
-          <a:stretch>
-            <a:fillRect/>
-          </a:stretch>
-        </p:blipFill>
-        <p:spPr>
-          <a:xfrm>
-            <a:off x="0" y="0"/>
-            <a:ext cx="12192000" cy="6858000"/>
-          </a:xfrm>
-          <a:prstGeom prst="rect">
-            <a:avLst/>
-          </a:prstGeom>
-        </p:spPr>
-      </p:pic>
-      <p:sp>
-        <p:nvSpPr>
-          <p:cNvPr id="8" name="Title 7">
-            <a:extLst>
-              <a:ext uri="{FF2B5EF4-FFF2-40B4-BE49-F238E27FC236}">
-                <a16:creationId xmlns:a16="http://schemas.microsoft.com/office/drawing/2014/main" id="{A9A7AB69-D1A4-194D-B544-292C74F04FCD}"/>
-              </a:ext>
-            </a:extLst>
-          </p:cNvPr>
-          <p:cNvSpPr>
-            <a:spLocks noGrp="1"/>
-          </p:cNvSpPr>
-          <p:nvPr>
-            <p:ph type="title"/>
-          </p:nvPr>
-        </p:nvSpPr>
-        <p:spPr/>
-        <p:txBody>
-          <a:bodyPr/>
-          <a:lstStyle/>
-          <a:p>
-            <a:r>
-              <a:rPr lang="en-US" dirty="0"/>
-              <a:t>Challenges and Future Work</a:t>
-            </a:r>
-          </a:p>
-        </p:txBody>
-      </p:sp>
-      <p:sp>
-        <p:nvSpPr>
-          <p:cNvPr id="9" name="Content Placeholder 8">
-            <a:extLst>
-              <a:ext uri="{FF2B5EF4-FFF2-40B4-BE49-F238E27FC236}">
-                <a16:creationId xmlns:a16="http://schemas.microsoft.com/office/drawing/2014/main" id="{661EE144-0F6C-2649-B81A-1334F4AFFB37}"/>
-              </a:ext>
-            </a:extLst>
-          </p:cNvPr>
-          <p:cNvSpPr>
-            <a:spLocks noGrp="1"/>
-          </p:cNvSpPr>
-          <p:nvPr>
-            <p:ph idx="1"/>
-          </p:nvPr>
-        </p:nvSpPr>
-        <p:spPr>
-          <a:xfrm>
-            <a:off x="838200" y="1617273"/>
-            <a:ext cx="4872135" cy="4559690"/>
-          </a:xfrm>
-        </p:spPr>
-        <p:txBody>
-          <a:bodyPr>
-            <a:normAutofit fontScale="92500" lnSpcReduction="10000"/>
-          </a:bodyPr>
-          <a:lstStyle/>
-          <a:p>
-            <a:r>
-              <a:rPr lang="en-US" dirty="0"/>
-              <a:t>Influence did not account for partial information flow</a:t>
-            </a:r>
-          </a:p>
-          <a:p>
-            <a:r>
-              <a:rPr lang="en-US" dirty="0"/>
-              <a:t>Data filtration limits which stocks are used</a:t>
-            </a:r>
-          </a:p>
-          <a:p>
-            <a:r>
-              <a:rPr lang="en-US" dirty="0"/>
-              <a:t>Extend broker quantity and friend distribution</a:t>
-            </a:r>
-          </a:p>
-          <a:p>
-            <a:r>
-              <a:rPr lang="en-US" dirty="0"/>
-              <a:t>Expand risk evaluation for greater stock data</a:t>
-            </a:r>
-          </a:p>
-          <a:p>
-            <a:r>
-              <a:rPr lang="en-US" dirty="0"/>
-              <a:t>Explore and define the idea of negative influence</a:t>
-            </a:r>
-          </a:p>
-          <a:p>
-            <a:r>
-              <a:rPr lang="en-US" dirty="0"/>
-              <a:t>Make model more dynamic to actually adjust stock prices</a:t>
-            </a:r>
-          </a:p>
-          <a:p>
-            <a:endParaRPr lang="en-US" dirty="0"/>
-          </a:p>
-        </p:txBody>
-      </p:sp>
-      <p:pic>
-        <p:nvPicPr>
-          <p:cNvPr id="2" name="Content Placeholder 2" descr="A graph of a graph&#10;&#10;Description automatically generated">
-            <a:extLst>
-              <a:ext uri="{FF2B5EF4-FFF2-40B4-BE49-F238E27FC236}">
-                <a16:creationId xmlns:a16="http://schemas.microsoft.com/office/drawing/2014/main" id="{A55B29B9-2E35-C23D-11D8-4041581283AE}"/>
-              </a:ext>
-            </a:extLst>
-          </p:cNvPr>
-          <p:cNvPicPr>
-            <a:picLocks noChangeAspect="1"/>
-          </p:cNvPicPr>
-          <p:nvPr/>
-        </p:nvPicPr>
-        <p:blipFill>
-          <a:blip r:embed="rId4"/>
-          <a:stretch>
-            <a:fillRect/>
-          </a:stretch>
-        </p:blipFill>
-        <p:spPr>
-          <a:xfrm>
-            <a:off x="6096000" y="1371600"/>
-            <a:ext cx="6079587" cy="4559690"/>
-          </a:xfrm>
-          <a:prstGeom prst="rect">
-            <a:avLst/>
-          </a:prstGeom>
-        </p:spPr>
-      </p:pic>
-    </p:spTree>
-    <p:extLst>
-      <p:ext uri="{BB962C8B-B14F-4D97-AF65-F5344CB8AC3E}">
-        <p14:creationId xmlns:p14="http://schemas.microsoft.com/office/powerpoint/2010/main" val="844184953"/>
-      </p:ext>
-    </p:extLst>
-  </p:cSld>
-  <p:clrMapOvr>
-    <a:masterClrMapping/>
-  </p:clrMapOvr>
-</p:sld>
-</file>
-
-<file path=ppt/slides/slide9.xml><?xml version="1.0" encoding="utf-8"?>
-<p:sld xmlns:a="http://schemas.openxmlformats.org/drawingml/2006/main" xmlns:r="http://schemas.openxmlformats.org/officeDocument/2006/relationships" xmlns:p="http://schemas.openxmlformats.org/presentationml/2006/main">
-  <p:cSld>
-    <p:spTree>
-      <p:nvGrpSpPr>
-        <p:cNvPr id="1" name=""/>
-        <p:cNvGrpSpPr/>
-        <p:nvPr/>
-      </p:nvGrpSpPr>
-      <p:grpSpPr>
-        <a:xfrm>
-          <a:off x="0" y="0"/>
-          <a:ext cx="0" cy="0"/>
-          <a:chOff x="0" y="0"/>
-          <a:chExt cx="0" cy="0"/>
-        </a:xfrm>
-      </p:grpSpPr>
-      <p:pic>
-        <p:nvPicPr>
-          <p:cNvPr id="7" name="Picture 6">
-            <a:extLst>
-              <a:ext uri="{FF2B5EF4-FFF2-40B4-BE49-F238E27FC236}">
-                <a16:creationId xmlns:a16="http://schemas.microsoft.com/office/drawing/2014/main" id="{30CC9A47-2D13-1543-A7C8-F8088C1A337E}"/>
-              </a:ext>
-            </a:extLst>
-          </p:cNvPr>
-          <p:cNvPicPr>
-            <a:picLocks noChangeAspect="1"/>
-          </p:cNvPicPr>
-          <p:nvPr/>
-        </p:nvPicPr>
-        <p:blipFill>
-          <a:blip r:embed="rId3"/>
-          <a:stretch>
-            <a:fillRect/>
-          </a:stretch>
-        </p:blipFill>
-        <p:spPr>
-          <a:xfrm>
-            <a:off x="0" y="0"/>
-            <a:ext cx="12192000" cy="6858000"/>
-          </a:xfrm>
-          <a:prstGeom prst="rect">
-            <a:avLst/>
-          </a:prstGeom>
-        </p:spPr>
-      </p:pic>
-      <p:sp>
-        <p:nvSpPr>
-          <p:cNvPr id="8" name="Title 7">
-            <a:extLst>
-              <a:ext uri="{FF2B5EF4-FFF2-40B4-BE49-F238E27FC236}">
-                <a16:creationId xmlns:a16="http://schemas.microsoft.com/office/drawing/2014/main" id="{A9A7AB69-D1A4-194D-B544-292C74F04FCD}"/>
-              </a:ext>
-            </a:extLst>
-          </p:cNvPr>
-          <p:cNvSpPr>
-            <a:spLocks noGrp="1"/>
-          </p:cNvSpPr>
-          <p:nvPr>
-            <p:ph type="title"/>
-          </p:nvPr>
-        </p:nvSpPr>
-        <p:spPr/>
-        <p:txBody>
-          <a:bodyPr/>
-          <a:lstStyle/>
-          <a:p>
-            <a:r>
-              <a:rPr lang="en-US" dirty="0"/>
-              <a:t>References</a:t>
-            </a:r>
-          </a:p>
-        </p:txBody>
-      </p:sp>
-      <p:sp>
-        <p:nvSpPr>
-          <p:cNvPr id="9" name="Content Placeholder 8">
-            <a:extLst>
-              <a:ext uri="{FF2B5EF4-FFF2-40B4-BE49-F238E27FC236}">
-                <a16:creationId xmlns:a16="http://schemas.microsoft.com/office/drawing/2014/main" id="{661EE144-0F6C-2649-B81A-1334F4AFFB37}"/>
-              </a:ext>
-            </a:extLst>
-          </p:cNvPr>
-          <p:cNvSpPr>
-            <a:spLocks noGrp="1"/>
-          </p:cNvSpPr>
-          <p:nvPr>
-            <p:ph idx="1"/>
-          </p:nvPr>
-        </p:nvSpPr>
-        <p:spPr>
-          <a:xfrm>
-            <a:off x="412490" y="1595535"/>
-            <a:ext cx="11367019" cy="4665404"/>
-          </a:xfrm>
-        </p:spPr>
-        <p:txBody>
-          <a:bodyPr>
-            <a:normAutofit lnSpcReduction="10000"/>
-          </a:bodyPr>
-          <a:lstStyle/>
-          <a:p>
-            <a:pPr marL="0" indent="0">
-              <a:buNone/>
-            </a:pPr>
-            <a:r>
-              <a:rPr lang="en-US" sz="1000" dirty="0"/>
-              <a:t>X. </a:t>
-            </a:r>
-            <a:r>
-              <a:rPr lang="en-US" sz="1000" dirty="0" err="1"/>
-              <a:t>Gabaix</a:t>
-            </a:r>
-            <a:r>
-              <a:rPr lang="en-US" sz="1000" dirty="0"/>
-              <a:t>, “Power laws in economics: an introduction,” \</a:t>
-            </a:r>
-            <a:r>
-              <a:rPr lang="en-US" sz="1000" dirty="0" err="1"/>
-              <a:t>textit</a:t>
-            </a:r>
-            <a:r>
-              <a:rPr lang="en-US" sz="1000" dirty="0"/>
-              <a:t>{Journal of Economic Perspectives}, vol. 30, no. 1, pp. 185–206, Feb. 2016.</a:t>
-            </a:r>
-          </a:p>
-          <a:p>
-            <a:pPr marL="0" indent="0">
-              <a:buNone/>
-            </a:pPr>
-            <a:r>
-              <a:rPr lang="en-US" sz="1000" dirty="0"/>
-              <a:t>N. N. </a:t>
-            </a:r>
-            <a:r>
-              <a:rPr lang="en-US" sz="1000" dirty="0" err="1"/>
-              <a:t>Taleb</a:t>
-            </a:r>
-            <a:r>
-              <a:rPr lang="en-US" sz="1000" dirty="0"/>
-              <a:t>, Antifragile: Things that gain from disorder. Harlow, England: Penguin Books, 2013.</a:t>
-            </a:r>
-          </a:p>
-          <a:p>
-            <a:pPr marL="0" indent="0">
-              <a:buNone/>
-            </a:pPr>
-            <a:r>
-              <a:rPr lang="en-US" sz="1000" dirty="0"/>
-              <a:t>D. Easley and J. Kleinberg, Networks, crowds, and markets: Reasoning about a highly connected world. Cambridge, England: Cambridge University Press, 2012.</a:t>
-            </a:r>
-          </a:p>
-          <a:p>
-            <a:pPr marL="0" indent="0">
-              <a:buNone/>
-            </a:pPr>
-            <a:r>
-              <a:rPr lang="en-US" sz="1000" dirty="0"/>
-              <a:t>C. Hommes, “Behavioral and Experimental Macroeconomics and Policy Analysis: A Complex Systems Approach,” Journal of Economic Literature, vol. 59, no. 1, pp. 149–219, Mar. 2021, </a:t>
-            </a:r>
-            <a:r>
-              <a:rPr lang="en-US" sz="1000" dirty="0" err="1"/>
-              <a:t>doi</a:t>
-            </a:r>
-            <a:r>
-              <a:rPr lang="en-US" sz="1000" dirty="0"/>
-              <a:t>: 10.1257/jel.20191434.</a:t>
-            </a:r>
-          </a:p>
-          <a:p>
-            <a:pPr marL="0" indent="0">
-              <a:buNone/>
-            </a:pPr>
-            <a:r>
-              <a:rPr lang="en-US" sz="1000" dirty="0"/>
-              <a:t>C. K. </a:t>
-            </a:r>
-            <a:r>
-              <a:rPr lang="en-US" sz="1000" dirty="0" err="1"/>
-              <a:t>Tse</a:t>
-            </a:r>
-            <a:r>
-              <a:rPr lang="en-US" sz="1000" dirty="0"/>
-              <a:t>, J. Liu, and F. C. M. Lau, “A network perspective of the stock market,” Journal of Empirical Finance, vol. 17, no. 4, pp. 659–667, Sep. 2010, </a:t>
-            </a:r>
-            <a:r>
-              <a:rPr lang="en-US" sz="1000" dirty="0" err="1"/>
-              <a:t>doi</a:t>
-            </a:r>
-            <a:r>
-              <a:rPr lang="en-US" sz="1000" dirty="0"/>
-              <a:t>: 10.1016/j.jempfin.2010.04.008.</a:t>
-            </a:r>
-          </a:p>
-          <a:p>
-            <a:pPr marL="0" indent="0">
-              <a:buNone/>
-            </a:pPr>
-            <a:r>
-              <a:rPr lang="en-US" sz="1000" dirty="0"/>
-              <a:t>M. Kuhlmann, "Explaining financial markets in terms of complex systems," \</a:t>
-            </a:r>
-            <a:r>
-              <a:rPr lang="en-US" sz="1000" dirty="0" err="1"/>
-              <a:t>textit</a:t>
-            </a:r>
-            <a:r>
-              <a:rPr lang="en-US" sz="1000" dirty="0"/>
-              <a:t>{</a:t>
-            </a:r>
-            <a:r>
-              <a:rPr lang="en-US" sz="1000" dirty="0" err="1"/>
-              <a:t>Philosphy</a:t>
-            </a:r>
-            <a:r>
-              <a:rPr lang="en-US" sz="1000" dirty="0"/>
-              <a:t> of Science}, vol. 81, no. 5, pp. 1117-1130, Dec. 2014. %</a:t>
-            </a:r>
-            <a:r>
-              <a:rPr lang="en-US" sz="1000" dirty="0" err="1"/>
-              <a:t>doi</a:t>
-            </a:r>
-            <a:r>
-              <a:rPr lang="en-US" sz="1000" dirty="0"/>
-              <a:t>: 10.1086/677699.</a:t>
-            </a:r>
-          </a:p>
-          <a:p>
-            <a:pPr marL="0" indent="0">
-              <a:buNone/>
-            </a:pPr>
-            <a:r>
-              <a:rPr lang="en-US" sz="1000" dirty="0"/>
-              <a:t>M. Di Maggio, F. </a:t>
-            </a:r>
-            <a:r>
-              <a:rPr lang="en-US" sz="1000" dirty="0" err="1"/>
-              <a:t>Franzoni</a:t>
-            </a:r>
-            <a:r>
-              <a:rPr lang="en-US" sz="1000" dirty="0"/>
-              <a:t>, A. </a:t>
-            </a:r>
-            <a:r>
-              <a:rPr lang="en-US" sz="1000" dirty="0" err="1"/>
-              <a:t>Kermani</a:t>
-            </a:r>
-            <a:r>
-              <a:rPr lang="en-US" sz="1000" dirty="0"/>
-              <a:t>, and C. </a:t>
-            </a:r>
-            <a:r>
-              <a:rPr lang="en-US" sz="1000" dirty="0" err="1"/>
-              <a:t>Sommavilla</a:t>
-            </a:r>
-            <a:r>
-              <a:rPr lang="en-US" sz="1000" dirty="0"/>
-              <a:t>, "The relevance of broker networks for information diffusion in the stock market," \</a:t>
-            </a:r>
-            <a:r>
-              <a:rPr lang="en-US" sz="1000" dirty="0" err="1"/>
-              <a:t>textit</a:t>
-            </a:r>
-            <a:r>
-              <a:rPr lang="en-US" sz="1000" dirty="0"/>
-              <a:t>{Journal of Financial Economics}, vol. 134, no. 2, pp. 419-446, Nov. 2019. </a:t>
-            </a:r>
-          </a:p>
-          <a:p>
-            <a:pPr marL="0" indent="0">
-              <a:buNone/>
-            </a:pPr>
-            <a:r>
-              <a:rPr lang="en-US" sz="1000" dirty="0"/>
-              <a:t>P. Gai and S. Kapadia, "Contagion in financial networks," \</a:t>
-            </a:r>
-            <a:r>
-              <a:rPr lang="en-US" sz="1000" dirty="0" err="1"/>
-              <a:t>textit</a:t>
-            </a:r>
-            <a:r>
-              <a:rPr lang="en-US" sz="1000" dirty="0"/>
-              <a:t>{Proceedings of the Royal Society}, vol. 466, no. 2120, pp. 2401–2423, Aug. 2010.</a:t>
-            </a:r>
-          </a:p>
-          <a:p>
-            <a:pPr marL="0" indent="0">
-              <a:buNone/>
-            </a:pPr>
-            <a:r>
-              <a:rPr lang="en-US" sz="1000" dirty="0"/>
-              <a:t>C. K. </a:t>
-            </a:r>
-            <a:r>
-              <a:rPr lang="en-US" sz="1000" dirty="0" err="1"/>
-              <a:t>Tse</a:t>
-            </a:r>
-            <a:r>
-              <a:rPr lang="en-US" sz="1000" dirty="0"/>
-              <a:t>, J. Liu, and F. C. M. Lau, “A network perspective of the stock market,” \</a:t>
-            </a:r>
-            <a:r>
-              <a:rPr lang="en-US" sz="1000" dirty="0" err="1"/>
-              <a:t>textit</a:t>
-            </a:r>
-            <a:r>
-              <a:rPr lang="en-US" sz="1000" dirty="0"/>
-              <a:t>{Journal of Empirical Finance}, vol. 17, no. 4, pp. 659–667, Sep. 2010. % </a:t>
-            </a:r>
-            <a:r>
-              <a:rPr lang="en-US" sz="1000" dirty="0" err="1"/>
-              <a:t>doi</a:t>
-            </a:r>
-            <a:r>
-              <a:rPr lang="en-US" sz="1000" dirty="0"/>
-              <a:t>: 10.1016/j.jempfin.2010.04.008.</a:t>
-            </a:r>
-          </a:p>
-          <a:p>
-            <a:pPr marL="0" indent="0">
-              <a:buNone/>
-            </a:pPr>
-            <a:r>
-              <a:rPr lang="en-US" sz="1000" dirty="0"/>
-              <a:t>G. Li, A. Zhang, Q. Zhang, D. Wu, and C. Zhan, “Pearson correlation coefficient-based performance enhancement of broad learning system for stock price prediction,” \</a:t>
-            </a:r>
-            <a:r>
-              <a:rPr lang="en-US" sz="1000" dirty="0" err="1"/>
-              <a:t>textit</a:t>
-            </a:r>
-            <a:r>
-              <a:rPr lang="en-US" sz="1000" dirty="0"/>
-              <a:t>{IEEE Transactions on Circuits and Systems II: Express Briefs}, vol. 69, no. 5, pp. 2413–2417, May 2022. </a:t>
-            </a:r>
-          </a:p>
-          <a:p>
-            <a:pPr marL="0" indent="0">
-              <a:buNone/>
-            </a:pPr>
-            <a:r>
-              <a:rPr lang="en-US" sz="1000" dirty="0"/>
-              <a:t>P. </a:t>
-            </a:r>
-            <a:r>
-              <a:rPr lang="en-US" sz="1000" dirty="0" err="1"/>
-              <a:t>Fiedor</a:t>
-            </a:r>
-            <a:r>
-              <a:rPr lang="en-US" sz="1000" dirty="0"/>
-              <a:t>, “Networks in financial markets based on the mutual information rate,” \</a:t>
-            </a:r>
-            <a:r>
-              <a:rPr lang="en-US" sz="1000" dirty="0" err="1"/>
-              <a:t>textit</a:t>
-            </a:r>
-            <a:r>
-              <a:rPr lang="en-US" sz="1000" dirty="0"/>
-              <a:t>{Physical Review E}, vol. 89, no. 5, May 2014. % </a:t>
-            </a:r>
-            <a:r>
-              <a:rPr lang="en-US" sz="1000" dirty="0" err="1"/>
-              <a:t>doi</a:t>
-            </a:r>
-            <a:r>
-              <a:rPr lang="en-US" sz="1000" dirty="0"/>
-              <a:t>: 10.1103/PhysRevE.89.052801.</a:t>
-            </a:r>
-          </a:p>
-          <a:p>
-            <a:pPr marL="0" indent="0">
-              <a:buNone/>
-            </a:pPr>
-            <a:r>
-              <a:rPr lang="en-US" sz="1000" dirty="0"/>
-              <a:t>I. Cooper and R. Priestley. "Real investment and risk dynamics," \</a:t>
-            </a:r>
-            <a:r>
-              <a:rPr lang="en-US" sz="1000" dirty="0" err="1"/>
-              <a:t>textit</a:t>
-            </a:r>
-            <a:r>
-              <a:rPr lang="en-US" sz="1000" dirty="0"/>
-              <a:t>{Journal of Financial Economics}, vol. 101, no. 1, pp. 182-205, July 2011.</a:t>
-            </a:r>
-          </a:p>
-          <a:p>
-            <a:pPr marL="0" indent="0">
-              <a:buNone/>
-            </a:pPr>
-            <a:r>
-              <a:rPr lang="en-US" sz="1000" dirty="0"/>
-              <a:t>K. J. Lansing and S. F. LeRoy, “Risk aversion, investor information and stock market volatility,” \</a:t>
-            </a:r>
-            <a:r>
-              <a:rPr lang="en-US" sz="1000" dirty="0" err="1"/>
-              <a:t>textit</a:t>
-            </a:r>
-            <a:r>
-              <a:rPr lang="en-US" sz="1000" dirty="0"/>
-              <a:t>{European Economic Review}, vol. 70, pp. 88-107, July 2014. </a:t>
-            </a:r>
-          </a:p>
-          <a:p>
-            <a:pPr marL="0" indent="0">
-              <a:buNone/>
-            </a:pPr>
-            <a:r>
-              <a:rPr lang="en-US" sz="1000" dirty="0"/>
-              <a:t>J. E. </a:t>
-            </a:r>
-            <a:r>
-              <a:rPr lang="en-US" sz="1000" dirty="0" err="1"/>
-              <a:t>Corter</a:t>
-            </a:r>
-            <a:r>
-              <a:rPr lang="en-US" sz="1000" dirty="0"/>
-              <a:t> and Y. J. Chen, “Do investment risk tolerance attitudes predict portfolio risk?,” \</a:t>
-            </a:r>
-            <a:r>
-              <a:rPr lang="en-US" sz="1100" dirty="0" err="1"/>
-              <a:t>textit</a:t>
-            </a:r>
-            <a:r>
-              <a:rPr lang="en-US" sz="1000" dirty="0"/>
-              <a:t>{Journal of Business and Psychology}, vol. 20, no. 3, pp. 369-381, 2006.</a:t>
-            </a:r>
-          </a:p>
-          <a:p>
-            <a:pPr marL="0" indent="0">
-              <a:buNone/>
-            </a:pPr>
-            <a:r>
-              <a:rPr lang="en-US" sz="1000" dirty="0"/>
-              <a:t>D. Harmon, B. Stacey, Y. Bar-Yam, and Y. Bar-Yam, "Networks of economic market interdependence and systemic risk," New England Complex Systems Institute, Cambridge, MA, Tech. Report 1011.3707, Mar. 2009.</a:t>
-            </a:r>
-          </a:p>
-          <a:p>
-            <a:pPr marL="0" indent="0">
-              <a:buNone/>
-            </a:pPr>
-            <a:r>
-              <a:rPr lang="en-US" sz="1000" dirty="0"/>
-              <a:t>Y. Y. </a:t>
-            </a:r>
-            <a:r>
-              <a:rPr lang="en-US" sz="1000" dirty="0" err="1"/>
-              <a:t>Baydilli</a:t>
-            </a:r>
-            <a:r>
-              <a:rPr lang="en-US" sz="1000" dirty="0"/>
-              <a:t>, S. </a:t>
-            </a:r>
-            <a:r>
-              <a:rPr lang="en-US" sz="1000" dirty="0" err="1"/>
-              <a:t>Bayir</a:t>
-            </a:r>
-            <a:r>
-              <a:rPr lang="en-US" sz="1000" dirty="0"/>
-              <a:t>, and I. </a:t>
-            </a:r>
-            <a:r>
-              <a:rPr lang="en-US" sz="1000" dirty="0" err="1"/>
-              <a:t>Tuker</a:t>
-            </a:r>
-            <a:r>
-              <a:rPr lang="en-US" sz="1000" dirty="0"/>
-              <a:t>, “A hierarchical view of a national stock market as a complex network,” \</a:t>
-            </a:r>
-            <a:r>
-              <a:rPr lang="en-US" sz="1000" dirty="0" err="1"/>
-              <a:t>textit</a:t>
-            </a:r>
-            <a:r>
-              <a:rPr lang="en-US" sz="1000" dirty="0"/>
-              <a:t>{Economic Computation \&amp; Economic Cybernetics Studies \&amp; Research}, vol. 51, no. 1, pp. 205–222, Jan. 2017.</a:t>
-            </a:r>
-          </a:p>
-          <a:p>
-            <a:pPr marL="0" indent="0">
-              <a:buNone/>
-            </a:pPr>
-            <a:r>
-              <a:rPr lang="en-US" sz="1000" dirty="0"/>
-              <a:t>		</a:t>
-            </a:r>
-          </a:p>
-        </p:txBody>
-      </p:sp>
-    </p:spTree>
-    <p:extLst>
-      <p:ext uri="{BB962C8B-B14F-4D97-AF65-F5344CB8AC3E}">
-        <p14:creationId xmlns:p14="http://schemas.microsoft.com/office/powerpoint/2010/main" val="3598801279"/>
       </p:ext>
     </p:extLst>
   </p:cSld>

</xml_diff>

<commit_message>
Added notes to risk slide
</commit_message>
<xml_diff>
--- a/Project Status Report Final/finalpresentation.pptx
+++ b/Project Status Report Final/finalpresentation.pptx
@@ -2147,6 +2147,16 @@
             </a:r>
           </a:p>
           <a:p>
+            <a:pPr marL="628650" lvl="1" indent="-171450">
+              <a:buFontTx/>
+              <a:buChar char="-"/>
+            </a:pPr>
+            <a:r>
+              <a:rPr lang="en-US" dirty="0"/>
+              <a:t>We selected k = 3 because we believed there is an “average risk” of the stock, but not variance. and for k &gt; a – 1, kth moment is infinite. Mean is the first moment and variance is the second. Therefore, k must be at least 2, 3 &gt; a – 1 =&gt; a = 2, a larger study can be done if there is a better suited value for a, but we got good results with a = 2. </a:t>
+            </a:r>
+          </a:p>
+          <a:p>
             <a:pPr marL="171450" indent="-171450">
               <a:buFontTx/>
               <a:buChar char="-"/>
@@ -2157,13 +2167,59 @@
             </a:r>
           </a:p>
           <a:p>
+            <a:pPr marL="628650" lvl="1" indent="-171450">
+              <a:buFontTx/>
+              <a:buChar char="-"/>
+            </a:pPr>
+            <a:r>
+              <a:rPr lang="en-US" dirty="0"/>
+              <a:t>X – The goal of this value was to capture a positive value in the domain of 1 – infinity that represented the impact a stock may have. Impact meaning the vested amount or the worst case vs best case scenario. So to ensure the bounds, the base is an exponential function, this also helps with keeping our variance undefined. The exponent of this term was to capture </a:t>
+            </a:r>
+            <a:r>
+              <a:rPr lang="en-US" dirty="0" err="1"/>
+              <a:t>voltality</a:t>
+            </a:r>
+            <a:r>
+              <a:rPr lang="en-US" dirty="0"/>
+              <a:t> vs expected return. This was used to gauge just how unruly the stock behaves. We used an absolute value, as if the expected return was greater than the volatility, this was a safe stock, that may even return an infinitesimal risk. </a:t>
+            </a:r>
+          </a:p>
+          <a:p>
+            <a:pPr marL="628650" lvl="1" indent="-171450">
+              <a:buFontTx/>
+              <a:buChar char="-"/>
+            </a:pPr>
+            <a:r>
+              <a:rPr lang="en-US" dirty="0"/>
+              <a:t>Our expected return is the product of average of the stock price over 50 days times the dividend ratio. This is essentially the money in the bag. The </a:t>
+            </a:r>
+            <a:r>
+              <a:rPr lang="en-US" dirty="0" err="1"/>
+              <a:t>volatlitiy</a:t>
+            </a:r>
+            <a:r>
+              <a:rPr lang="en-US" dirty="0"/>
+              <a:t> is based on a year. We may be better able to capture . Impact = Volatility – Expected return.</a:t>
+            </a:r>
+          </a:p>
+          <a:p>
+            <a:pPr marL="628650" lvl="1" indent="-171450">
+              <a:buFontTx/>
+              <a:buChar char="-"/>
+            </a:pPr>
+            <a:r>
+              <a:rPr lang="en-US" dirty="0"/>
+              <a:t>Next we calculate the likelihood. The likelihood is trying to encapsulate the chances the stock becomes more volatile. This equation is the product of % share of equity of the stock , the expected earning per share and the complement of the quarterly growth. This number is complemented because all stocks are expected to have a positive quarterly growth, and a negative growth increases volatility. </a:t>
+            </a:r>
+          </a:p>
+          <a:p>
             <a:pPr marL="171450" indent="-171450">
               <a:buFontTx/>
               <a:buChar char="-"/>
             </a:pPr>
             <a:r>
               <a:rPr lang="en-US" dirty="0"/>
-              <a:t>What does impact mean here?</a:t>
+              <a:t>What does impact mean here? How the stock may impact the portfolio/equity. </a:t>
             </a:r>
           </a:p>
           <a:p>
@@ -2174,6 +2230,16 @@
             <a:r>
               <a:rPr lang="en-US" dirty="0"/>
               <a:t>From Rachael: maybe note that this behavioral model of purchasing fewer stocks but more expensive ones at high risk emerged naturally and was not enforced</a:t>
+            </a:r>
+          </a:p>
+          <a:p>
+            <a:pPr marL="628650" lvl="1" indent="-171450">
+              <a:buFontTx/>
+              <a:buChar char="-"/>
+            </a:pPr>
+            <a:r>
+              <a:rPr lang="en-US" dirty="0"/>
+              <a:t>While we have a parameter that restricts risk to the total equity, this inspired the brokers to diversify in medium risk scenarios (which mirrors reality), and concentrate in stocks for high risk (reverse diversification)</a:t>
             </a:r>
           </a:p>
           <a:p>
@@ -9421,13 +9487,13 @@
   <p:clrMapOvr>
     <a:masterClrMapping/>
   </p:clrMapOvr>
-  <mc:AlternateContent xmlns:mc="http://schemas.openxmlformats.org/markup-compatibility/2006">
-    <mc:Choice xmlns:p159="http://schemas.microsoft.com/office/powerpoint/2015/09/main" Requires="p159">
+  <mc:AlternateContent xmlns:mc="http://schemas.openxmlformats.org/markup-compatibility/2006" xmlns:p159="http://schemas.microsoft.com/office/powerpoint/2015/09/main">
+    <mc:Choice Requires="p159">
       <p:transition xmlns:p14="http://schemas.microsoft.com/office/powerpoint/2010/main" spd="slow" p14:dur="2000">
         <p159:morph option="byObject"/>
       </p:transition>
     </mc:Choice>
-    <mc:Fallback>
+    <mc:Fallback xmlns="">
       <p:transition spd="slow">
         <p:fade/>
       </p:transition>
@@ -9580,13 +9646,13 @@
   <p:clrMapOvr>
     <a:masterClrMapping/>
   </p:clrMapOvr>
-  <mc:AlternateContent xmlns:mc="http://schemas.openxmlformats.org/markup-compatibility/2006">
-    <mc:Choice xmlns:p159="http://schemas.microsoft.com/office/powerpoint/2015/09/main" Requires="p159">
+  <mc:AlternateContent xmlns:mc="http://schemas.openxmlformats.org/markup-compatibility/2006" xmlns:p159="http://schemas.microsoft.com/office/powerpoint/2015/09/main">
+    <mc:Choice Requires="p159">
       <p:transition xmlns:p14="http://schemas.microsoft.com/office/powerpoint/2010/main" spd="slow" p14:dur="2000">
         <p159:morph option="byObject"/>
       </p:transition>
     </mc:Choice>
-    <mc:Fallback>
+    <mc:Fallback xmlns="">
       <p:transition spd="slow">
         <p:fade/>
       </p:transition>

</xml_diff>